<commit_message>
Finished the power point
The power point is ready for briefing 2
</commit_message>
<xml_diff>
--- a/Briefing2.pptx
+++ b/Briefing2.pptx
@@ -6,6 +6,9 @@
   </p:sldMasterIdLst>
   <p:sldIdLst>
     <p:sldId id="256" r:id="rId2"/>
+    <p:sldId id="257" r:id="rId3"/>
+    <p:sldId id="258" r:id="rId4"/>
+    <p:sldId id="259" r:id="rId5"/>
   </p:sldIdLst>
   <p:sldSz cx="9144000" cy="6858000" type="screen4x3"/>
   <p:notesSz cx="6858000" cy="9144000"/>
@@ -280,7 +283,7 @@
           <a:p>
             <a:fld id="{542ED6D8-967B-4FDD-8539-23116DD8CE38}" type="datetimeFigureOut">
               <a:rPr lang="en-US" smtClean="0"/>
-              <a:t>10/11/2014</a:t>
+              <a:t>10/13/2014</a:t>
             </a:fld>
             <a:endParaRPr lang="en-US"/>
           </a:p>
@@ -445,7 +448,7 @@
           <a:p>
             <a:fld id="{542ED6D8-967B-4FDD-8539-23116DD8CE38}" type="datetimeFigureOut">
               <a:rPr lang="en-US" smtClean="0"/>
-              <a:t>10/11/2014</a:t>
+              <a:t>10/13/2014</a:t>
             </a:fld>
             <a:endParaRPr lang="en-US"/>
           </a:p>
@@ -620,7 +623,7 @@
           <a:p>
             <a:fld id="{542ED6D8-967B-4FDD-8539-23116DD8CE38}" type="datetimeFigureOut">
               <a:rPr lang="en-US" smtClean="0"/>
-              <a:t>10/11/2014</a:t>
+              <a:t>10/13/2014</a:t>
             </a:fld>
             <a:endParaRPr lang="en-US"/>
           </a:p>
@@ -785,7 +788,7 @@
           <a:p>
             <a:fld id="{542ED6D8-967B-4FDD-8539-23116DD8CE38}" type="datetimeFigureOut">
               <a:rPr lang="en-US" smtClean="0"/>
-              <a:t>10/11/2014</a:t>
+              <a:t>10/13/2014</a:t>
             </a:fld>
             <a:endParaRPr lang="en-US"/>
           </a:p>
@@ -1027,7 +1030,7 @@
           <a:p>
             <a:fld id="{542ED6D8-967B-4FDD-8539-23116DD8CE38}" type="datetimeFigureOut">
               <a:rPr lang="en-US" smtClean="0"/>
-              <a:t>10/11/2014</a:t>
+              <a:t>10/13/2014</a:t>
             </a:fld>
             <a:endParaRPr lang="en-US"/>
           </a:p>
@@ -1291,7 +1294,7 @@
           <a:p>
             <a:fld id="{542ED6D8-967B-4FDD-8539-23116DD8CE38}" type="datetimeFigureOut">
               <a:rPr lang="en-US" smtClean="0"/>
-              <a:t>10/11/2014</a:t>
+              <a:t>10/13/2014</a:t>
             </a:fld>
             <a:endParaRPr lang="en-US"/>
           </a:p>
@@ -1669,7 +1672,7 @@
           <a:p>
             <a:fld id="{542ED6D8-967B-4FDD-8539-23116DD8CE38}" type="datetimeFigureOut">
               <a:rPr lang="en-US" smtClean="0"/>
-              <a:t>10/11/2014</a:t>
+              <a:t>10/13/2014</a:t>
             </a:fld>
             <a:endParaRPr lang="en-US"/>
           </a:p>
@@ -1819,7 +1822,7 @@
           <a:p>
             <a:fld id="{542ED6D8-967B-4FDD-8539-23116DD8CE38}" type="datetimeFigureOut">
               <a:rPr lang="en-US" smtClean="0"/>
-              <a:t>10/11/2014</a:t>
+              <a:t>10/13/2014</a:t>
             </a:fld>
             <a:endParaRPr lang="en-US"/>
           </a:p>
@@ -1909,7 +1912,7 @@
           <a:p>
             <a:fld id="{542ED6D8-967B-4FDD-8539-23116DD8CE38}" type="datetimeFigureOut">
               <a:rPr lang="en-US" smtClean="0"/>
-              <a:t>10/11/2014</a:t>
+              <a:t>10/13/2014</a:t>
             </a:fld>
             <a:endParaRPr lang="en-US"/>
           </a:p>
@@ -2170,7 +2173,7 @@
           <a:p>
             <a:fld id="{542ED6D8-967B-4FDD-8539-23116DD8CE38}" type="datetimeFigureOut">
               <a:rPr lang="en-US" smtClean="0"/>
-              <a:t>10/11/2014</a:t>
+              <a:t>10/13/2014</a:t>
             </a:fld>
             <a:endParaRPr lang="en-US"/>
           </a:p>
@@ -2458,7 +2461,7 @@
           <a:p>
             <a:fld id="{542ED6D8-967B-4FDD-8539-23116DD8CE38}" type="datetimeFigureOut">
               <a:rPr lang="en-US" smtClean="0"/>
-              <a:t>10/11/2014</a:t>
+              <a:t>10/13/2014</a:t>
             </a:fld>
             <a:endParaRPr lang="en-US"/>
           </a:p>
@@ -3229,7 +3232,7 @@
           <a:p>
             <a:fld id="{542ED6D8-967B-4FDD-8539-23116DD8CE38}" type="datetimeFigureOut">
               <a:rPr lang="en-US" smtClean="0"/>
-              <a:t>10/11/2014</a:t>
+              <a:t>10/13/2014</a:t>
             </a:fld>
             <a:endParaRPr lang="en-US"/>
           </a:p>
@@ -3935,6 +3938,282 @@
 </p:sld>
 </file>
 
+<file path=ppt/slides/slide2.xml><?xml version="1.0" encoding="utf-8"?>
+<p:sld xmlns:a="http://schemas.openxmlformats.org/drawingml/2006/main" xmlns:r="http://schemas.openxmlformats.org/officeDocument/2006/relationships" xmlns:p="http://schemas.openxmlformats.org/presentationml/2006/main">
+  <p:cSld>
+    <p:spTree>
+      <p:nvGrpSpPr>
+        <p:cNvPr id="1" name=""/>
+        <p:cNvGrpSpPr/>
+        <p:nvPr/>
+      </p:nvGrpSpPr>
+      <p:grpSpPr>
+        <a:xfrm>
+          <a:off x="0" y="0"/>
+          <a:ext cx="0" cy="0"/>
+          <a:chOff x="0" y="0"/>
+          <a:chExt cx="0" cy="0"/>
+        </a:xfrm>
+      </p:grpSpPr>
+      <p:sp>
+        <p:nvSpPr>
+          <p:cNvPr id="2" name="Title 1"/>
+          <p:cNvSpPr>
+            <a:spLocks noGrp="1"/>
+          </p:cNvSpPr>
+          <p:nvPr>
+            <p:ph type="title"/>
+          </p:nvPr>
+        </p:nvSpPr>
+        <p:spPr/>
+        <p:txBody>
+          <a:bodyPr/>
+          <a:lstStyle/>
+          <a:p>
+            <a:r>
+              <a:rPr lang="en-US" dirty="0" smtClean="0"/>
+              <a:t>R.D. Diagram of the Design</a:t>
+            </a:r>
+            <a:endParaRPr lang="en-US" dirty="0"/>
+          </a:p>
+        </p:txBody>
+      </p:sp>
+      <p:sp>
+        <p:nvSpPr>
+          <p:cNvPr id="5" name="Text Placeholder 4"/>
+          <p:cNvSpPr>
+            <a:spLocks noGrp="1"/>
+          </p:cNvSpPr>
+          <p:nvPr>
+            <p:ph type="body" idx="2"/>
+          </p:nvPr>
+        </p:nvSpPr>
+        <p:spPr/>
+        <p:txBody>
+          <a:bodyPr/>
+          <a:lstStyle/>
+          <a:p>
+            <a:r>
+              <a:rPr lang="en-US" dirty="0" smtClean="0"/>
+              <a:t>This is the current rough draft of the basic design of the fish input system.</a:t>
+            </a:r>
+          </a:p>
+          <a:p>
+            <a:endParaRPr lang="en-US" dirty="0"/>
+          </a:p>
+        </p:txBody>
+      </p:sp>
+      <p:pic>
+        <p:nvPicPr>
+          <p:cNvPr id="4" name="Content Placeholder 3"/>
+          <p:cNvPicPr>
+            <a:picLocks noGrp="1" noChangeAspect="1"/>
+          </p:cNvPicPr>
+          <p:nvPr>
+            <p:ph sz="half" idx="1"/>
+          </p:nvPr>
+        </p:nvPicPr>
+        <p:blipFill>
+          <a:blip r:embed="rId2">
+            <a:extLst>
+              <a:ext uri="{28A0092B-C50C-407E-A947-70E740481C1C}">
+                <a14:useLocalDpi xmlns:a14="http://schemas.microsoft.com/office/drawing/2010/main" val="0"/>
+              </a:ext>
+            </a:extLst>
+          </a:blip>
+          <a:stretch>
+            <a:fillRect/>
+          </a:stretch>
+        </p:blipFill>
+        <p:spPr>
+          <a:xfrm>
+            <a:off x="4416425" y="1676400"/>
+            <a:ext cx="3429000" cy="4572000"/>
+          </a:xfrm>
+        </p:spPr>
+      </p:pic>
+    </p:spTree>
+    <p:extLst>
+      <p:ext uri="{BB962C8B-B14F-4D97-AF65-F5344CB8AC3E}">
+        <p14:creationId xmlns:p14="http://schemas.microsoft.com/office/powerpoint/2010/main" val="3013361963"/>
+      </p:ext>
+    </p:extLst>
+  </p:cSld>
+  <p:clrMapOvr>
+    <a:masterClrMapping/>
+  </p:clrMapOvr>
+</p:sld>
+</file>
+
+<file path=ppt/slides/slide3.xml><?xml version="1.0" encoding="utf-8"?>
+<p:sld xmlns:a="http://schemas.openxmlformats.org/drawingml/2006/main" xmlns:r="http://schemas.openxmlformats.org/officeDocument/2006/relationships" xmlns:p="http://schemas.openxmlformats.org/presentationml/2006/main">
+  <p:cSld>
+    <p:spTree>
+      <p:nvGrpSpPr>
+        <p:cNvPr id="1" name=""/>
+        <p:cNvGrpSpPr/>
+        <p:nvPr/>
+      </p:nvGrpSpPr>
+      <p:grpSpPr>
+        <a:xfrm>
+          <a:off x="0" y="0"/>
+          <a:ext cx="0" cy="0"/>
+          <a:chOff x="0" y="0"/>
+          <a:chExt cx="0" cy="0"/>
+        </a:xfrm>
+      </p:grpSpPr>
+      <p:sp>
+        <p:nvSpPr>
+          <p:cNvPr id="2" name="Title 1"/>
+          <p:cNvSpPr>
+            <a:spLocks noGrp="1"/>
+          </p:cNvSpPr>
+          <p:nvPr>
+            <p:ph type="title"/>
+          </p:nvPr>
+        </p:nvSpPr>
+        <p:spPr/>
+        <p:txBody>
+          <a:bodyPr/>
+          <a:lstStyle/>
+          <a:p>
+            <a:r>
+              <a:rPr lang="en-US" dirty="0" smtClean="0"/>
+              <a:t>Full Diagram of initial design</a:t>
+            </a:r>
+            <a:endParaRPr lang="en-US" dirty="0"/>
+          </a:p>
+        </p:txBody>
+      </p:sp>
+      <p:pic>
+        <p:nvPicPr>
+          <p:cNvPr id="4" name="Content Placeholder 3"/>
+          <p:cNvPicPr>
+            <a:picLocks noGrp="1" noChangeAspect="1"/>
+          </p:cNvPicPr>
+          <p:nvPr>
+            <p:ph idx="1"/>
+          </p:nvPr>
+        </p:nvPicPr>
+        <p:blipFill>
+          <a:blip r:embed="rId2" cstate="print">
+            <a:extLst>
+              <a:ext uri="{28A0092B-C50C-407E-A947-70E740481C1C}">
+                <a14:useLocalDpi xmlns:a14="http://schemas.microsoft.com/office/drawing/2010/main" val="0"/>
+              </a:ext>
+            </a:extLst>
+          </a:blip>
+          <a:stretch>
+            <a:fillRect/>
+          </a:stretch>
+        </p:blipFill>
+        <p:spPr>
+          <a:xfrm>
+            <a:off x="1645709" y="1935163"/>
+            <a:ext cx="5852582" cy="4389437"/>
+          </a:xfrm>
+        </p:spPr>
+      </p:pic>
+    </p:spTree>
+    <p:extLst>
+      <p:ext uri="{BB962C8B-B14F-4D97-AF65-F5344CB8AC3E}">
+        <p14:creationId xmlns:p14="http://schemas.microsoft.com/office/powerpoint/2010/main" val="3793897647"/>
+      </p:ext>
+    </p:extLst>
+  </p:cSld>
+  <p:clrMapOvr>
+    <a:masterClrMapping/>
+  </p:clrMapOvr>
+</p:sld>
+</file>
+
+<file path=ppt/slides/slide4.xml><?xml version="1.0" encoding="utf-8"?>
+<p:sld xmlns:a="http://schemas.openxmlformats.org/drawingml/2006/main" xmlns:r="http://schemas.openxmlformats.org/officeDocument/2006/relationships" xmlns:p="http://schemas.openxmlformats.org/presentationml/2006/main">
+  <p:cSld>
+    <p:spTree>
+      <p:nvGrpSpPr>
+        <p:cNvPr id="1" name=""/>
+        <p:cNvGrpSpPr/>
+        <p:nvPr/>
+      </p:nvGrpSpPr>
+      <p:grpSpPr>
+        <a:xfrm>
+          <a:off x="0" y="0"/>
+          <a:ext cx="0" cy="0"/>
+          <a:chOff x="0" y="0"/>
+          <a:chExt cx="0" cy="0"/>
+        </a:xfrm>
+      </p:grpSpPr>
+      <p:sp>
+        <p:nvSpPr>
+          <p:cNvPr id="7" name="Title 6"/>
+          <p:cNvSpPr>
+            <a:spLocks noGrp="1"/>
+          </p:cNvSpPr>
+          <p:nvPr>
+            <p:ph type="title"/>
+          </p:nvPr>
+        </p:nvSpPr>
+        <p:spPr/>
+        <p:txBody>
+          <a:bodyPr/>
+          <a:lstStyle/>
+          <a:p>
+            <a:r>
+              <a:rPr lang="en-US" dirty="0" smtClean="0"/>
+              <a:t>SRS is coming along</a:t>
+            </a:r>
+            <a:endParaRPr lang="en-US" dirty="0"/>
+          </a:p>
+        </p:txBody>
+      </p:sp>
+      <p:sp>
+        <p:nvSpPr>
+          <p:cNvPr id="8" name="Content Placeholder 7"/>
+          <p:cNvSpPr>
+            <a:spLocks noGrp="1"/>
+          </p:cNvSpPr>
+          <p:nvPr>
+            <p:ph idx="1"/>
+          </p:nvPr>
+        </p:nvSpPr>
+        <p:spPr/>
+        <p:txBody>
+          <a:bodyPr/>
+          <a:lstStyle/>
+          <a:p>
+            <a:r>
+              <a:rPr lang="en-US" dirty="0" smtClean="0"/>
+              <a:t>Currently we have a rough draft of the SRS </a:t>
+            </a:r>
+          </a:p>
+          <a:p>
+            <a:r>
+              <a:rPr lang="en-US" dirty="0" smtClean="0"/>
+              <a:t>We have not yet shown the client this but are in the process of meeting up with them again.</a:t>
+            </a:r>
+          </a:p>
+          <a:p>
+            <a:r>
+              <a:rPr lang="en-US" dirty="0" smtClean="0"/>
+              <a:t>We will send them a copy via email as well.</a:t>
+            </a:r>
+          </a:p>
+        </p:txBody>
+      </p:sp>
+    </p:spTree>
+    <p:extLst>
+      <p:ext uri="{BB962C8B-B14F-4D97-AF65-F5344CB8AC3E}">
+        <p14:creationId xmlns:p14="http://schemas.microsoft.com/office/powerpoint/2010/main" val="2397406114"/>
+      </p:ext>
+    </p:extLst>
+  </p:cSld>
+  <p:clrMapOvr>
+    <a:masterClrMapping/>
+  </p:clrMapOvr>
+</p:sld>
+</file>
+
 <file path=ppt/theme/theme1.xml><?xml version="1.0" encoding="utf-8"?>
 <a:theme xmlns:a="http://schemas.openxmlformats.org/drawingml/2006/main" name="Flow">
   <a:themeElements>

</xml_diff>

<commit_message>
Added a few details to ppt
</commit_message>
<xml_diff>
--- a/Briefing2.pptx
+++ b/Briefing2.pptx
@@ -8,7 +8,9 @@
     <p:sldId id="256" r:id="rId2"/>
     <p:sldId id="257" r:id="rId3"/>
     <p:sldId id="258" r:id="rId4"/>
-    <p:sldId id="259" r:id="rId5"/>
+    <p:sldId id="260" r:id="rId5"/>
+    <p:sldId id="261" r:id="rId6"/>
+    <p:sldId id="259" r:id="rId7"/>
   </p:sldIdLst>
   <p:sldSz cx="9144000" cy="6858000" type="screen4x3"/>
   <p:notesSz cx="6858000" cy="9144000"/>
@@ -283,6 +285,7 @@
           <a:p>
             <a:fld id="{542ED6D8-967B-4FDD-8539-23116DD8CE38}" type="datetimeFigureOut">
               <a:rPr lang="en-US" smtClean="0"/>
+              <a:pPr/>
               <a:t>10/13/2014</a:t>
             </a:fld>
             <a:endParaRPr lang="en-US"/>
@@ -325,6 +328,7 @@
           <a:p>
             <a:fld id="{9AF68AB6-DD62-4065-9EF9-D7CEDA1C3581}" type="slidenum">
               <a:rPr lang="en-US" smtClean="0"/>
+              <a:pPr/>
               <a:t>‹#›</a:t>
             </a:fld>
             <a:endParaRPr lang="en-US"/>
@@ -448,6 +452,7 @@
           <a:p>
             <a:fld id="{542ED6D8-967B-4FDD-8539-23116DD8CE38}" type="datetimeFigureOut">
               <a:rPr lang="en-US" smtClean="0"/>
+              <a:pPr/>
               <a:t>10/13/2014</a:t>
             </a:fld>
             <a:endParaRPr lang="en-US"/>
@@ -490,6 +495,7 @@
           <a:p>
             <a:fld id="{9AF68AB6-DD62-4065-9EF9-D7CEDA1C3581}" type="slidenum">
               <a:rPr lang="en-US" smtClean="0"/>
+              <a:pPr/>
               <a:t>‹#›</a:t>
             </a:fld>
             <a:endParaRPr lang="en-US"/>
@@ -623,6 +629,7 @@
           <a:p>
             <a:fld id="{542ED6D8-967B-4FDD-8539-23116DD8CE38}" type="datetimeFigureOut">
               <a:rPr lang="en-US" smtClean="0"/>
+              <a:pPr/>
               <a:t>10/13/2014</a:t>
             </a:fld>
             <a:endParaRPr lang="en-US"/>
@@ -665,6 +672,7 @@
           <a:p>
             <a:fld id="{9AF68AB6-DD62-4065-9EF9-D7CEDA1C3581}" type="slidenum">
               <a:rPr lang="en-US" smtClean="0"/>
+              <a:pPr/>
               <a:t>‹#›</a:t>
             </a:fld>
             <a:endParaRPr lang="en-US"/>
@@ -788,6 +796,7 @@
           <a:p>
             <a:fld id="{542ED6D8-967B-4FDD-8539-23116DD8CE38}" type="datetimeFigureOut">
               <a:rPr lang="en-US" smtClean="0"/>
+              <a:pPr/>
               <a:t>10/13/2014</a:t>
             </a:fld>
             <a:endParaRPr lang="en-US"/>
@@ -830,6 +839,7 @@
           <a:p>
             <a:fld id="{9AF68AB6-DD62-4065-9EF9-D7CEDA1C3581}" type="slidenum">
               <a:rPr lang="en-US" smtClean="0"/>
+              <a:pPr/>
               <a:t>‹#›</a:t>
             </a:fld>
             <a:endParaRPr lang="en-US"/>
@@ -1030,6 +1040,7 @@
           <a:p>
             <a:fld id="{542ED6D8-967B-4FDD-8539-23116DD8CE38}" type="datetimeFigureOut">
               <a:rPr lang="en-US" smtClean="0"/>
+              <a:pPr/>
               <a:t>10/13/2014</a:t>
             </a:fld>
             <a:endParaRPr lang="en-US"/>
@@ -1072,6 +1083,7 @@
           <a:p>
             <a:fld id="{9AF68AB6-DD62-4065-9EF9-D7CEDA1C3581}" type="slidenum">
               <a:rPr lang="en-US" smtClean="0"/>
+              <a:pPr/>
               <a:t>‹#›</a:t>
             </a:fld>
             <a:endParaRPr lang="en-US"/>
@@ -1294,6 +1306,7 @@
           <a:p>
             <a:fld id="{542ED6D8-967B-4FDD-8539-23116DD8CE38}" type="datetimeFigureOut">
               <a:rPr lang="en-US" smtClean="0"/>
+              <a:pPr/>
               <a:t>10/13/2014</a:t>
             </a:fld>
             <a:endParaRPr lang="en-US"/>
@@ -1336,6 +1349,7 @@
           <a:p>
             <a:fld id="{9AF68AB6-DD62-4065-9EF9-D7CEDA1C3581}" type="slidenum">
               <a:rPr lang="en-US" smtClean="0"/>
+              <a:pPr/>
               <a:t>‹#›</a:t>
             </a:fld>
             <a:endParaRPr lang="en-US"/>
@@ -1672,6 +1686,7 @@
           <a:p>
             <a:fld id="{542ED6D8-967B-4FDD-8539-23116DD8CE38}" type="datetimeFigureOut">
               <a:rPr lang="en-US" smtClean="0"/>
+              <a:pPr/>
               <a:t>10/13/2014</a:t>
             </a:fld>
             <a:endParaRPr lang="en-US"/>
@@ -1714,6 +1729,7 @@
           <a:p>
             <a:fld id="{9AF68AB6-DD62-4065-9EF9-D7CEDA1C3581}" type="slidenum">
               <a:rPr lang="en-US" smtClean="0"/>
+              <a:pPr/>
               <a:t>‹#›</a:t>
             </a:fld>
             <a:endParaRPr lang="en-US"/>
@@ -1822,6 +1838,7 @@
           <a:p>
             <a:fld id="{542ED6D8-967B-4FDD-8539-23116DD8CE38}" type="datetimeFigureOut">
               <a:rPr lang="en-US" smtClean="0"/>
+              <a:pPr/>
               <a:t>10/13/2014</a:t>
             </a:fld>
             <a:endParaRPr lang="en-US"/>
@@ -1864,6 +1881,7 @@
           <a:p>
             <a:fld id="{9AF68AB6-DD62-4065-9EF9-D7CEDA1C3581}" type="slidenum">
               <a:rPr lang="en-US" smtClean="0"/>
+              <a:pPr/>
               <a:t>‹#›</a:t>
             </a:fld>
             <a:endParaRPr lang="en-US"/>
@@ -1912,6 +1930,7 @@
           <a:p>
             <a:fld id="{542ED6D8-967B-4FDD-8539-23116DD8CE38}" type="datetimeFigureOut">
               <a:rPr lang="en-US" smtClean="0"/>
+              <a:pPr/>
               <a:t>10/13/2014</a:t>
             </a:fld>
             <a:endParaRPr lang="en-US"/>
@@ -1954,6 +1973,7 @@
           <a:p>
             <a:fld id="{9AF68AB6-DD62-4065-9EF9-D7CEDA1C3581}" type="slidenum">
               <a:rPr lang="en-US" smtClean="0"/>
+              <a:pPr/>
               <a:t>‹#›</a:t>
             </a:fld>
             <a:endParaRPr lang="en-US"/>
@@ -2173,6 +2193,7 @@
           <a:p>
             <a:fld id="{542ED6D8-967B-4FDD-8539-23116DD8CE38}" type="datetimeFigureOut">
               <a:rPr lang="en-US" smtClean="0"/>
+              <a:pPr/>
               <a:t>10/13/2014</a:t>
             </a:fld>
             <a:endParaRPr lang="en-US"/>
@@ -2215,6 +2236,7 @@
           <a:p>
             <a:fld id="{9AF68AB6-DD62-4065-9EF9-D7CEDA1C3581}" type="slidenum">
               <a:rPr lang="en-US" smtClean="0"/>
+              <a:pPr/>
               <a:t>‹#›</a:t>
             </a:fld>
             <a:endParaRPr lang="en-US"/>
@@ -2461,6 +2483,7 @@
           <a:p>
             <a:fld id="{542ED6D8-967B-4FDD-8539-23116DD8CE38}" type="datetimeFigureOut">
               <a:rPr lang="en-US" smtClean="0"/>
+              <a:pPr/>
               <a:t>10/13/2014</a:t>
             </a:fld>
             <a:endParaRPr lang="en-US"/>
@@ -2508,6 +2531,7 @@
           <a:p>
             <a:fld id="{9AF68AB6-DD62-4065-9EF9-D7CEDA1C3581}" type="slidenum">
               <a:rPr lang="en-US" smtClean="0"/>
+              <a:pPr/>
               <a:t>‹#›</a:t>
             </a:fld>
             <a:endParaRPr lang="en-US"/>
@@ -3232,6 +3256,7 @@
           <a:p>
             <a:fld id="{542ED6D8-967B-4FDD-8539-23116DD8CE38}" type="datetimeFigureOut">
               <a:rPr lang="en-US" smtClean="0"/>
+              <a:pPr/>
               <a:t>10/13/2014</a:t>
             </a:fld>
             <a:endParaRPr lang="en-US"/>
@@ -3310,6 +3335,7 @@
           <a:p>
             <a:fld id="{9AF68AB6-DD62-4065-9EF9-D7CEDA1C3581}" type="slidenum">
               <a:rPr lang="en-US" smtClean="0"/>
+              <a:pPr/>
               <a:t>‹#›</a:t>
             </a:fld>
             <a:endParaRPr lang="en-US"/>
@@ -3971,10 +3997,10 @@
           <a:lstStyle/>
           <a:p>
             <a:r>
-              <a:rPr lang="en-US" dirty="0" smtClean="0"/>
-              <a:t>R.D. Diagram of the Design</a:t>
-            </a:r>
-            <a:endParaRPr lang="en-US" dirty="0"/>
+              <a:rPr lang="en-US" sz="2700" dirty="0" smtClean="0"/>
+              <a:t>Rough Draft Design</a:t>
+            </a:r>
+            <a:endParaRPr lang="en-US" sz="2700" dirty="0"/>
           </a:p>
         </p:txBody>
       </p:sp>
@@ -3990,16 +4016,39 @@
         </p:nvSpPr>
         <p:spPr/>
         <p:txBody>
-          <a:bodyPr/>
-          <a:lstStyle/>
-          <a:p>
-            <a:r>
-              <a:rPr lang="en-US" dirty="0" smtClean="0"/>
-              <a:t>This is the current rough draft of the basic design of the fish input system.</a:t>
-            </a:r>
-          </a:p>
-          <a:p>
-            <a:endParaRPr lang="en-US" dirty="0"/>
+          <a:bodyPr>
+            <a:normAutofit/>
+          </a:bodyPr>
+          <a:lstStyle/>
+          <a:p>
+            <a:pPr>
+              <a:buFont typeface="Arial" pitchFamily="34" charset="0"/>
+              <a:buChar char="•"/>
+            </a:pPr>
+            <a:r>
+              <a:rPr lang="en-US" sz="1800" dirty="0" smtClean="0"/>
+              <a:t>Update fields on start up to allow for easy upgrades</a:t>
+            </a:r>
+          </a:p>
+          <a:p>
+            <a:pPr>
+              <a:buFont typeface="Arial" pitchFamily="34" charset="0"/>
+              <a:buChar char="•"/>
+            </a:pPr>
+            <a:r>
+              <a:rPr lang="en-US" sz="1800" dirty="0" smtClean="0"/>
+              <a:t>Store creel data internally</a:t>
+            </a:r>
+          </a:p>
+          <a:p>
+            <a:pPr>
+              <a:buFont typeface="Arial" pitchFamily="34" charset="0"/>
+              <a:buChar char="•"/>
+            </a:pPr>
+            <a:r>
+              <a:rPr lang="en-US" sz="1800" dirty="0" smtClean="0"/>
+              <a:t>Communicate with Team 4’s database via JSON objects sent over the internet</a:t>
+            </a:r>
           </a:p>
         </p:txBody>
       </p:sp>
@@ -4014,10 +4063,10 @@
           </p:nvPr>
         </p:nvPicPr>
         <p:blipFill>
-          <a:blip r:embed="rId2">
+          <a:blip r:embed="rId2" cstate="print">
             <a:extLst>
               <a:ext uri="{28A0092B-C50C-407E-A947-70E740481C1C}">
-                <a14:useLocalDpi xmlns:a14="http://schemas.microsoft.com/office/drawing/2010/main" val="0"/>
+                <a14:useLocalDpi xmlns:a14="http://schemas.microsoft.com/office/drawing/2010/main" xmlns="" val="0"/>
               </a:ext>
             </a:extLst>
           </a:blip>
@@ -4035,7 +4084,7 @@
     </p:spTree>
     <p:extLst>
       <p:ext uri="{BB962C8B-B14F-4D97-AF65-F5344CB8AC3E}">
-        <p14:creationId xmlns:p14="http://schemas.microsoft.com/office/powerpoint/2010/main" val="3013361963"/>
+        <p14:creationId xmlns:p14="http://schemas.microsoft.com/office/powerpoint/2010/main" xmlns="" val="3013361963"/>
       </p:ext>
     </p:extLst>
   </p:cSld>
@@ -4074,12 +4123,15 @@
         </p:nvSpPr>
         <p:spPr/>
         <p:txBody>
-          <a:bodyPr/>
-          <a:lstStyle/>
-          <a:p>
+          <a:bodyPr>
+            <a:normAutofit fontScale="90000"/>
+          </a:bodyPr>
+          <a:lstStyle/>
+          <a:p>
+            <a:pPr algn="ctr"/>
             <a:r>
               <a:rPr lang="en-US" dirty="0" smtClean="0"/>
-              <a:t>Full Diagram of initial design</a:t>
+              <a:t>Diagram Including User Interface</a:t>
             </a:r>
             <a:endParaRPr lang="en-US" dirty="0"/>
           </a:p>
@@ -4099,7 +4151,7 @@
           <a:blip r:embed="rId2" cstate="print">
             <a:extLst>
               <a:ext uri="{28A0092B-C50C-407E-A947-70E740481C1C}">
-                <a14:useLocalDpi xmlns:a14="http://schemas.microsoft.com/office/drawing/2010/main" val="0"/>
+                <a14:useLocalDpi xmlns:a14="http://schemas.microsoft.com/office/drawing/2010/main" xmlns="" val="0"/>
               </a:ext>
             </a:extLst>
           </a:blip>
@@ -4117,7 +4169,7 @@
     </p:spTree>
     <p:extLst>
       <p:ext uri="{BB962C8B-B14F-4D97-AF65-F5344CB8AC3E}">
-        <p14:creationId xmlns:p14="http://schemas.microsoft.com/office/powerpoint/2010/main" val="3793897647"/>
+        <p14:creationId xmlns:p14="http://schemas.microsoft.com/office/powerpoint/2010/main" xmlns="" val="3793897647"/>
       </p:ext>
     </p:extLst>
   </p:cSld>
@@ -4146,6 +4198,207 @@
       </p:grpSpPr>
       <p:sp>
         <p:nvSpPr>
+          <p:cNvPr id="2" name="Title 1"/>
+          <p:cNvSpPr>
+            <a:spLocks noGrp="1"/>
+          </p:cNvSpPr>
+          <p:nvPr>
+            <p:ph type="title"/>
+          </p:nvPr>
+        </p:nvSpPr>
+        <p:spPr/>
+        <p:txBody>
+          <a:bodyPr/>
+          <a:lstStyle/>
+          <a:p>
+            <a:pPr algn="ctr"/>
+            <a:r>
+              <a:rPr lang="en-US" dirty="0" smtClean="0"/>
+              <a:t>User Interface Basics</a:t>
+            </a:r>
+            <a:endParaRPr lang="en-US" dirty="0"/>
+          </a:p>
+        </p:txBody>
+      </p:sp>
+      <p:sp>
+        <p:nvSpPr>
+          <p:cNvPr id="3" name="Content Placeholder 2"/>
+          <p:cNvSpPr>
+            <a:spLocks noGrp="1"/>
+          </p:cNvSpPr>
+          <p:nvPr>
+            <p:ph idx="1"/>
+          </p:nvPr>
+        </p:nvSpPr>
+        <p:spPr/>
+        <p:txBody>
+          <a:bodyPr/>
+          <a:lstStyle/>
+          <a:p>
+            <a:r>
+              <a:rPr lang="en-US" dirty="0" smtClean="0"/>
+              <a:t>Client wants the feel of a paper form </a:t>
+            </a:r>
+          </a:p>
+          <a:p>
+            <a:r>
+              <a:rPr lang="en-US" dirty="0" smtClean="0"/>
+              <a:t>3 screens</a:t>
+            </a:r>
+          </a:p>
+          <a:p>
+            <a:pPr lvl="1"/>
+            <a:r>
+              <a:rPr lang="en-US" dirty="0" smtClean="0"/>
+              <a:t>Intro Screen </a:t>
+            </a:r>
+          </a:p>
+          <a:p>
+            <a:pPr lvl="1"/>
+            <a:r>
+              <a:rPr lang="en-US" dirty="0" smtClean="0"/>
+              <a:t>Creel Form</a:t>
+            </a:r>
+          </a:p>
+          <a:p>
+            <a:pPr lvl="1"/>
+            <a:r>
+              <a:rPr lang="en-US" dirty="0" smtClean="0"/>
+              <a:t>Exit Screen</a:t>
+            </a:r>
+            <a:endParaRPr lang="en-US" dirty="0"/>
+          </a:p>
+        </p:txBody>
+      </p:sp>
+    </p:spTree>
+  </p:cSld>
+  <p:clrMapOvr>
+    <a:masterClrMapping/>
+  </p:clrMapOvr>
+</p:sld>
+</file>
+
+<file path=ppt/slides/slide5.xml><?xml version="1.0" encoding="utf-8"?>
+<p:sld xmlns:a="http://schemas.openxmlformats.org/drawingml/2006/main" xmlns:r="http://schemas.openxmlformats.org/officeDocument/2006/relationships" xmlns:p="http://schemas.openxmlformats.org/presentationml/2006/main">
+  <p:cSld>
+    <p:spTree>
+      <p:nvGrpSpPr>
+        <p:cNvPr id="1" name=""/>
+        <p:cNvGrpSpPr/>
+        <p:nvPr/>
+      </p:nvGrpSpPr>
+      <p:grpSpPr>
+        <a:xfrm>
+          <a:off x="0" y="0"/>
+          <a:ext cx="0" cy="0"/>
+          <a:chOff x="0" y="0"/>
+          <a:chExt cx="0" cy="0"/>
+        </a:xfrm>
+      </p:grpSpPr>
+      <p:sp>
+        <p:nvSpPr>
+          <p:cNvPr id="2" name="Title 1"/>
+          <p:cNvSpPr>
+            <a:spLocks noGrp="1"/>
+          </p:cNvSpPr>
+          <p:nvPr>
+            <p:ph type="title"/>
+          </p:nvPr>
+        </p:nvSpPr>
+        <p:spPr/>
+        <p:txBody>
+          <a:bodyPr/>
+          <a:lstStyle/>
+          <a:p>
+            <a:pPr algn="ctr"/>
+            <a:r>
+              <a:rPr lang="en-US" dirty="0" smtClean="0"/>
+              <a:t>General Software Decisions</a:t>
+            </a:r>
+            <a:endParaRPr lang="en-US" dirty="0"/>
+          </a:p>
+        </p:txBody>
+      </p:sp>
+      <p:sp>
+        <p:nvSpPr>
+          <p:cNvPr id="3" name="Content Placeholder 2"/>
+          <p:cNvSpPr>
+            <a:spLocks noGrp="1"/>
+          </p:cNvSpPr>
+          <p:nvPr>
+            <p:ph idx="1"/>
+          </p:nvPr>
+        </p:nvSpPr>
+        <p:spPr/>
+        <p:txBody>
+          <a:bodyPr/>
+          <a:lstStyle/>
+          <a:p>
+            <a:r>
+              <a:rPr lang="en-US" dirty="0" err="1" smtClean="0"/>
+              <a:t>Getac</a:t>
+            </a:r>
+            <a:r>
+              <a:rPr lang="en-US" dirty="0" smtClean="0"/>
+              <a:t> Tablets run Windows 7 Professional</a:t>
+            </a:r>
+          </a:p>
+          <a:p>
+            <a:r>
+              <a:rPr lang="en-US" dirty="0" smtClean="0"/>
+              <a:t>Client wants sustainable code</a:t>
+            </a:r>
+          </a:p>
+          <a:p>
+            <a:pPr lvl="1"/>
+            <a:r>
+              <a:rPr lang="en-US" dirty="0" smtClean="0"/>
+              <a:t>We’re choosing to write our code in C#</a:t>
+            </a:r>
+          </a:p>
+          <a:p>
+            <a:r>
+              <a:rPr lang="en-US" dirty="0" smtClean="0"/>
+              <a:t>Client’s overall goal for software is fewer errors</a:t>
+            </a:r>
+          </a:p>
+          <a:p>
+            <a:pPr lvl="1"/>
+            <a:r>
+              <a:rPr lang="en-US" dirty="0" smtClean="0"/>
+              <a:t>We’re going to use drop-down lists</a:t>
+            </a:r>
+            <a:endParaRPr lang="en-US" dirty="0"/>
+          </a:p>
+        </p:txBody>
+      </p:sp>
+    </p:spTree>
+  </p:cSld>
+  <p:clrMapOvr>
+    <a:masterClrMapping/>
+  </p:clrMapOvr>
+</p:sld>
+</file>
+
+<file path=ppt/slides/slide6.xml><?xml version="1.0" encoding="utf-8"?>
+<p:sld xmlns:a="http://schemas.openxmlformats.org/drawingml/2006/main" xmlns:r="http://schemas.openxmlformats.org/officeDocument/2006/relationships" xmlns:p="http://schemas.openxmlformats.org/presentationml/2006/main">
+  <p:cSld>
+    <p:spTree>
+      <p:nvGrpSpPr>
+        <p:cNvPr id="1" name=""/>
+        <p:cNvGrpSpPr/>
+        <p:nvPr/>
+      </p:nvGrpSpPr>
+      <p:grpSpPr>
+        <a:xfrm>
+          <a:off x="0" y="0"/>
+          <a:ext cx="0" cy="0"/>
+          <a:chOff x="0" y="0"/>
+          <a:chExt cx="0" cy="0"/>
+        </a:xfrm>
+      </p:grpSpPr>
+      <p:sp>
+        <p:nvSpPr>
           <p:cNvPr id="7" name="Title 6"/>
           <p:cNvSpPr>
             <a:spLocks noGrp="1"/>
@@ -4159,9 +4412,14 @@
           <a:bodyPr/>
           <a:lstStyle/>
           <a:p>
+            <a:pPr algn="ctr"/>
             <a:r>
               <a:rPr lang="en-US" dirty="0" smtClean="0"/>
-              <a:t>SRS is coming along</a:t>
+              <a:t>SRS </a:t>
+            </a:r>
+            <a:r>
+              <a:rPr lang="en-US" dirty="0" smtClean="0"/>
+              <a:t>Progress</a:t>
             </a:r>
             <a:endParaRPr lang="en-US" dirty="0"/>
           </a:p>
@@ -4190,21 +4448,27 @@
           <a:p>
             <a:r>
               <a:rPr lang="en-US" dirty="0" smtClean="0"/>
-              <a:t>We have not yet shown the client this but are in the process of meeting up with them again.</a:t>
-            </a:r>
+              <a:t>Contacted client to request a meeting to discuss the SRS</a:t>
+            </a:r>
+            <a:endParaRPr lang="en-US" dirty="0" smtClean="0"/>
           </a:p>
           <a:p>
             <a:r>
               <a:rPr lang="en-US" dirty="0" smtClean="0"/>
-              <a:t>We will send them a copy via email as well.</a:t>
-            </a:r>
+              <a:t>We will send them a copy via email as </a:t>
+            </a:r>
+            <a:r>
+              <a:rPr lang="en-US" dirty="0" smtClean="0"/>
+              <a:t>well</a:t>
+            </a:r>
+            <a:endParaRPr lang="en-US" dirty="0" smtClean="0"/>
           </a:p>
         </p:txBody>
       </p:sp>
     </p:spTree>
     <p:extLst>
       <p:ext uri="{BB962C8B-B14F-4D97-AF65-F5344CB8AC3E}">
-        <p14:creationId xmlns:p14="http://schemas.microsoft.com/office/powerpoint/2010/main" val="2397406114"/>
+        <p14:creationId xmlns:p14="http://schemas.microsoft.com/office/powerpoint/2010/main" xmlns="" val="2397406114"/>
       </p:ext>
     </p:extLst>
   </p:cSld>

</xml_diff>

<commit_message>
PDF of ppt/Design changes
</commit_message>
<xml_diff>
--- a/Briefing2.pptx
+++ b/Briefing2.pptx
@@ -2,11 +2,11 @@
 <file path=ppt/presentation.xml><?xml version="1.0" encoding="utf-8"?>
 <p:presentation xmlns:a="http://schemas.openxmlformats.org/drawingml/2006/main" xmlns:r="http://schemas.openxmlformats.org/officeDocument/2006/relationships" xmlns:p="http://schemas.openxmlformats.org/presentationml/2006/main" saveSubsetFonts="1">
   <p:sldMasterIdLst>
-    <p:sldMasterId id="2147483660" r:id="rId1"/>
+    <p:sldMasterId id="2147483672" r:id="rId1"/>
   </p:sldMasterIdLst>
   <p:sldIdLst>
     <p:sldId id="256" r:id="rId2"/>
-    <p:sldId id="257" r:id="rId3"/>
+    <p:sldId id="262" r:id="rId3"/>
     <p:sldId id="258" r:id="rId4"/>
     <p:sldId id="260" r:id="rId5"/>
     <p:sldId id="261" r:id="rId6"/>
@@ -113,13 +113,8 @@
 </file>
 
 <file path=ppt/slideLayouts/slideLayout1.xml><?xml version="1.0" encoding="utf-8"?>
-<p:sldLayout xmlns:a="http://schemas.openxmlformats.org/drawingml/2006/main" xmlns:r="http://schemas.openxmlformats.org/officeDocument/2006/relationships" xmlns:p="http://schemas.openxmlformats.org/presentationml/2006/main" type="title" preserve="1">
+<p:sldLayout xmlns:a="http://schemas.openxmlformats.org/drawingml/2006/main" xmlns:r="http://schemas.openxmlformats.org/officeDocument/2006/relationships" xmlns:p="http://schemas.openxmlformats.org/presentationml/2006/main" showMasterSp="0" type="title" preserve="1">
   <p:cSld name="Title Slide">
-    <p:bg>
-      <p:bgRef idx="1002">
-        <a:schemeClr val="bg2"/>
-      </p:bgRef>
-    </p:bg>
     <p:spTree>
       <p:nvGrpSpPr>
         <p:cNvPr id="1" name=""/>
@@ -136,7 +131,75 @@
       </p:grpSpPr>
       <p:sp>
         <p:nvSpPr>
-          <p:cNvPr id="9" name="Title 8"/>
+          <p:cNvPr id="7" name="Round Diagonal Corner Rectangle 6"/>
+          <p:cNvSpPr/>
+          <p:nvPr/>
+        </p:nvSpPr>
+        <p:spPr>
+          <a:xfrm>
+            <a:off x="164592" y="146304"/>
+            <a:ext cx="8814816" cy="2505456"/>
+          </a:xfrm>
+          <a:prstGeom prst="round2DiagRect">
+            <a:avLst>
+              <a:gd name="adj1" fmla="val 11807"/>
+              <a:gd name="adj2" fmla="val 0"/>
+            </a:avLst>
+          </a:prstGeom>
+          <a:solidFill>
+            <a:schemeClr val="bg2">
+              <a:tint val="85000"/>
+              <a:shade val="90000"/>
+              <a:satMod val="150000"/>
+              <a:alpha val="65000"/>
+            </a:schemeClr>
+          </a:solidFill>
+          <a:ln w="11000" cap="rnd" cmpd="sng" algn="ctr">
+            <a:solidFill>
+              <a:schemeClr val="bg2">
+                <a:tint val="78000"/>
+                <a:satMod val="180000"/>
+                <a:alpha val="88000"/>
+              </a:schemeClr>
+            </a:solidFill>
+            <a:prstDash val="solid"/>
+          </a:ln>
+          <a:effectLst>
+            <a:innerShdw blurRad="114300">
+              <a:srgbClr val="000000">
+                <a:alpha val="100000"/>
+              </a:srgbClr>
+            </a:innerShdw>
+          </a:effectLst>
+        </p:spPr>
+        <p:style>
+          <a:lnRef idx="3">
+            <a:schemeClr val="lt1"/>
+          </a:lnRef>
+          <a:fillRef idx="1">
+            <a:schemeClr val="accent1"/>
+          </a:fillRef>
+          <a:effectRef idx="1">
+            <a:schemeClr val="accent1"/>
+          </a:effectRef>
+          <a:fontRef idx="minor">
+            <a:schemeClr val="lt1"/>
+          </a:fontRef>
+        </p:style>
+        <p:txBody>
+          <a:bodyPr anchor="ctr"/>
+          <a:lstStyle>
+            <a:extLst/>
+          </a:lstStyle>
+          <a:p>
+            <a:pPr algn="ctr" eaLnBrk="1" latinLnBrk="0" hangingPunct="1"/>
+            <a:endParaRPr kumimoji="0" lang="en-US"/>
+          </a:p>
+        </p:txBody>
+      </p:sp>
+      <p:sp>
+        <p:nvSpPr>
+          <p:cNvPr id="8" name="Title 7"/>
           <p:cNvSpPr>
             <a:spLocks noGrp="1"/>
           </p:cNvSpPr>
@@ -146,92 +209,55 @@
         </p:nvSpPr>
         <p:spPr>
           <a:xfrm>
-            <a:off x="533400" y="1371600"/>
-            <a:ext cx="7851648" cy="1828800"/>
-          </a:xfrm>
-          <a:ln>
-            <a:noFill/>
-          </a:ln>
-        </p:spPr>
-        <p:txBody>
-          <a:bodyPr vert="horz" tIns="0" rIns="18288" bIns="0" anchor="b">
+            <a:off x="464234" y="381001"/>
+            <a:ext cx="8229600" cy="2209800"/>
+          </a:xfrm>
+        </p:spPr>
+        <p:txBody>
+          <a:bodyPr lIns="45720" rIns="228600" anchor="b">
             <a:normAutofit/>
-            <a:scene3d>
-              <a:camera prst="orthographicFront"/>
-              <a:lightRig rig="freezing" dir="t">
-                <a:rot lat="0" lon="0" rev="5640000"/>
-              </a:lightRig>
-            </a:scene3d>
-            <a:sp3d prstMaterial="flat">
-              <a:bevelT w="38100" h="38100"/>
-              <a:contourClr>
-                <a:schemeClr val="tx2"/>
-              </a:contourClr>
-            </a:sp3d>
           </a:bodyPr>
           <a:lstStyle>
-            <a:lvl1pPr algn="r" rtl="0">
+            <a:lvl1pPr marL="0" algn="r">
+              <a:defRPr sz="4800"/>
+            </a:lvl1pPr>
+            <a:extLst/>
+          </a:lstStyle>
+          <a:p>
+            <a:r>
+              <a:rPr kumimoji="0" lang="en-US" smtClean="0"/>
+              <a:t>Click to edit Master title style</a:t>
+            </a:r>
+            <a:endParaRPr kumimoji="0" lang="en-US"/>
+          </a:p>
+        </p:txBody>
+      </p:sp>
+      <p:sp>
+        <p:nvSpPr>
+          <p:cNvPr id="9" name="Subtitle 8"/>
+          <p:cNvSpPr>
+            <a:spLocks noGrp="1"/>
+          </p:cNvSpPr>
+          <p:nvPr>
+            <p:ph type="subTitle" idx="1"/>
+          </p:nvPr>
+        </p:nvSpPr>
+        <p:spPr>
+          <a:xfrm>
+            <a:off x="2133600" y="2819400"/>
+            <a:ext cx="6560234" cy="1752600"/>
+          </a:xfrm>
+        </p:spPr>
+        <p:txBody>
+          <a:bodyPr lIns="45720" rIns="246888"/>
+          <a:lstStyle>
+            <a:lvl1pPr marL="0" indent="0" algn="r">
               <a:spcBef>
-                <a:spcPct val="0"/>
+                <a:spcPts val="0"/>
               </a:spcBef>
               <a:buNone/>
-              <a:defRPr sz="5600" b="1">
-                <a:ln>
-                  <a:noFill/>
-                </a:ln>
-                <a:solidFill>
-                  <a:schemeClr val="accent3">
-                    <a:tint val="90000"/>
-                    <a:satMod val="120000"/>
-                  </a:schemeClr>
-                </a:solidFill>
-                <a:effectLst>
-                  <a:outerShdw blurRad="38100" dist="25400" dir="5400000" algn="tl" rotWithShape="0">
-                    <a:srgbClr val="000000">
-                      <a:alpha val="43000"/>
-                    </a:srgbClr>
-                  </a:outerShdw>
-                </a:effectLst>
-                <a:latin typeface="+mj-lt"/>
-                <a:ea typeface="+mj-ea"/>
-                <a:cs typeface="+mj-cs"/>
-              </a:defRPr>
-            </a:lvl1pPr>
-          </a:lstStyle>
-          <a:p>
-            <a:r>
-              <a:rPr kumimoji="0" lang="en-US" smtClean="0"/>
-              <a:t>Click to edit Master title style</a:t>
-            </a:r>
-            <a:endParaRPr kumimoji="0" lang="en-US"/>
-          </a:p>
-        </p:txBody>
-      </p:sp>
-      <p:sp>
-        <p:nvSpPr>
-          <p:cNvPr id="17" name="Subtitle 16"/>
-          <p:cNvSpPr>
-            <a:spLocks noGrp="1"/>
-          </p:cNvSpPr>
-          <p:nvPr>
-            <p:ph type="subTitle" idx="1"/>
-          </p:nvPr>
-        </p:nvSpPr>
-        <p:spPr>
-          <a:xfrm>
-            <a:off x="533400" y="3228536"/>
-            <a:ext cx="7854696" cy="1752600"/>
-          </a:xfrm>
-        </p:spPr>
-        <p:txBody>
-          <a:bodyPr lIns="0" rIns="18288"/>
-          <a:lstStyle>
-            <a:lvl1pPr marL="0" marR="45720" indent="0" algn="r">
-              <a:buNone/>
               <a:defRPr>
-                <a:solidFill>
-                  <a:schemeClr val="tx1"/>
-                </a:solidFill>
+                <a:effectLst/>
               </a:defRPr>
             </a:lvl1pPr>
             <a:lvl2pPr marL="457200" indent="0" algn="ctr">
@@ -258,6 +284,7 @@
             <a:lvl9pPr marL="3657600" indent="0" algn="ctr">
               <a:buNone/>
             </a:lvl9pPr>
+            <a:extLst/>
           </a:lstStyle>
           <a:p>
             <a:r>
@@ -270,7 +297,7 @@
       </p:sp>
       <p:sp>
         <p:nvSpPr>
-          <p:cNvPr id="30" name="Date Placeholder 29"/>
+          <p:cNvPr id="10" name="Date Placeholder 9"/>
           <p:cNvSpPr>
             <a:spLocks noGrp="1"/>
           </p:cNvSpPr>
@@ -278,15 +305,22 @@
             <p:ph type="dt" sz="half" idx="10"/>
           </p:nvPr>
         </p:nvSpPr>
-        <p:spPr/>
-        <p:txBody>
-          <a:bodyPr/>
-          <a:lstStyle/>
+        <p:spPr>
+          <a:xfrm>
+            <a:off x="5562600" y="6509004"/>
+            <a:ext cx="3002280" cy="274320"/>
+          </a:xfrm>
+        </p:spPr>
+        <p:txBody>
+          <a:bodyPr vert="horz" rtlCol="0"/>
+          <a:lstStyle>
+            <a:extLst/>
+          </a:lstStyle>
           <a:p>
             <a:fld id="{542ED6D8-967B-4FDD-8539-23116DD8CE38}" type="datetimeFigureOut">
               <a:rPr lang="en-US" smtClean="0"/>
               <a:pPr/>
-              <a:t>10/13/2014</a:t>
+              <a:t>10/14/2014</a:t>
             </a:fld>
             <a:endParaRPr lang="en-US"/>
           </a:p>
@@ -294,37 +328,34 @@
       </p:sp>
       <p:sp>
         <p:nvSpPr>
-          <p:cNvPr id="19" name="Footer Placeholder 18"/>
-          <p:cNvSpPr>
-            <a:spLocks noGrp="1"/>
-          </p:cNvSpPr>
-          <p:nvPr>
-            <p:ph type="ftr" sz="quarter" idx="11"/>
-          </p:nvPr>
-        </p:nvSpPr>
-        <p:spPr/>
-        <p:txBody>
-          <a:bodyPr/>
-          <a:lstStyle/>
-          <a:p>
-            <a:endParaRPr lang="en-US"/>
-          </a:p>
-        </p:txBody>
-      </p:sp>
-      <p:sp>
-        <p:nvSpPr>
-          <p:cNvPr id="27" name="Slide Number Placeholder 26"/>
-          <p:cNvSpPr>
-            <a:spLocks noGrp="1"/>
-          </p:cNvSpPr>
-          <p:nvPr>
-            <p:ph type="sldNum" sz="quarter" idx="12"/>
-          </p:nvPr>
-        </p:nvSpPr>
-        <p:spPr/>
-        <p:txBody>
-          <a:bodyPr/>
-          <a:lstStyle/>
+          <p:cNvPr id="11" name="Slide Number Placeholder 10"/>
+          <p:cNvSpPr>
+            <a:spLocks noGrp="1"/>
+          </p:cNvSpPr>
+          <p:nvPr>
+            <p:ph type="sldNum" sz="quarter" idx="11"/>
+          </p:nvPr>
+        </p:nvSpPr>
+        <p:spPr>
+          <a:xfrm>
+            <a:off x="8638952" y="6509004"/>
+            <a:ext cx="464288" cy="274320"/>
+          </a:xfrm>
+        </p:spPr>
+        <p:txBody>
+          <a:bodyPr vert="horz" rtlCol="0"/>
+          <a:lstStyle>
+            <a:lvl1pPr>
+              <a:defRPr>
+                <a:solidFill>
+                  <a:schemeClr val="tx2">
+                    <a:shade val="90000"/>
+                  </a:schemeClr>
+                </a:solidFill>
+              </a:defRPr>
+            </a:lvl1pPr>
+            <a:extLst/>
+          </a:lstStyle>
           <a:p>
             <a:fld id="{9AF68AB6-DD62-4065-9EF9-D7CEDA1C3581}" type="slidenum">
               <a:rPr lang="en-US" smtClean="0"/>
@@ -335,10 +366,36 @@
           </a:p>
         </p:txBody>
       </p:sp>
+      <p:sp>
+        <p:nvSpPr>
+          <p:cNvPr id="12" name="Footer Placeholder 11"/>
+          <p:cNvSpPr>
+            <a:spLocks noGrp="1"/>
+          </p:cNvSpPr>
+          <p:nvPr>
+            <p:ph type="ftr" sz="quarter" idx="12"/>
+          </p:nvPr>
+        </p:nvSpPr>
+        <p:spPr>
+          <a:xfrm>
+            <a:off x="1600200" y="6509004"/>
+            <a:ext cx="3907464" cy="274320"/>
+          </a:xfrm>
+        </p:spPr>
+        <p:txBody>
+          <a:bodyPr vert="horz" rtlCol="0"/>
+          <a:lstStyle>
+            <a:extLst/>
+          </a:lstStyle>
+          <a:p>
+            <a:endParaRPr lang="en-US"/>
+          </a:p>
+        </p:txBody>
+      </p:sp>
     </p:spTree>
   </p:cSld>
   <p:clrMapOvr>
-    <a:overrideClrMapping bg1="dk1" tx1="lt1" bg2="dk2" tx2="lt2" accent1="accent1" accent2="accent2" accent3="accent3" accent4="accent4" accent5="accent5" accent6="accent6" hlink="hlink" folHlink="folHlink"/>
+    <a:masterClrMapping/>
   </p:clrMapOvr>
 </p:sldLayout>
 </file>
@@ -373,7 +430,9 @@
         <p:spPr/>
         <p:txBody>
           <a:bodyPr/>
-          <a:lstStyle/>
+          <a:lstStyle>
+            <a:extLst/>
+          </a:lstStyle>
           <a:p>
             <a:r>
               <a:rPr kumimoji="0" lang="en-US" smtClean="0"/>
@@ -396,7 +455,9 @@
         <p:spPr/>
         <p:txBody>
           <a:bodyPr vert="eaVert"/>
-          <a:lstStyle/>
+          <a:lstStyle>
+            <a:extLst/>
+          </a:lstStyle>
           <a:p>
             <a:pPr lvl="0" eaLnBrk="1" latinLnBrk="0" hangingPunct="1"/>
             <a:r>
@@ -448,12 +509,14 @@
         <p:spPr/>
         <p:txBody>
           <a:bodyPr/>
-          <a:lstStyle/>
+          <a:lstStyle>
+            <a:extLst/>
+          </a:lstStyle>
           <a:p>
             <a:fld id="{542ED6D8-967B-4FDD-8539-23116DD8CE38}" type="datetimeFigureOut">
               <a:rPr lang="en-US" smtClean="0"/>
               <a:pPr/>
-              <a:t>10/13/2014</a:t>
+              <a:t>10/14/2014</a:t>
             </a:fld>
             <a:endParaRPr lang="en-US"/>
           </a:p>
@@ -472,7 +535,9 @@
         <p:spPr/>
         <p:txBody>
           <a:bodyPr/>
-          <a:lstStyle/>
+          <a:lstStyle>
+            <a:extLst/>
+          </a:lstStyle>
           <a:p>
             <a:endParaRPr lang="en-US"/>
           </a:p>
@@ -491,7 +556,9 @@
         <p:spPr/>
         <p:txBody>
           <a:bodyPr/>
-          <a:lstStyle/>
+          <a:lstStyle>
+            <a:extLst/>
+          </a:lstStyle>
           <a:p>
             <a:fld id="{9AF68AB6-DD62-4065-9EF9-D7CEDA1C3581}" type="slidenum">
               <a:rPr lang="en-US" smtClean="0"/>
@@ -539,13 +606,18 @@
         </p:nvSpPr>
         <p:spPr>
           <a:xfrm>
-            <a:off x="6629400" y="914401"/>
-            <a:ext cx="2057400" cy="5211763"/>
+            <a:off x="6629400" y="274638"/>
+            <a:ext cx="2057400" cy="5851525"/>
           </a:xfrm>
         </p:spPr>
         <p:txBody>
           <a:bodyPr vert="eaVert"/>
-          <a:lstStyle/>
+          <a:lstStyle>
+            <a:lvl1pPr algn="l">
+              <a:defRPr/>
+            </a:lvl1pPr>
+            <a:extLst/>
+          </a:lstStyle>
           <a:p>
             <a:r>
               <a:rPr kumimoji="0" lang="en-US" smtClean="0"/>
@@ -567,13 +639,15 @@
         </p:nvSpPr>
         <p:spPr>
           <a:xfrm>
-            <a:off x="457200" y="914401"/>
-            <a:ext cx="6019800" cy="5211763"/>
+            <a:off x="457200" y="274638"/>
+            <a:ext cx="6019800" cy="5851525"/>
           </a:xfrm>
         </p:spPr>
         <p:txBody>
           <a:bodyPr vert="eaVert"/>
-          <a:lstStyle/>
+          <a:lstStyle>
+            <a:extLst/>
+          </a:lstStyle>
           <a:p>
             <a:pPr lvl="0" eaLnBrk="1" latinLnBrk="0" hangingPunct="1"/>
             <a:r>
@@ -625,12 +699,14 @@
         <p:spPr/>
         <p:txBody>
           <a:bodyPr/>
-          <a:lstStyle/>
+          <a:lstStyle>
+            <a:extLst/>
+          </a:lstStyle>
           <a:p>
             <a:fld id="{542ED6D8-967B-4FDD-8539-23116DD8CE38}" type="datetimeFigureOut">
               <a:rPr lang="en-US" smtClean="0"/>
               <a:pPr/>
-              <a:t>10/13/2014</a:t>
+              <a:t>10/14/2014</a:t>
             </a:fld>
             <a:endParaRPr lang="en-US"/>
           </a:p>
@@ -649,7 +725,9 @@
         <p:spPr/>
         <p:txBody>
           <a:bodyPr/>
-          <a:lstStyle/>
+          <a:lstStyle>
+            <a:extLst/>
+          </a:lstStyle>
           <a:p>
             <a:endParaRPr lang="en-US"/>
           </a:p>
@@ -668,7 +746,9 @@
         <p:spPr/>
         <p:txBody>
           <a:bodyPr/>
-          <a:lstStyle/>
+          <a:lstStyle>
+            <a:extLst/>
+          </a:lstStyle>
           <a:p>
             <a:fld id="{9AF68AB6-DD62-4065-9EF9-D7CEDA1C3581}" type="slidenum">
               <a:rPr lang="en-US" smtClean="0"/>
@@ -706,6 +786,60 @@
       </p:grpSpPr>
       <p:sp>
         <p:nvSpPr>
+          <p:cNvPr id="7" name="Rectangle 6"/>
+          <p:cNvSpPr/>
+          <p:nvPr/>
+        </p:nvSpPr>
+        <p:spPr>
+          <a:xfrm>
+            <a:off x="588392" y="1424588"/>
+            <a:ext cx="8001000" cy="9144"/>
+          </a:xfrm>
+          <a:prstGeom prst="rect">
+            <a:avLst/>
+          </a:prstGeom>
+          <a:solidFill>
+            <a:schemeClr val="accent1"/>
+          </a:solidFill>
+          <a:ln w="38100" cap="rnd" cmpd="sng" algn="ctr">
+            <a:noFill/>
+            <a:prstDash val="solid"/>
+          </a:ln>
+          <a:effectLst>
+            <a:outerShdw blurRad="12700" dist="12900" dir="5400000" algn="tl" rotWithShape="0">
+              <a:srgbClr val="000000">
+                <a:alpha val="75000"/>
+              </a:srgbClr>
+            </a:outerShdw>
+          </a:effectLst>
+        </p:spPr>
+        <p:style>
+          <a:lnRef idx="3">
+            <a:schemeClr val="lt1"/>
+          </a:lnRef>
+          <a:fillRef idx="1">
+            <a:schemeClr val="accent1"/>
+          </a:fillRef>
+          <a:effectRef idx="1">
+            <a:schemeClr val="accent1"/>
+          </a:effectRef>
+          <a:fontRef idx="minor">
+            <a:schemeClr val="lt1"/>
+          </a:fontRef>
+        </p:style>
+        <p:txBody>
+          <a:bodyPr anchor="ctr"/>
+          <a:lstStyle>
+            <a:extLst/>
+          </a:lstStyle>
+          <a:p>
+            <a:pPr algn="ctr" eaLnBrk="1" latinLnBrk="0" hangingPunct="1"/>
+            <a:endParaRPr kumimoji="0" lang="en-US"/>
+          </a:p>
+        </p:txBody>
+      </p:sp>
+      <p:sp>
+        <p:nvSpPr>
           <p:cNvPr id="2" name="Title 1"/>
           <p:cNvSpPr>
             <a:spLocks noGrp="1"/>
@@ -717,7 +851,9 @@
         <p:spPr/>
         <p:txBody>
           <a:bodyPr/>
-          <a:lstStyle/>
+          <a:lstStyle>
+            <a:extLst/>
+          </a:lstStyle>
           <a:p>
             <a:r>
               <a:rPr kumimoji="0" lang="en-US" smtClean="0"/>
@@ -740,7 +876,9 @@
         <p:spPr/>
         <p:txBody>
           <a:bodyPr/>
-          <a:lstStyle/>
+          <a:lstStyle>
+            <a:extLst/>
+          </a:lstStyle>
           <a:p>
             <a:pPr lvl="0" eaLnBrk="1" latinLnBrk="0" hangingPunct="1"/>
             <a:r>
@@ -792,12 +930,14 @@
         <p:spPr/>
         <p:txBody>
           <a:bodyPr/>
-          <a:lstStyle/>
+          <a:lstStyle>
+            <a:extLst/>
+          </a:lstStyle>
           <a:p>
             <a:fld id="{542ED6D8-967B-4FDD-8539-23116DD8CE38}" type="datetimeFigureOut">
               <a:rPr lang="en-US" smtClean="0"/>
               <a:pPr/>
-              <a:t>10/13/2014</a:t>
+              <a:t>10/14/2014</a:t>
             </a:fld>
             <a:endParaRPr lang="en-US"/>
           </a:p>
@@ -816,7 +956,9 @@
         <p:spPr/>
         <p:txBody>
           <a:bodyPr/>
-          <a:lstStyle/>
+          <a:lstStyle>
+            <a:extLst/>
+          </a:lstStyle>
           <a:p>
             <a:endParaRPr lang="en-US"/>
           </a:p>
@@ -835,7 +977,9 @@
         <p:spPr/>
         <p:txBody>
           <a:bodyPr/>
-          <a:lstStyle/>
+          <a:lstStyle>
+            <a:extLst/>
+          </a:lstStyle>
           <a:p>
             <a:fld id="{9AF68AB6-DD62-4065-9EF9-D7CEDA1C3581}" type="slidenum">
               <a:rPr lang="en-US" smtClean="0"/>
@@ -855,10 +999,10 @@
 </file>
 
 <file path=ppt/slideLayouts/slideLayout3.xml><?xml version="1.0" encoding="utf-8"?>
-<p:sldLayout xmlns:a="http://schemas.openxmlformats.org/drawingml/2006/main" xmlns:r="http://schemas.openxmlformats.org/officeDocument/2006/relationships" xmlns:p="http://schemas.openxmlformats.org/presentationml/2006/main" type="secHead" preserve="1">
+<p:sldLayout xmlns:a="http://schemas.openxmlformats.org/drawingml/2006/main" xmlns:r="http://schemas.openxmlformats.org/officeDocument/2006/relationships" xmlns:p="http://schemas.openxmlformats.org/presentationml/2006/main" showMasterSp="0" type="secHead" preserve="1">
   <p:cSld name="Section Header">
     <p:bg>
-      <p:bgRef idx="1002">
+      <p:bgRef idx="1001">
         <a:schemeClr val="bg2"/>
       </p:bgRef>
     </p:bg>
@@ -878,6 +1022,60 @@
       </p:grpSpPr>
       <p:sp>
         <p:nvSpPr>
+          <p:cNvPr id="7" name="Rectangle 6"/>
+          <p:cNvSpPr/>
+          <p:nvPr/>
+        </p:nvSpPr>
+        <p:spPr>
+          <a:xfrm>
+            <a:off x="1000128" y="3267456"/>
+            <a:ext cx="7406640" cy="9144"/>
+          </a:xfrm>
+          <a:prstGeom prst="rect">
+            <a:avLst/>
+          </a:prstGeom>
+          <a:solidFill>
+            <a:schemeClr val="accent1"/>
+          </a:solidFill>
+          <a:ln w="38100" cap="rnd" cmpd="sng" algn="ctr">
+            <a:noFill/>
+            <a:prstDash val="solid"/>
+          </a:ln>
+          <a:effectLst>
+            <a:outerShdw blurRad="12700" dist="12900" dir="5400000" algn="tl" rotWithShape="0">
+              <a:srgbClr val="000000">
+                <a:alpha val="75000"/>
+              </a:srgbClr>
+            </a:outerShdw>
+          </a:effectLst>
+        </p:spPr>
+        <p:style>
+          <a:lnRef idx="3">
+            <a:schemeClr val="lt1"/>
+          </a:lnRef>
+          <a:fillRef idx="1">
+            <a:schemeClr val="accent1"/>
+          </a:fillRef>
+          <a:effectRef idx="1">
+            <a:schemeClr val="accent1"/>
+          </a:effectRef>
+          <a:fontRef idx="minor">
+            <a:schemeClr val="lt1"/>
+          </a:fontRef>
+        </p:style>
+        <p:txBody>
+          <a:bodyPr anchor="ctr"/>
+          <a:lstStyle>
+            <a:extLst/>
+          </a:lstStyle>
+          <a:p>
+            <a:pPr algn="ctr" eaLnBrk="1" latinLnBrk="0" hangingPunct="1"/>
+            <a:endParaRPr kumimoji="0" lang="en-US"/>
+          </a:p>
+        </p:txBody>
+      </p:sp>
+      <p:sp>
+        <p:nvSpPr>
           <p:cNvPr id="2" name="Title 1"/>
           <p:cNvSpPr>
             <a:spLocks noGrp="1"/>
@@ -888,54 +1086,25 @@
         </p:nvSpPr>
         <p:spPr>
           <a:xfrm>
-            <a:off x="530352" y="1316736"/>
-            <a:ext cx="7772400" cy="1362456"/>
-          </a:xfrm>
-          <a:ln>
-            <a:noFill/>
-          </a:ln>
-        </p:spPr>
-        <p:txBody>
-          <a:bodyPr vert="horz" tIns="0" bIns="0" anchor="b">
-            <a:noAutofit/>
-            <a:scene3d>
-              <a:camera prst="orthographicFront"/>
-              <a:lightRig rig="freezing" dir="t">
-                <a:rot lat="0" lon="0" rev="5640000"/>
-              </a:lightRig>
-            </a:scene3d>
-            <a:sp3d prstMaterial="flat">
-              <a:bevelT w="38100" h="38100"/>
-            </a:sp3d>
-          </a:bodyPr>
-          <a:lstStyle>
-            <a:lvl1pPr algn="l" rtl="0">
-              <a:spcBef>
-                <a:spcPct val="0"/>
-              </a:spcBef>
+            <a:off x="722376" y="498230"/>
+            <a:ext cx="7772400" cy="2731008"/>
+          </a:xfrm>
+        </p:spPr>
+        <p:txBody>
+          <a:bodyPr rIns="100584"/>
+          <a:lstStyle>
+            <a:lvl1pPr algn="r">
               <a:buNone/>
-              <a:defRPr lang="en-US" sz="5600" b="1" cap="none" baseline="0" dirty="0">
-                <a:ln w="635">
-                  <a:noFill/>
-                </a:ln>
+              <a:defRPr sz="4000" b="1" cap="none">
                 <a:solidFill>
-                  <a:schemeClr val="accent4">
-                    <a:tint val="90000"/>
-                    <a:satMod val="125000"/>
+                  <a:schemeClr val="accent1">
+                    <a:tint val="95000"/>
+                    <a:satMod val="200000"/>
                   </a:schemeClr>
                 </a:solidFill>
-                <a:effectLst>
-                  <a:outerShdw blurRad="38100" dist="25400" dir="5400000" algn="tl" rotWithShape="0">
-                    <a:srgbClr val="000000">
-                      <a:alpha val="43000"/>
-                    </a:srgbClr>
-                  </a:outerShdw>
-                </a:effectLst>
-                <a:latin typeface="+mj-lt"/>
-                <a:ea typeface="+mj-ea"/>
-                <a:cs typeface="+mj-cs"/>
               </a:defRPr>
             </a:lvl1pPr>
+            <a:extLst/>
           </a:lstStyle>
           <a:p>
             <a:r>
@@ -958,18 +1127,20 @@
         </p:nvSpPr>
         <p:spPr>
           <a:xfrm>
-            <a:off x="530352" y="2704664"/>
+            <a:off x="722313" y="3287713"/>
             <a:ext cx="7772400" cy="1509712"/>
           </a:xfrm>
         </p:spPr>
         <p:txBody>
-          <a:bodyPr lIns="45720" rIns="45720" anchor="t"/>
-          <a:lstStyle>
-            <a:lvl1pPr marL="0" indent="0">
+          <a:bodyPr rIns="128016" anchor="t"/>
+          <a:lstStyle>
+            <a:lvl1pPr marL="0" indent="0" algn="r">
               <a:buNone/>
-              <a:defRPr sz="2200">
+              <a:defRPr sz="2000">
                 <a:solidFill>
-                  <a:schemeClr val="tx1"/>
+                  <a:schemeClr val="tx1">
+                    <a:tint val="75000"/>
+                  </a:schemeClr>
                 </a:solidFill>
               </a:defRPr>
             </a:lvl1pPr>
@@ -1013,6 +1184,7 @@
                 </a:solidFill>
               </a:defRPr>
             </a:lvl5pPr>
+            <a:extLst/>
           </a:lstStyle>
           <a:p>
             <a:pPr lvl="0" eaLnBrk="1" latinLnBrk="0" hangingPunct="1"/>
@@ -1025,7 +1197,7 @@
       </p:sp>
       <p:sp>
         <p:nvSpPr>
-          <p:cNvPr id="4" name="Date Placeholder 3"/>
+          <p:cNvPr id="8" name="Date Placeholder 7"/>
           <p:cNvSpPr>
             <a:spLocks noGrp="1"/>
           </p:cNvSpPr>
@@ -1033,15 +1205,22 @@
             <p:ph type="dt" sz="half" idx="10"/>
           </p:nvPr>
         </p:nvSpPr>
-        <p:spPr/>
-        <p:txBody>
-          <a:bodyPr/>
-          <a:lstStyle/>
+        <p:spPr>
+          <a:xfrm>
+            <a:off x="5562600" y="6513670"/>
+            <a:ext cx="3002280" cy="274320"/>
+          </a:xfrm>
+        </p:spPr>
+        <p:txBody>
+          <a:bodyPr vert="horz" rtlCol="0"/>
+          <a:lstStyle>
+            <a:extLst/>
+          </a:lstStyle>
           <a:p>
             <a:fld id="{542ED6D8-967B-4FDD-8539-23116DD8CE38}" type="datetimeFigureOut">
               <a:rPr lang="en-US" smtClean="0"/>
               <a:pPr/>
-              <a:t>10/13/2014</a:t>
+              <a:t>10/14/2014</a:t>
             </a:fld>
             <a:endParaRPr lang="en-US"/>
           </a:p>
@@ -1049,43 +1228,66 @@
       </p:sp>
       <p:sp>
         <p:nvSpPr>
-          <p:cNvPr id="5" name="Footer Placeholder 4"/>
-          <p:cNvSpPr>
-            <a:spLocks noGrp="1"/>
-          </p:cNvSpPr>
-          <p:nvPr>
-            <p:ph type="ftr" sz="quarter" idx="11"/>
-          </p:nvPr>
-        </p:nvSpPr>
-        <p:spPr/>
-        <p:txBody>
-          <a:bodyPr/>
-          <a:lstStyle/>
-          <a:p>
-            <a:endParaRPr lang="en-US"/>
-          </a:p>
-        </p:txBody>
-      </p:sp>
-      <p:sp>
-        <p:nvSpPr>
-          <p:cNvPr id="6" name="Slide Number Placeholder 5"/>
-          <p:cNvSpPr>
-            <a:spLocks noGrp="1"/>
-          </p:cNvSpPr>
-          <p:nvPr>
-            <p:ph type="sldNum" sz="quarter" idx="12"/>
-          </p:nvPr>
-        </p:nvSpPr>
-        <p:spPr/>
-        <p:txBody>
-          <a:bodyPr/>
-          <a:lstStyle/>
+          <p:cNvPr id="9" name="Slide Number Placeholder 8"/>
+          <p:cNvSpPr>
+            <a:spLocks noGrp="1"/>
+          </p:cNvSpPr>
+          <p:nvPr>
+            <p:ph type="sldNum" sz="quarter" idx="11"/>
+          </p:nvPr>
+        </p:nvSpPr>
+        <p:spPr>
+          <a:xfrm>
+            <a:off x="8638952" y="6513670"/>
+            <a:ext cx="464288" cy="274320"/>
+          </a:xfrm>
+        </p:spPr>
+        <p:txBody>
+          <a:bodyPr vert="horz" rtlCol="0"/>
+          <a:lstStyle>
+            <a:lvl1pPr>
+              <a:defRPr>
+                <a:solidFill>
+                  <a:schemeClr val="tx2">
+                    <a:shade val="90000"/>
+                  </a:schemeClr>
+                </a:solidFill>
+              </a:defRPr>
+            </a:lvl1pPr>
+            <a:extLst/>
+          </a:lstStyle>
           <a:p>
             <a:fld id="{9AF68AB6-DD62-4065-9EF9-D7CEDA1C3581}" type="slidenum">
               <a:rPr lang="en-US" smtClean="0"/>
               <a:pPr/>
               <a:t>‹#›</a:t>
             </a:fld>
+            <a:endParaRPr lang="en-US"/>
+          </a:p>
+        </p:txBody>
+      </p:sp>
+      <p:sp>
+        <p:nvSpPr>
+          <p:cNvPr id="10" name="Footer Placeholder 9"/>
+          <p:cNvSpPr>
+            <a:spLocks noGrp="1"/>
+          </p:cNvSpPr>
+          <p:nvPr>
+            <p:ph type="ftr" sz="quarter" idx="12"/>
+          </p:nvPr>
+        </p:nvSpPr>
+        <p:spPr>
+          <a:xfrm>
+            <a:off x="1600200" y="6513670"/>
+            <a:ext cx="3907464" cy="274320"/>
+          </a:xfrm>
+        </p:spPr>
+        <p:txBody>
+          <a:bodyPr vert="horz" rtlCol="0"/>
+          <a:lstStyle>
+            <a:extLst/>
+          </a:lstStyle>
+          <a:p>
             <a:endParaRPr lang="en-US"/>
           </a:p>
         </p:txBody>
@@ -1125,15 +1327,12 @@
             <p:ph type="title"/>
           </p:nvPr>
         </p:nvSpPr>
-        <p:spPr>
-          <a:xfrm>
-            <a:off x="457200" y="704088"/>
-            <a:ext cx="8229600" cy="1143000"/>
-          </a:xfrm>
-        </p:spPr>
+        <p:spPr/>
         <p:txBody>
           <a:bodyPr/>
-          <a:lstStyle/>
+          <a:lstStyle>
+            <a:extLst/>
+          </a:lstStyle>
           <a:p>
             <a:r>
               <a:rPr kumimoji="0" lang="en-US" smtClean="0"/>
@@ -1155,15 +1354,15 @@
         </p:nvSpPr>
         <p:spPr>
           <a:xfrm>
-            <a:off x="457200" y="1920085"/>
-            <a:ext cx="4038600" cy="4434840"/>
+            <a:off x="457200" y="1645920"/>
+            <a:ext cx="4038600" cy="4526280"/>
           </a:xfrm>
         </p:spPr>
         <p:txBody>
           <a:bodyPr/>
           <a:lstStyle>
             <a:lvl1pPr>
-              <a:defRPr sz="2600"/>
+              <a:defRPr sz="2800"/>
             </a:lvl1pPr>
             <a:lvl2pPr>
               <a:defRPr sz="2400"/>
@@ -1177,6 +1376,7 @@
             <a:lvl5pPr>
               <a:defRPr sz="1800"/>
             </a:lvl5pPr>
+            <a:extLst/>
           </a:lstStyle>
           <a:p>
             <a:pPr lvl="0" eaLnBrk="1" latinLnBrk="0" hangingPunct="1"/>
@@ -1228,15 +1428,15 @@
         </p:nvSpPr>
         <p:spPr>
           <a:xfrm>
-            <a:off x="4648200" y="1920085"/>
-            <a:ext cx="4038600" cy="4434840"/>
+            <a:off x="4648200" y="1645920"/>
+            <a:ext cx="4038600" cy="4526280"/>
           </a:xfrm>
         </p:spPr>
         <p:txBody>
           <a:bodyPr/>
           <a:lstStyle>
             <a:lvl1pPr>
-              <a:defRPr sz="2600"/>
+              <a:defRPr sz="2800"/>
             </a:lvl1pPr>
             <a:lvl2pPr>
               <a:defRPr sz="2400"/>
@@ -1250,6 +1450,7 @@
             <a:lvl5pPr>
               <a:defRPr sz="1800"/>
             </a:lvl5pPr>
+            <a:extLst/>
           </a:lstStyle>
           <a:p>
             <a:pPr lvl="0" eaLnBrk="1" latinLnBrk="0" hangingPunct="1"/>
@@ -1302,12 +1503,14 @@
         <p:spPr/>
         <p:txBody>
           <a:bodyPr/>
-          <a:lstStyle/>
+          <a:lstStyle>
+            <a:extLst/>
+          </a:lstStyle>
           <a:p>
             <a:fld id="{542ED6D8-967B-4FDD-8539-23116DD8CE38}" type="datetimeFigureOut">
               <a:rPr lang="en-US" smtClean="0"/>
               <a:pPr/>
-              <a:t>10/13/2014</a:t>
+              <a:t>10/14/2014</a:t>
             </a:fld>
             <a:endParaRPr lang="en-US"/>
           </a:p>
@@ -1326,7 +1529,9 @@
         <p:spPr/>
         <p:txBody>
           <a:bodyPr/>
-          <a:lstStyle/>
+          <a:lstStyle>
+            <a:extLst/>
+          </a:lstStyle>
           <a:p>
             <a:endParaRPr lang="en-US"/>
           </a:p>
@@ -1342,10 +1547,17 @@
             <p:ph type="sldNum" sz="quarter" idx="12"/>
           </p:nvPr>
         </p:nvSpPr>
-        <p:spPr/>
+        <p:spPr>
+          <a:xfrm>
+            <a:off x="8641080" y="6514568"/>
+            <a:ext cx="464288" cy="274320"/>
+          </a:xfrm>
+        </p:spPr>
         <p:txBody>
           <a:bodyPr/>
-          <a:lstStyle/>
+          <a:lstStyle>
+            <a:extLst/>
+          </a:lstStyle>
           <a:p>
             <a:fld id="{9AF68AB6-DD62-4065-9EF9-D7CEDA1C3581}" type="slidenum">
               <a:rPr lang="en-US" smtClean="0"/>
@@ -1353,6 +1565,60 @@
               <a:t>‹#›</a:t>
             </a:fld>
             <a:endParaRPr lang="en-US"/>
+          </a:p>
+        </p:txBody>
+      </p:sp>
+      <p:sp>
+        <p:nvSpPr>
+          <p:cNvPr id="10" name="Rectangle 9"/>
+          <p:cNvSpPr/>
+          <p:nvPr/>
+        </p:nvSpPr>
+        <p:spPr>
+          <a:xfrm>
+            <a:off x="588392" y="1424588"/>
+            <a:ext cx="8001000" cy="9144"/>
+          </a:xfrm>
+          <a:prstGeom prst="rect">
+            <a:avLst/>
+          </a:prstGeom>
+          <a:solidFill>
+            <a:schemeClr val="accent1"/>
+          </a:solidFill>
+          <a:ln w="38100" cap="rnd" cmpd="sng" algn="ctr">
+            <a:noFill/>
+            <a:prstDash val="solid"/>
+          </a:ln>
+          <a:effectLst>
+            <a:outerShdw blurRad="12700" dist="12900" dir="5400000" algn="tl" rotWithShape="0">
+              <a:srgbClr val="000000">
+                <a:alpha val="75000"/>
+              </a:srgbClr>
+            </a:outerShdw>
+          </a:effectLst>
+        </p:spPr>
+        <p:style>
+          <a:lnRef idx="3">
+            <a:schemeClr val="lt1"/>
+          </a:lnRef>
+          <a:fillRef idx="1">
+            <a:schemeClr val="accent1"/>
+          </a:fillRef>
+          <a:effectRef idx="1">
+            <a:schemeClr val="accent1"/>
+          </a:effectRef>
+          <a:fontRef idx="minor">
+            <a:schemeClr val="lt1"/>
+          </a:fontRef>
+        </p:style>
+        <p:txBody>
+          <a:bodyPr anchor="ctr"/>
+          <a:lstStyle>
+            <a:extLst/>
+          </a:lstStyle>
+          <a:p>
+            <a:pPr algn="ctr" eaLnBrk="1" latinLnBrk="0" hangingPunct="1"/>
+            <a:endParaRPr kumimoji="0" lang="en-US"/>
           </a:p>
         </p:txBody>
       </p:sp>
@@ -1383,6 +1649,114 @@
       </p:grpSpPr>
       <p:sp>
         <p:nvSpPr>
+          <p:cNvPr id="10" name="Rectangle 9"/>
+          <p:cNvSpPr/>
+          <p:nvPr/>
+        </p:nvSpPr>
+        <p:spPr>
+          <a:xfrm>
+            <a:off x="616744" y="2165216"/>
+            <a:ext cx="3749040" cy="9144"/>
+          </a:xfrm>
+          <a:prstGeom prst="rect">
+            <a:avLst/>
+          </a:prstGeom>
+          <a:solidFill>
+            <a:schemeClr val="accent1"/>
+          </a:solidFill>
+          <a:ln w="38100" cap="rnd" cmpd="sng" algn="ctr">
+            <a:noFill/>
+            <a:prstDash val="solid"/>
+          </a:ln>
+          <a:effectLst>
+            <a:outerShdw blurRad="12700" dist="12900" dir="5400000" algn="tl" rotWithShape="0">
+              <a:srgbClr val="000000">
+                <a:alpha val="75000"/>
+              </a:srgbClr>
+            </a:outerShdw>
+          </a:effectLst>
+        </p:spPr>
+        <p:style>
+          <a:lnRef idx="3">
+            <a:schemeClr val="lt1"/>
+          </a:lnRef>
+          <a:fillRef idx="1">
+            <a:schemeClr val="accent1"/>
+          </a:fillRef>
+          <a:effectRef idx="1">
+            <a:schemeClr val="accent1"/>
+          </a:effectRef>
+          <a:fontRef idx="minor">
+            <a:schemeClr val="lt1"/>
+          </a:fontRef>
+        </p:style>
+        <p:txBody>
+          <a:bodyPr anchor="b"/>
+          <a:lstStyle>
+            <a:extLst/>
+          </a:lstStyle>
+          <a:p>
+            <a:pPr algn="ctr" eaLnBrk="1" latinLnBrk="0" hangingPunct="1"/>
+            <a:endParaRPr kumimoji="0" lang="en-US"/>
+          </a:p>
+        </p:txBody>
+      </p:sp>
+      <p:sp>
+        <p:nvSpPr>
+          <p:cNvPr id="11" name="Rectangle 10"/>
+          <p:cNvSpPr/>
+          <p:nvPr/>
+        </p:nvSpPr>
+        <p:spPr>
+          <a:xfrm>
+            <a:off x="4800600" y="2165216"/>
+            <a:ext cx="3749040" cy="9144"/>
+          </a:xfrm>
+          <a:prstGeom prst="rect">
+            <a:avLst/>
+          </a:prstGeom>
+          <a:solidFill>
+            <a:schemeClr val="accent1"/>
+          </a:solidFill>
+          <a:ln w="38100" cap="rnd" cmpd="sng" algn="ctr">
+            <a:noFill/>
+            <a:prstDash val="solid"/>
+          </a:ln>
+          <a:effectLst>
+            <a:outerShdw blurRad="12700" dist="12900" dir="5400000" algn="tl" rotWithShape="0">
+              <a:srgbClr val="000000">
+                <a:alpha val="75000"/>
+              </a:srgbClr>
+            </a:outerShdw>
+          </a:effectLst>
+        </p:spPr>
+        <p:style>
+          <a:lnRef idx="3">
+            <a:schemeClr val="lt1"/>
+          </a:lnRef>
+          <a:fillRef idx="1">
+            <a:schemeClr val="accent1"/>
+          </a:fillRef>
+          <a:effectRef idx="1">
+            <a:schemeClr val="accent1"/>
+          </a:effectRef>
+          <a:fontRef idx="minor">
+            <a:schemeClr val="lt1"/>
+          </a:fontRef>
+        </p:style>
+        <p:txBody>
+          <a:bodyPr anchor="b"/>
+          <a:lstStyle>
+            <a:extLst/>
+          </a:lstStyle>
+          <a:p>
+            <a:pPr algn="ctr" eaLnBrk="1" latinLnBrk="0" hangingPunct="1"/>
+            <a:endParaRPr kumimoji="0" lang="en-US"/>
+          </a:p>
+        </p:txBody>
+      </p:sp>
+      <p:sp>
+        <p:nvSpPr>
           <p:cNvPr id="2" name="Title 1"/>
           <p:cNvSpPr>
             <a:spLocks noGrp="1"/>
@@ -1393,16 +1767,17 @@
         </p:nvSpPr>
         <p:spPr>
           <a:xfrm>
-            <a:off x="457200" y="704088"/>
+            <a:off x="457200" y="251948"/>
             <a:ext cx="8229600" cy="1143000"/>
           </a:xfrm>
         </p:spPr>
         <p:txBody>
-          <a:bodyPr tIns="45720" anchor="b"/>
+          <a:bodyPr anchor="b"/>
           <a:lstStyle>
             <a:lvl1pPr>
               <a:defRPr/>
             </a:lvl1pPr>
+            <a:extLst/>
           </a:lstStyle>
           <a:p>
             <a:r>
@@ -1425,23 +1800,21 @@
         </p:nvSpPr>
         <p:spPr>
           <a:xfrm>
-            <a:off x="457200" y="1855248"/>
-            <a:ext cx="4040188" cy="659352"/>
-          </a:xfrm>
-        </p:spPr>
-        <p:txBody>
-          <a:bodyPr lIns="45720" tIns="0" rIns="45720" bIns="0" anchor="ctr">
+            <a:off x="457200" y="1535113"/>
+            <a:ext cx="4040188" cy="639762"/>
+          </a:xfrm>
+        </p:spPr>
+        <p:txBody>
+          <a:bodyPr anchor="b">
             <a:noAutofit/>
           </a:bodyPr>
           <a:lstStyle>
-            <a:lvl1pPr marL="0" indent="0">
+            <a:lvl1pPr marL="91440" indent="0" algn="l">
+              <a:spcBef>
+                <a:spcPts val="0"/>
+              </a:spcBef>
               <a:buNone/>
-              <a:defRPr sz="2400" b="1" cap="none" baseline="0">
-                <a:solidFill>
-                  <a:schemeClr val="tx2"/>
-                </a:solidFill>
-                <a:effectLst/>
-              </a:defRPr>
+              <a:defRPr sz="2200" b="0" cap="all" baseline="0"/>
             </a:lvl1pPr>
             <a:lvl2pPr>
               <a:buNone/>
@@ -1459,6 +1832,7 @@
               <a:buNone/>
               <a:defRPr sz="1600" b="1"/>
             </a:lvl5pPr>
+            <a:extLst/>
           </a:lstStyle>
           <a:p>
             <a:pPr lvl="0" eaLnBrk="1" latinLnBrk="0" hangingPunct="1"/>
@@ -1481,21 +1855,21 @@
         </p:nvSpPr>
         <p:spPr>
           <a:xfrm>
-            <a:off x="4645025" y="1859757"/>
-            <a:ext cx="4041775" cy="654843"/>
-          </a:xfrm>
-        </p:spPr>
-        <p:txBody>
-          <a:bodyPr lIns="45720" tIns="0" rIns="45720" bIns="0" anchor="ctr"/>
-          <a:lstStyle>
-            <a:lvl1pPr marL="0" indent="0">
+            <a:off x="4645025" y="1535113"/>
+            <a:ext cx="4041775" cy="639762"/>
+          </a:xfrm>
+        </p:spPr>
+        <p:txBody>
+          <a:bodyPr anchor="b">
+            <a:noAutofit/>
+          </a:bodyPr>
+          <a:lstStyle>
+            <a:lvl1pPr marL="91440" indent="0" algn="l">
+              <a:spcBef>
+                <a:spcPts val="0"/>
+              </a:spcBef>
               <a:buNone/>
-              <a:defRPr sz="2400" b="1" cap="none" baseline="0">
-                <a:solidFill>
-                  <a:schemeClr val="tx2"/>
-                </a:solidFill>
-                <a:effectLst/>
-              </a:defRPr>
+              <a:defRPr sz="2200" b="0" cap="all" baseline="0"/>
             </a:lvl1pPr>
             <a:lvl2pPr>
               <a:buNone/>
@@ -1513,6 +1887,7 @@
               <a:buNone/>
               <a:defRPr sz="1600" b="1"/>
             </a:lvl5pPr>
+            <a:extLst/>
           </a:lstStyle>
           <a:p>
             <a:pPr lvl="0" eaLnBrk="1" latinLnBrk="0" hangingPunct="1"/>
@@ -1535,12 +1910,12 @@
         </p:nvSpPr>
         <p:spPr>
           <a:xfrm>
-            <a:off x="457200" y="2514600"/>
-            <a:ext cx="4040188" cy="3845720"/>
-          </a:xfrm>
-        </p:spPr>
-        <p:txBody>
-          <a:bodyPr tIns="0"/>
+            <a:off x="457200" y="2362200"/>
+            <a:ext cx="4040188" cy="3941763"/>
+          </a:xfrm>
+        </p:spPr>
+        <p:txBody>
+          <a:bodyPr lIns="91440"/>
           <a:lstStyle>
             <a:lvl1pPr>
               <a:defRPr sz="2200"/>
@@ -1557,6 +1932,7 @@
             <a:lvl5pPr>
               <a:defRPr sz="1600"/>
             </a:lvl5pPr>
+            <a:extLst/>
           </a:lstStyle>
           <a:p>
             <a:pPr lvl="0" eaLnBrk="1" latinLnBrk="0" hangingPunct="1"/>
@@ -1608,12 +1984,12 @@
         </p:nvSpPr>
         <p:spPr>
           <a:xfrm>
-            <a:off x="4645025" y="2514600"/>
-            <a:ext cx="4041775" cy="3845720"/>
-          </a:xfrm>
-        </p:spPr>
-        <p:txBody>
-          <a:bodyPr tIns="0"/>
+            <a:off x="4645025" y="2362200"/>
+            <a:ext cx="4041775" cy="3941763"/>
+          </a:xfrm>
+        </p:spPr>
+        <p:txBody>
+          <a:bodyPr/>
           <a:lstStyle>
             <a:lvl1pPr>
               <a:defRPr sz="2200"/>
@@ -1630,6 +2006,7 @@
             <a:lvl5pPr>
               <a:defRPr sz="1600"/>
             </a:lvl5pPr>
+            <a:extLst/>
           </a:lstStyle>
           <a:p>
             <a:pPr lvl="0" eaLnBrk="1" latinLnBrk="0" hangingPunct="1"/>
@@ -1682,12 +2059,14 @@
         <p:spPr/>
         <p:txBody>
           <a:bodyPr/>
-          <a:lstStyle/>
+          <a:lstStyle>
+            <a:extLst/>
+          </a:lstStyle>
           <a:p>
             <a:fld id="{542ED6D8-967B-4FDD-8539-23116DD8CE38}" type="datetimeFigureOut">
               <a:rPr lang="en-US" smtClean="0"/>
               <a:pPr/>
-              <a:t>10/13/2014</a:t>
+              <a:t>10/14/2014</a:t>
             </a:fld>
             <a:endParaRPr lang="en-US"/>
           </a:p>
@@ -1706,7 +2085,9 @@
         <p:spPr/>
         <p:txBody>
           <a:bodyPr/>
-          <a:lstStyle/>
+          <a:lstStyle>
+            <a:extLst/>
+          </a:lstStyle>
           <a:p>
             <a:endParaRPr lang="en-US"/>
           </a:p>
@@ -1722,10 +2103,17 @@
             <p:ph type="sldNum" sz="quarter" idx="12"/>
           </p:nvPr>
         </p:nvSpPr>
-        <p:spPr/>
+        <p:spPr>
+          <a:xfrm>
+            <a:off x="8641080" y="6514568"/>
+            <a:ext cx="464288" cy="274320"/>
+          </a:xfrm>
+        </p:spPr>
         <p:txBody>
           <a:bodyPr/>
-          <a:lstStyle/>
+          <a:lstStyle>
+            <a:extLst/>
+          </a:lstStyle>
           <a:p>
             <a:fld id="{9AF68AB6-DD62-4065-9EF9-D7CEDA1C3581}" type="slidenum">
               <a:rPr lang="en-US" smtClean="0"/>
@@ -1773,44 +2161,14 @@
         </p:nvSpPr>
         <p:spPr>
           <a:xfrm>
-            <a:off x="457200" y="704088"/>
-            <a:ext cx="8305800" cy="1143000"/>
-          </a:xfrm>
-        </p:spPr>
-        <p:txBody>
-          <a:bodyPr vert="horz" tIns="45720" bIns="0" anchor="b">
-            <a:normAutofit/>
-            <a:scene3d>
-              <a:camera prst="orthographicFront"/>
-              <a:lightRig rig="freezing" dir="t">
-                <a:rot lat="0" lon="0" rev="5640000"/>
-              </a:lightRig>
-            </a:scene3d>
-            <a:sp3d prstMaterial="flat">
-              <a:contourClr>
-                <a:schemeClr val="tx2"/>
-              </a:contourClr>
-            </a:sp3d>
-          </a:bodyPr>
-          <a:lstStyle>
-            <a:lvl1pPr algn="l" rtl="0">
-              <a:spcBef>
-                <a:spcPct val="0"/>
-              </a:spcBef>
-              <a:buNone/>
-              <a:defRPr sz="5000" b="0">
-                <a:ln>
-                  <a:noFill/>
-                </a:ln>
-                <a:solidFill>
-                  <a:schemeClr val="tx2"/>
-                </a:solidFill>
-                <a:effectLst/>
-                <a:latin typeface="+mj-lt"/>
-                <a:ea typeface="+mj-ea"/>
-                <a:cs typeface="+mj-cs"/>
-              </a:defRPr>
-            </a:lvl1pPr>
+            <a:off x="457200" y="253218"/>
+            <a:ext cx="8229600" cy="1143000"/>
+          </a:xfrm>
+        </p:spPr>
+        <p:txBody>
+          <a:bodyPr/>
+          <a:lstStyle>
+            <a:extLst/>
           </a:lstStyle>
           <a:p>
             <a:r>
@@ -1834,12 +2192,14 @@
         <p:spPr/>
         <p:txBody>
           <a:bodyPr/>
-          <a:lstStyle/>
+          <a:lstStyle>
+            <a:extLst/>
+          </a:lstStyle>
           <a:p>
             <a:fld id="{542ED6D8-967B-4FDD-8539-23116DD8CE38}" type="datetimeFigureOut">
               <a:rPr lang="en-US" smtClean="0"/>
               <a:pPr/>
-              <a:t>10/13/2014</a:t>
+              <a:t>10/14/2014</a:t>
             </a:fld>
             <a:endParaRPr lang="en-US"/>
           </a:p>
@@ -1858,7 +2218,9 @@
         <p:spPr/>
         <p:txBody>
           <a:bodyPr/>
-          <a:lstStyle/>
+          <a:lstStyle>
+            <a:extLst/>
+          </a:lstStyle>
           <a:p>
             <a:endParaRPr lang="en-US"/>
           </a:p>
@@ -1877,7 +2239,9 @@
         <p:spPr/>
         <p:txBody>
           <a:bodyPr/>
-          <a:lstStyle/>
+          <a:lstStyle>
+            <a:extLst/>
+          </a:lstStyle>
           <a:p>
             <a:fld id="{9AF68AB6-DD62-4065-9EF9-D7CEDA1C3581}" type="slidenum">
               <a:rPr lang="en-US" smtClean="0"/>
@@ -1885,6 +2249,60 @@
               <a:t>‹#›</a:t>
             </a:fld>
             <a:endParaRPr lang="en-US"/>
+          </a:p>
+        </p:txBody>
+      </p:sp>
+      <p:sp>
+        <p:nvSpPr>
+          <p:cNvPr id="7" name="Rectangle 6"/>
+          <p:cNvSpPr/>
+          <p:nvPr/>
+        </p:nvSpPr>
+        <p:spPr>
+          <a:xfrm>
+            <a:off x="588392" y="1424588"/>
+            <a:ext cx="8001000" cy="9144"/>
+          </a:xfrm>
+          <a:prstGeom prst="rect">
+            <a:avLst/>
+          </a:prstGeom>
+          <a:solidFill>
+            <a:schemeClr val="accent1"/>
+          </a:solidFill>
+          <a:ln w="38100" cap="rnd" cmpd="sng" algn="ctr">
+            <a:noFill/>
+            <a:prstDash val="solid"/>
+          </a:ln>
+          <a:effectLst>
+            <a:outerShdw blurRad="12700" dist="12900" dir="5400000" algn="tl" rotWithShape="0">
+              <a:srgbClr val="000000">
+                <a:alpha val="75000"/>
+              </a:srgbClr>
+            </a:outerShdw>
+          </a:effectLst>
+        </p:spPr>
+        <p:style>
+          <a:lnRef idx="3">
+            <a:schemeClr val="lt1"/>
+          </a:lnRef>
+          <a:fillRef idx="1">
+            <a:schemeClr val="accent1"/>
+          </a:fillRef>
+          <a:effectRef idx="1">
+            <a:schemeClr val="accent1"/>
+          </a:effectRef>
+          <a:fontRef idx="minor">
+            <a:schemeClr val="lt1"/>
+          </a:fontRef>
+        </p:style>
+        <p:txBody>
+          <a:bodyPr anchor="ctr"/>
+          <a:lstStyle>
+            <a:extLst/>
+          </a:lstStyle>
+          <a:p>
+            <a:pPr algn="ctr" eaLnBrk="1" latinLnBrk="0" hangingPunct="1"/>
+            <a:endParaRPr kumimoji="0" lang="en-US"/>
           </a:p>
         </p:txBody>
       </p:sp>
@@ -1926,12 +2344,14 @@
         <p:spPr/>
         <p:txBody>
           <a:bodyPr/>
-          <a:lstStyle/>
+          <a:lstStyle>
+            <a:extLst/>
+          </a:lstStyle>
           <a:p>
             <a:fld id="{542ED6D8-967B-4FDD-8539-23116DD8CE38}" type="datetimeFigureOut">
               <a:rPr lang="en-US" smtClean="0"/>
               <a:pPr/>
-              <a:t>10/13/2014</a:t>
+              <a:t>10/14/2014</a:t>
             </a:fld>
             <a:endParaRPr lang="en-US"/>
           </a:p>
@@ -1950,7 +2370,9 @@
         <p:spPr/>
         <p:txBody>
           <a:bodyPr/>
-          <a:lstStyle/>
+          <a:lstStyle>
+            <a:extLst/>
+          </a:lstStyle>
           <a:p>
             <a:endParaRPr lang="en-US"/>
           </a:p>
@@ -1969,7 +2391,9 @@
         <p:spPr/>
         <p:txBody>
           <a:bodyPr/>
-          <a:lstStyle/>
+          <a:lstStyle>
+            <a:extLst/>
+          </a:lstStyle>
           <a:p>
             <a:fld id="{9AF68AB6-DD62-4065-9EF9-D7CEDA1C3581}" type="slidenum">
               <a:rPr lang="en-US" smtClean="0"/>
@@ -1989,8 +2413,13 @@
 </file>
 
 <file path=ppt/slideLayouts/slideLayout8.xml><?xml version="1.0" encoding="utf-8"?>
-<p:sldLayout xmlns:a="http://schemas.openxmlformats.org/drawingml/2006/main" xmlns:r="http://schemas.openxmlformats.org/officeDocument/2006/relationships" xmlns:p="http://schemas.openxmlformats.org/presentationml/2006/main" type="objTx" preserve="1">
+<p:sldLayout xmlns:a="http://schemas.openxmlformats.org/drawingml/2006/main" xmlns:r="http://schemas.openxmlformats.org/officeDocument/2006/relationships" xmlns:p="http://schemas.openxmlformats.org/presentationml/2006/main" showMasterSp="0" type="objTx" preserve="1">
   <p:cSld name="Content with Caption">
+    <p:bg>
+      <p:bgRef idx="1001">
+        <a:schemeClr val="bg2"/>
+      </p:bgRef>
+    </p:bg>
     <p:spTree>
       <p:nvGrpSpPr>
         <p:cNvPr id="1" name=""/>
@@ -2007,6 +2436,60 @@
       </p:grpSpPr>
       <p:sp>
         <p:nvSpPr>
+          <p:cNvPr id="8" name="Rectangle 7"/>
+          <p:cNvSpPr/>
+          <p:nvPr/>
+        </p:nvSpPr>
+        <p:spPr>
+          <a:xfrm>
+            <a:off x="5057552" y="1057656"/>
+            <a:ext cx="3749040" cy="9144"/>
+          </a:xfrm>
+          <a:prstGeom prst="rect">
+            <a:avLst/>
+          </a:prstGeom>
+          <a:solidFill>
+            <a:schemeClr val="accent1"/>
+          </a:solidFill>
+          <a:ln w="38100" cap="rnd" cmpd="sng" algn="ctr">
+            <a:noFill/>
+            <a:prstDash val="solid"/>
+          </a:ln>
+          <a:effectLst>
+            <a:outerShdw blurRad="12700" dist="12900" dir="5400000" algn="tl" rotWithShape="0">
+              <a:srgbClr val="000000">
+                <a:alpha val="75000"/>
+              </a:srgbClr>
+            </a:outerShdw>
+          </a:effectLst>
+        </p:spPr>
+        <p:style>
+          <a:lnRef idx="3">
+            <a:schemeClr val="lt1"/>
+          </a:lnRef>
+          <a:fillRef idx="1">
+            <a:schemeClr val="accent1"/>
+          </a:fillRef>
+          <a:effectRef idx="1">
+            <a:schemeClr val="accent1"/>
+          </a:effectRef>
+          <a:fontRef idx="minor">
+            <a:schemeClr val="lt1"/>
+          </a:fontRef>
+        </p:style>
+        <p:txBody>
+          <a:bodyPr anchor="ctr"/>
+          <a:lstStyle>
+            <a:extLst/>
+          </a:lstStyle>
+          <a:p>
+            <a:pPr algn="ctr" eaLnBrk="1" latinLnBrk="0" hangingPunct="1"/>
+            <a:endParaRPr kumimoji="0" lang="en-US"/>
+          </a:p>
+        </p:txBody>
+      </p:sp>
+      <p:sp>
+        <p:nvSpPr>
           <p:cNvPr id="2" name="Title 1"/>
           <p:cNvSpPr>
             <a:spLocks noGrp="1"/>
@@ -2017,33 +2500,18 @@
         </p:nvSpPr>
         <p:spPr>
           <a:xfrm>
-            <a:off x="685800" y="514352"/>
-            <a:ext cx="2743200" cy="1162050"/>
-          </a:xfrm>
-        </p:spPr>
-        <p:txBody>
-          <a:bodyPr lIns="0" anchor="b">
-            <a:noAutofit/>
-          </a:bodyPr>
-          <a:lstStyle>
-            <a:lvl1pPr algn="l" rtl="0">
-              <a:spcBef>
-                <a:spcPct val="0"/>
-              </a:spcBef>
+            <a:off x="4963136" y="304800"/>
+            <a:ext cx="3931920" cy="762000"/>
+          </a:xfrm>
+        </p:spPr>
+        <p:txBody>
+          <a:bodyPr anchor="b"/>
+          <a:lstStyle>
+            <a:lvl1pPr marL="0" algn="r">
               <a:buNone/>
-              <a:defRPr sz="2600" b="0">
-                <a:ln>
-                  <a:noFill/>
-                </a:ln>
-                <a:solidFill>
-                  <a:schemeClr val="tx2"/>
-                </a:solidFill>
-                <a:effectLst/>
-                <a:latin typeface="+mj-lt"/>
-                <a:ea typeface="+mj-ea"/>
-                <a:cs typeface="+mj-cs"/>
-              </a:defRPr>
+              <a:defRPr sz="2000" b="1"/>
             </a:lvl1pPr>
+            <a:extLst/>
           </a:lstStyle>
           <a:p>
             <a:r>
@@ -2066,33 +2534,37 @@
         </p:nvSpPr>
         <p:spPr>
           <a:xfrm>
-            <a:off x="685800" y="1676400"/>
-            <a:ext cx="2743200" cy="4572000"/>
-          </a:xfrm>
-        </p:spPr>
-        <p:txBody>
-          <a:bodyPr lIns="18288" rIns="18288"/>
-          <a:lstStyle>
-            <a:lvl1pPr marL="0" indent="0" algn="l">
+            <a:off x="4963136" y="1107560"/>
+            <a:ext cx="3931920" cy="1066800"/>
+          </a:xfrm>
+        </p:spPr>
+        <p:txBody>
+          <a:bodyPr/>
+          <a:lstStyle>
+            <a:lvl1pPr marL="0" indent="0" algn="r">
+              <a:spcBef>
+                <a:spcPts val="0"/>
+              </a:spcBef>
               <a:buNone/>
               <a:defRPr sz="1400"/>
             </a:lvl1pPr>
-            <a:lvl2pPr indent="0" algn="l">
+            <a:lvl2pPr>
               <a:buNone/>
               <a:defRPr sz="1200"/>
             </a:lvl2pPr>
-            <a:lvl3pPr indent="0" algn="l">
+            <a:lvl3pPr>
               <a:buNone/>
               <a:defRPr sz="1000"/>
             </a:lvl3pPr>
-            <a:lvl4pPr indent="0" algn="l">
+            <a:lvl4pPr>
               <a:buNone/>
               <a:defRPr sz="900"/>
             </a:lvl4pPr>
-            <a:lvl5pPr indent="0" algn="l">
+            <a:lvl5pPr>
               <a:buNone/>
               <a:defRPr sz="900"/>
             </a:lvl5pPr>
+            <a:extLst/>
           </a:lstStyle>
           <a:p>
             <a:pPr lvl="0" eaLnBrk="1" latinLnBrk="0" hangingPunct="1"/>
@@ -2115,28 +2587,29 @@
         </p:nvSpPr>
         <p:spPr>
           <a:xfrm>
-            <a:off x="3575050" y="1676400"/>
-            <a:ext cx="5111750" cy="4572000"/>
-          </a:xfrm>
-        </p:spPr>
-        <p:txBody>
-          <a:bodyPr tIns="0"/>
-          <a:lstStyle>
-            <a:lvl1pPr>
+            <a:off x="228600" y="2209800"/>
+            <a:ext cx="8666456" cy="3977640"/>
+          </a:xfrm>
+        </p:spPr>
+        <p:txBody>
+          <a:bodyPr/>
+          <a:lstStyle>
+            <a:lvl1pPr marL="292608">
+              <a:defRPr sz="3200"/>
+            </a:lvl1pPr>
+            <a:lvl2pPr marL="594360">
               <a:defRPr sz="2800"/>
-            </a:lvl1pPr>
-            <a:lvl2pPr>
-              <a:defRPr sz="2600"/>
             </a:lvl2pPr>
-            <a:lvl3pPr>
+            <a:lvl3pPr marL="822960">
               <a:defRPr sz="2400"/>
             </a:lvl3pPr>
-            <a:lvl4pPr>
+            <a:lvl4pPr marL="1051560">
               <a:defRPr sz="2000"/>
             </a:lvl4pPr>
-            <a:lvl5pPr>
-              <a:defRPr sz="1800"/>
+            <a:lvl5pPr marL="1261872">
+              <a:defRPr sz="2000"/>
             </a:lvl5pPr>
+            <a:extLst/>
           </a:lstStyle>
           <a:p>
             <a:pPr lvl="0" eaLnBrk="1" latinLnBrk="0" hangingPunct="1"/>
@@ -2178,7 +2651,7 @@
       </p:sp>
       <p:sp>
         <p:nvSpPr>
-          <p:cNvPr id="5" name="Date Placeholder 4"/>
+          <p:cNvPr id="9" name="Date Placeholder 8"/>
           <p:cNvSpPr>
             <a:spLocks noGrp="1"/>
           </p:cNvSpPr>
@@ -2186,15 +2659,22 @@
             <p:ph type="dt" sz="half" idx="10"/>
           </p:nvPr>
         </p:nvSpPr>
-        <p:spPr/>
-        <p:txBody>
-          <a:bodyPr/>
-          <a:lstStyle/>
+        <p:spPr>
+          <a:xfrm>
+            <a:off x="5562600" y="6513670"/>
+            <a:ext cx="3002280" cy="274320"/>
+          </a:xfrm>
+        </p:spPr>
+        <p:txBody>
+          <a:bodyPr vert="horz" rtlCol="0"/>
+          <a:lstStyle>
+            <a:extLst/>
+          </a:lstStyle>
           <a:p>
             <a:fld id="{542ED6D8-967B-4FDD-8539-23116DD8CE38}" type="datetimeFigureOut">
               <a:rPr lang="en-US" smtClean="0"/>
               <a:pPr/>
-              <a:t>10/13/2014</a:t>
+              <a:t>10/14/2014</a:t>
             </a:fld>
             <a:endParaRPr lang="en-US"/>
           </a:p>
@@ -2202,37 +2682,34 @@
       </p:sp>
       <p:sp>
         <p:nvSpPr>
-          <p:cNvPr id="6" name="Footer Placeholder 5"/>
-          <p:cNvSpPr>
-            <a:spLocks noGrp="1"/>
-          </p:cNvSpPr>
-          <p:nvPr>
-            <p:ph type="ftr" sz="quarter" idx="11"/>
-          </p:nvPr>
-        </p:nvSpPr>
-        <p:spPr/>
-        <p:txBody>
-          <a:bodyPr/>
-          <a:lstStyle/>
-          <a:p>
-            <a:endParaRPr lang="en-US"/>
-          </a:p>
-        </p:txBody>
-      </p:sp>
-      <p:sp>
-        <p:nvSpPr>
-          <p:cNvPr id="7" name="Slide Number Placeholder 6"/>
-          <p:cNvSpPr>
-            <a:spLocks noGrp="1"/>
-          </p:cNvSpPr>
-          <p:nvPr>
-            <p:ph type="sldNum" sz="quarter" idx="12"/>
-          </p:nvPr>
-        </p:nvSpPr>
-        <p:spPr/>
-        <p:txBody>
-          <a:bodyPr/>
-          <a:lstStyle/>
+          <p:cNvPr id="10" name="Slide Number Placeholder 9"/>
+          <p:cNvSpPr>
+            <a:spLocks noGrp="1"/>
+          </p:cNvSpPr>
+          <p:nvPr>
+            <p:ph type="sldNum" sz="quarter" idx="11"/>
+          </p:nvPr>
+        </p:nvSpPr>
+        <p:spPr>
+          <a:xfrm>
+            <a:off x="8638952" y="6513670"/>
+            <a:ext cx="464288" cy="274320"/>
+          </a:xfrm>
+        </p:spPr>
+        <p:txBody>
+          <a:bodyPr vert="horz" rtlCol="0"/>
+          <a:lstStyle>
+            <a:lvl1pPr>
+              <a:defRPr>
+                <a:solidFill>
+                  <a:schemeClr val="tx2">
+                    <a:shade val="90000"/>
+                  </a:schemeClr>
+                </a:solidFill>
+              </a:defRPr>
+            </a:lvl1pPr>
+            <a:extLst/>
+          </a:lstStyle>
           <a:p>
             <a:fld id="{9AF68AB6-DD62-4065-9EF9-D7CEDA1C3581}" type="slidenum">
               <a:rPr lang="en-US" smtClean="0"/>
@@ -2243,10 +2720,36 @@
           </a:p>
         </p:txBody>
       </p:sp>
+      <p:sp>
+        <p:nvSpPr>
+          <p:cNvPr id="11" name="Footer Placeholder 10"/>
+          <p:cNvSpPr>
+            <a:spLocks noGrp="1"/>
+          </p:cNvSpPr>
+          <p:nvPr>
+            <p:ph type="ftr" sz="quarter" idx="12"/>
+          </p:nvPr>
+        </p:nvSpPr>
+        <p:spPr>
+          <a:xfrm>
+            <a:off x="1600200" y="6513670"/>
+            <a:ext cx="3907464" cy="274320"/>
+          </a:xfrm>
+        </p:spPr>
+        <p:txBody>
+          <a:bodyPr vert="horz" rtlCol="0"/>
+          <a:lstStyle>
+            <a:extLst/>
+          </a:lstStyle>
+          <a:p>
+            <a:endParaRPr lang="en-US"/>
+          </a:p>
+        </p:txBody>
+      </p:sp>
     </p:spTree>
   </p:cSld>
   <p:clrMapOvr>
-    <a:masterClrMapping/>
+    <a:overrideClrMapping bg1="dk1" tx1="lt1" bg2="dk2" tx2="lt2" accent1="accent1" accent2="accent2" accent3="accent3" accent4="accent4" accent5="accent5" accent6="accent6" hlink="hlink" folHlink="folHlink"/>
   </p:clrMapOvr>
 </p:sldLayout>
 </file>
@@ -2270,118 +2773,6 @@
       </p:grpSpPr>
       <p:sp>
         <p:nvSpPr>
-          <p:cNvPr id="9" name="Snip and Round Single Corner Rectangle 8"/>
-          <p:cNvSpPr/>
-          <p:nvPr/>
-        </p:nvSpPr>
-        <p:spPr>
-          <a:xfrm rot="420000" flipV="1">
-            <a:off x="3165753" y="1108077"/>
-            <a:ext cx="5257800" cy="4114800"/>
-          </a:xfrm>
-          <a:prstGeom prst="snipRoundRect">
-            <a:avLst>
-              <a:gd name="adj1" fmla="val 0"/>
-              <a:gd name="adj2" fmla="val 3646"/>
-            </a:avLst>
-          </a:prstGeom>
-          <a:solidFill>
-            <a:srgbClr val="FFFFFF"/>
-          </a:solidFill>
-          <a:ln w="3175" cap="rnd" cmpd="sng" algn="ctr">
-            <a:solidFill>
-              <a:srgbClr val="C0C0C0"/>
-            </a:solidFill>
-            <a:prstDash val="solid"/>
-          </a:ln>
-          <a:effectLst>
-            <a:outerShdw blurRad="63500" dist="38500" dir="7500000" sx="98500" sy="100080" kx="100000" algn="tl" rotWithShape="0">
-              <a:srgbClr val="000000">
-                <a:alpha val="25000"/>
-              </a:srgbClr>
-            </a:outerShdw>
-          </a:effectLst>
-        </p:spPr>
-        <p:style>
-          <a:lnRef idx="2">
-            <a:schemeClr val="accent1"/>
-          </a:lnRef>
-          <a:fillRef idx="1">
-            <a:schemeClr val="accent1"/>
-          </a:fillRef>
-          <a:effectRef idx="0">
-            <a:schemeClr val="accent1"/>
-          </a:effectRef>
-          <a:fontRef idx="minor">
-            <a:schemeClr val="lt1"/>
-          </a:fontRef>
-        </p:style>
-        <p:txBody>
-          <a:bodyPr rtlCol="0" anchor="ctr"/>
-          <a:lstStyle/>
-          <a:p>
-            <a:pPr algn="ctr" eaLnBrk="1" latinLnBrk="0" hangingPunct="1"/>
-            <a:endParaRPr kumimoji="0" lang="en-US"/>
-          </a:p>
-        </p:txBody>
-      </p:sp>
-      <p:sp>
-        <p:nvSpPr>
-          <p:cNvPr id="12" name="Right Triangle 11"/>
-          <p:cNvSpPr/>
-          <p:nvPr/>
-        </p:nvSpPr>
-        <p:spPr>
-          <a:xfrm rot="420000" flipV="1">
-            <a:off x="8004134" y="5359769"/>
-            <a:ext cx="155448" cy="155448"/>
-          </a:xfrm>
-          <a:prstGeom prst="rtTriangle">
-            <a:avLst/>
-          </a:prstGeom>
-          <a:solidFill>
-            <a:srgbClr val="FFFFFF"/>
-          </a:solidFill>
-          <a:ln w="12700" cap="flat" cmpd="sng" algn="ctr">
-            <a:solidFill>
-              <a:srgbClr val="FFFFFF"/>
-            </a:solidFill>
-            <a:prstDash val="solid"/>
-            <a:bevel/>
-          </a:ln>
-          <a:effectLst>
-            <a:outerShdw blurRad="19685" dist="6350" dir="12900000" algn="tl" rotWithShape="0">
-              <a:srgbClr val="000000">
-                <a:alpha val="47000"/>
-              </a:srgbClr>
-            </a:outerShdw>
-          </a:effectLst>
-        </p:spPr>
-        <p:style>
-          <a:lnRef idx="2">
-            <a:schemeClr val="accent1"/>
-          </a:lnRef>
-          <a:fillRef idx="1">
-            <a:schemeClr val="accent1"/>
-          </a:fillRef>
-          <a:effectRef idx="0">
-            <a:schemeClr val="accent1"/>
-          </a:effectRef>
-          <a:fontRef idx="minor">
-            <a:schemeClr val="lt1"/>
-          </a:fontRef>
-        </p:style>
-        <p:txBody>
-          <a:bodyPr rtlCol="0" anchor="ctr"/>
-          <a:lstStyle/>
-          <a:p>
-            <a:pPr algn="ctr" eaLnBrk="1" latinLnBrk="0" hangingPunct="1"/>
-            <a:endParaRPr kumimoji="0" lang="en-US"/>
-          </a:p>
-        </p:txBody>
-      </p:sp>
-      <p:sp>
-        <p:nvSpPr>
           <p:cNvPr id="2" name="Title 1"/>
           <p:cNvSpPr>
             <a:spLocks noGrp="1"/>
@@ -2392,21 +2783,18 @@
         </p:nvSpPr>
         <p:spPr>
           <a:xfrm>
-            <a:off x="609600" y="1176996"/>
-            <a:ext cx="2212848" cy="1582621"/>
-          </a:xfrm>
-        </p:spPr>
-        <p:txBody>
-          <a:bodyPr vert="horz" lIns="45720" tIns="45720" rIns="45720" bIns="45720" anchor="b"/>
-          <a:lstStyle>
-            <a:lvl1pPr algn="l">
+            <a:off x="3040443" y="4724400"/>
+            <a:ext cx="5486400" cy="664536"/>
+          </a:xfrm>
+        </p:spPr>
+        <p:txBody>
+          <a:bodyPr anchor="b"/>
+          <a:lstStyle>
+            <a:lvl1pPr marL="0" algn="r">
               <a:buNone/>
-              <a:defRPr sz="2000" b="1">
-                <a:solidFill>
-                  <a:schemeClr val="tx2"/>
-                </a:solidFill>
-              </a:defRPr>
+              <a:defRPr sz="2000" b="1"/>
             </a:lvl1pPr>
+            <a:extLst/>
           </a:lstStyle>
           <a:p>
             <a:r>
@@ -2429,20 +2817,19 @@
         </p:nvSpPr>
         <p:spPr>
           <a:xfrm>
-            <a:off x="609600" y="2828785"/>
-            <a:ext cx="2209800" cy="2179320"/>
-          </a:xfrm>
-        </p:spPr>
-        <p:txBody>
-          <a:bodyPr lIns="64008" rIns="45720" bIns="45720" anchor="t"/>
-          <a:lstStyle>
-            <a:lvl1pPr marL="0" indent="0" algn="l">
+            <a:off x="3040443" y="5388936"/>
+            <a:ext cx="5486400" cy="912255"/>
+          </a:xfrm>
+        </p:spPr>
+        <p:txBody>
+          <a:bodyPr/>
+          <a:lstStyle>
+            <a:lvl1pPr marL="0" indent="0" algn="r">
               <a:spcBef>
-                <a:spcPts val="250"/>
+                <a:spcPts val="0"/>
               </a:spcBef>
-              <a:buFontTx/>
               <a:buNone/>
-              <a:defRPr sz="1300"/>
+              <a:defRPr sz="1400"/>
             </a:lvl1pPr>
             <a:lvl2pPr>
               <a:defRPr sz="1200"/>
@@ -2456,6 +2843,7 @@
             <a:lvl5pPr>
               <a:defRPr sz="900"/>
             </a:lvl5pPr>
+            <a:extLst/>
           </a:lstStyle>
           <a:p>
             <a:pPr lvl="0" eaLnBrk="1" latinLnBrk="0" hangingPunct="1"/>
@@ -2468,79 +2856,7 @@
       </p:sp>
       <p:sp>
         <p:nvSpPr>
-          <p:cNvPr id="5" name="Date Placeholder 4"/>
-          <p:cNvSpPr>
-            <a:spLocks noGrp="1"/>
-          </p:cNvSpPr>
-          <p:nvPr>
-            <p:ph type="dt" sz="half" idx="10"/>
-          </p:nvPr>
-        </p:nvSpPr>
-        <p:spPr/>
-        <p:txBody>
-          <a:bodyPr/>
-          <a:lstStyle/>
-          <a:p>
-            <a:fld id="{542ED6D8-967B-4FDD-8539-23116DD8CE38}" type="datetimeFigureOut">
-              <a:rPr lang="en-US" smtClean="0"/>
-              <a:pPr/>
-              <a:t>10/13/2014</a:t>
-            </a:fld>
-            <a:endParaRPr lang="en-US"/>
-          </a:p>
-        </p:txBody>
-      </p:sp>
-      <p:sp>
-        <p:nvSpPr>
-          <p:cNvPr id="6" name="Footer Placeholder 5"/>
-          <p:cNvSpPr>
-            <a:spLocks noGrp="1"/>
-          </p:cNvSpPr>
-          <p:nvPr>
-            <p:ph type="ftr" sz="quarter" idx="11"/>
-          </p:nvPr>
-        </p:nvSpPr>
-        <p:spPr/>
-        <p:txBody>
-          <a:bodyPr/>
-          <a:lstStyle/>
-          <a:p>
-            <a:endParaRPr lang="en-US"/>
-          </a:p>
-        </p:txBody>
-      </p:sp>
-      <p:sp>
-        <p:nvSpPr>
-          <p:cNvPr id="7" name="Slide Number Placeholder 6"/>
-          <p:cNvSpPr>
-            <a:spLocks noGrp="1"/>
-          </p:cNvSpPr>
-          <p:nvPr>
-            <p:ph type="sldNum" sz="quarter" idx="12"/>
-          </p:nvPr>
-        </p:nvSpPr>
-        <p:spPr>
-          <a:xfrm>
-            <a:off x="8077200" y="6356350"/>
-            <a:ext cx="609600" cy="365125"/>
-          </a:xfrm>
-        </p:spPr>
-        <p:txBody>
-          <a:bodyPr/>
-          <a:lstStyle/>
-          <a:p>
-            <a:fld id="{9AF68AB6-DD62-4065-9EF9-D7CEDA1C3581}" type="slidenum">
-              <a:rPr lang="en-US" smtClean="0"/>
-              <a:pPr/>
-              <a:t>‹#›</a:t>
-            </a:fld>
-            <a:endParaRPr lang="en-US"/>
-          </a:p>
-        </p:txBody>
-      </p:sp>
-      <p:sp>
-        <p:nvSpPr>
-          <p:cNvPr id="3" name="Picture Placeholder 2"/>
+          <p:cNvPr id="13" name="Picture Placeholder 12"/>
           <p:cNvSpPr>
             <a:spLocks noGrp="1"/>
           </p:cNvSpPr>
@@ -2549,176 +2865,81 @@
           </p:nvPr>
         </p:nvSpPr>
         <p:spPr>
-          <a:xfrm rot="420000">
-            <a:off x="3485793" y="1199517"/>
-            <a:ext cx="4617720" cy="3931920"/>
-          </a:xfrm>
-          <a:prstGeom prst="rect">
-            <a:avLst/>
+          <a:xfrm>
+            <a:off x="304800" y="249864"/>
+            <a:ext cx="8534400" cy="4343400"/>
+          </a:xfrm>
+          <a:prstGeom prst="round2DiagRect">
+            <a:avLst>
+              <a:gd name="adj1" fmla="val 11403"/>
+              <a:gd name="adj2" fmla="val 0"/>
+            </a:avLst>
           </a:prstGeom>
           <a:solidFill>
-            <a:schemeClr val="bg2"/>
+            <a:schemeClr val="bg2">
+              <a:tint val="85000"/>
+              <a:shade val="90000"/>
+              <a:satMod val="150000"/>
+              <a:alpha val="65000"/>
+            </a:schemeClr>
           </a:solidFill>
-          <a:ln w="3000" cap="rnd">
+          <a:ln w="11000" cap="rnd" cmpd="sng" algn="ctr">
             <a:solidFill>
-              <a:srgbClr val="C0C0C0"/>
+              <a:schemeClr val="bg2">
+                <a:tint val="78000"/>
+                <a:satMod val="180000"/>
+                <a:alpha val="88000"/>
+              </a:schemeClr>
             </a:solidFill>
-            <a:round/>
+            <a:prstDash val="solid"/>
           </a:ln>
-          <a:effectLst/>
-        </p:spPr>
-        <p:txBody>
-          <a:bodyPr/>
-          <a:lstStyle>
-            <a:lvl1pPr marL="0" indent="0">
+          <a:effectLst>
+            <a:innerShdw blurRad="114300">
+              <a:srgbClr val="000000">
+                <a:alpha val="100000"/>
+              </a:srgbClr>
+            </a:innerShdw>
+          </a:effectLst>
+        </p:spPr>
+        <p:style>
+          <a:lnRef idx="3">
+            <a:schemeClr val="lt1"/>
+          </a:lnRef>
+          <a:fillRef idx="1">
+            <a:schemeClr val="accent1"/>
+          </a:fillRef>
+          <a:effectRef idx="1">
+            <a:schemeClr val="accent1"/>
+          </a:effectRef>
+          <a:fontRef idx="minor">
+            <a:schemeClr val="lt1"/>
+          </a:fontRef>
+        </p:style>
+        <p:txBody>
+          <a:bodyPr anchor="t"/>
+          <a:lstStyle>
+            <a:lvl1pPr indent="0">
               <a:buNone/>
               <a:defRPr sz="3200"/>
             </a:lvl1pPr>
-          </a:lstStyle>
-          <a:p>
-            <a:r>
-              <a:rPr kumimoji="0" lang="en-US" smtClean="0"/>
+            <a:extLst/>
+          </a:lstStyle>
+          <a:p>
+            <a:pPr marL="0" algn="l" rtl="0" eaLnBrk="1" latinLnBrk="0" hangingPunct="1"/>
+            <a:r>
+              <a:rPr kumimoji="0" lang="en-US" smtClean="0">
+                <a:solidFill>
+                  <a:schemeClr val="lt1"/>
+                </a:solidFill>
+                <a:latin typeface="+mn-lt"/>
+                <a:ea typeface="+mn-ea"/>
+                <a:cs typeface="+mn-cs"/>
+              </a:rPr>
               <a:t>Click icon to add picture</a:t>
             </a:r>
-            <a:endParaRPr kumimoji="0" lang="en-US" dirty="0"/>
-          </a:p>
-        </p:txBody>
-      </p:sp>
-      <p:sp>
-        <p:nvSpPr>
-          <p:cNvPr id="10" name="Freeform 9"/>
-          <p:cNvSpPr>
-            <a:spLocks/>
-          </p:cNvSpPr>
-          <p:nvPr/>
-        </p:nvSpPr>
-        <p:spPr bwMode="auto">
-          <a:xfrm flipV="1">
-            <a:off x="-9525" y="5816600"/>
-            <a:ext cx="9163050" cy="1041400"/>
-          </a:xfrm>
-          <a:custGeom>
-            <a:avLst>
-              <a:gd name="A1" fmla="val 0"/>
-              <a:gd name="A2" fmla="val 0"/>
-              <a:gd name="A3" fmla="val 0"/>
-              <a:gd name="A4" fmla="val 0"/>
-              <a:gd name="A5" fmla="val 0"/>
-              <a:gd name="A6" fmla="val 0"/>
-              <a:gd name="A7" fmla="val 0"/>
-              <a:gd name="A8" fmla="val 0"/>
-            </a:avLst>
-            <a:gdLst/>
-            <a:ahLst/>
-            <a:cxnLst>
-              <a:cxn ang="0">
-                <a:pos x="6" y="2"/>
-              </a:cxn>
-              <a:cxn ang="0">
-                <a:pos x="2542" y="0"/>
-              </a:cxn>
-              <a:cxn ang="0">
-                <a:pos x="4374" y="367"/>
-              </a:cxn>
-              <a:cxn ang="0">
-                <a:pos x="5766" y="55"/>
-              </a:cxn>
-              <a:cxn ang="0">
-                <a:pos x="5772" y="213"/>
-              </a:cxn>
-              <a:cxn ang="0">
-                <a:pos x="4302" y="439"/>
-              </a:cxn>
-              <a:cxn ang="0">
-                <a:pos x="1488" y="201"/>
-              </a:cxn>
-              <a:cxn ang="0">
-                <a:pos x="0" y="656"/>
-              </a:cxn>
-              <a:cxn ang="0">
-                <a:pos x="6" y="2"/>
-              </a:cxn>
-            </a:cxnLst>
-            <a:rect l="0" t="0" r="0" b="0"/>
-            <a:pathLst>
-              <a:path w="5772" h="656">
-                <a:moveTo>
-                  <a:pt x="6" y="2"/>
-                </a:moveTo>
-                <a:lnTo>
-                  <a:pt x="2542" y="0"/>
-                </a:lnTo>
-                <a:cubicBezTo>
-                  <a:pt x="2746" y="101"/>
-                  <a:pt x="3828" y="367"/>
-                  <a:pt x="4374" y="367"/>
-                </a:cubicBezTo>
-                <a:cubicBezTo>
-                  <a:pt x="4920" y="367"/>
-                  <a:pt x="5526" y="152"/>
-                  <a:pt x="5766" y="55"/>
-                </a:cubicBezTo>
-                <a:lnTo>
-                  <a:pt x="5772" y="213"/>
-                </a:lnTo>
-                <a:cubicBezTo>
-                  <a:pt x="5670" y="257"/>
-                  <a:pt x="5016" y="441"/>
-                  <a:pt x="4302" y="439"/>
-                </a:cubicBezTo>
-                <a:cubicBezTo>
-                  <a:pt x="3588" y="437"/>
-                  <a:pt x="2205" y="165"/>
-                  <a:pt x="1488" y="201"/>
-                </a:cubicBezTo>
-                <a:cubicBezTo>
-                  <a:pt x="750" y="209"/>
-                  <a:pt x="270" y="482"/>
-                  <a:pt x="0" y="656"/>
-                </a:cubicBezTo>
-                <a:lnTo>
-                  <a:pt x="6" y="2"/>
-                </a:lnTo>
-                <a:close/>
-              </a:path>
-            </a:pathLst>
-          </a:custGeom>
-          <a:gradFill>
-            <a:gsLst>
-              <a:gs pos="0">
-                <a:schemeClr val="accent2">
-                  <a:shade val="50000"/>
-                  <a:alpha val="45000"/>
-                  <a:satMod val="120000"/>
-                </a:schemeClr>
-              </a:gs>
-              <a:gs pos="100000">
-                <a:schemeClr val="accent3">
-                  <a:shade val="80000"/>
-                  <a:alpha val="55000"/>
-                  <a:satMod val="155000"/>
-                </a:schemeClr>
-              </a:gs>
-            </a:gsLst>
-            <a:lin ang="5400000" scaled="1"/>
-          </a:gradFill>
-          <a:ln w="9525" cap="flat" cmpd="sng" algn="ctr">
-            <a:noFill/>
-            <a:prstDash val="solid"/>
-            <a:round/>
-            <a:headEnd type="none" w="med" len="med"/>
-            <a:tailEnd type="none" w="med" len="med"/>
-          </a:ln>
-          <a:effectLst/>
-        </p:spPr>
-        <p:txBody>
-          <a:bodyPr vert="horz" wrap="square" lIns="91440" tIns="45720" rIns="91440" bIns="45720" anchor="t" compatLnSpc="1"/>
-          <a:lstStyle/>
-          <a:p>
-            <a:pPr marL="0" algn="l" rtl="0" eaLnBrk="1" latinLnBrk="0" hangingPunct="1"/>
-            <a:endParaRPr kumimoji="0" lang="en-US">
+            <a:endParaRPr kumimoji="0" lang="en-US" dirty="0">
               <a:solidFill>
-                <a:schemeClr val="tx1"/>
+                <a:schemeClr val="lt1"/>
               </a:solidFill>
               <a:latin typeface="+mn-lt"/>
               <a:ea typeface="+mn-ea"/>
@@ -2729,114 +2950,98 @@
       </p:sp>
       <p:sp>
         <p:nvSpPr>
-          <p:cNvPr id="11" name="Freeform 10"/>
-          <p:cNvSpPr>
-            <a:spLocks/>
-          </p:cNvSpPr>
-          <p:nvPr/>
-        </p:nvSpPr>
-        <p:spPr bwMode="auto">
-          <a:xfrm flipV="1">
-            <a:off x="4381500" y="6219825"/>
-            <a:ext cx="4762500" cy="638175"/>
-          </a:xfrm>
-          <a:custGeom>
-            <a:avLst>
-              <a:gd name="A1" fmla="val 0"/>
-              <a:gd name="A2" fmla="val 0"/>
-              <a:gd name="A3" fmla="val 0"/>
-              <a:gd name="A4" fmla="val 0"/>
-              <a:gd name="A5" fmla="val 0"/>
-              <a:gd name="A6" fmla="val 0"/>
-              <a:gd name="A7" fmla="val 0"/>
-              <a:gd name="A8" fmla="val 0"/>
-            </a:avLst>
-            <a:gdLst/>
-            <a:ahLst/>
-            <a:cxnLst>
-              <a:cxn ang="0">
-                <a:pos x="0" y="0"/>
-              </a:cxn>
-              <a:cxn ang="0">
-                <a:pos x="1668" y="564"/>
-              </a:cxn>
-              <a:cxn ang="0">
-                <a:pos x="3000" y="186"/>
-              </a:cxn>
-              <a:cxn ang="0">
-                <a:pos x="3000" y="6"/>
-              </a:cxn>
-              <a:cxn ang="0">
-                <a:pos x="0" y="0"/>
-              </a:cxn>
-            </a:cxnLst>
-            <a:rect l="0" t="0" r="0" b="0"/>
-            <a:pathLst>
-              <a:path w="3000" h="595">
-                <a:moveTo>
-                  <a:pt x="0" y="0"/>
-                </a:moveTo>
-                <a:cubicBezTo>
-                  <a:pt x="174" y="102"/>
-                  <a:pt x="1168" y="533"/>
-                  <a:pt x="1668" y="564"/>
-                </a:cubicBezTo>
-                <a:cubicBezTo>
-                  <a:pt x="2168" y="595"/>
-                  <a:pt x="2778" y="279"/>
-                  <a:pt x="3000" y="186"/>
-                </a:cubicBezTo>
-                <a:lnTo>
-                  <a:pt x="3000" y="6"/>
-                </a:lnTo>
-                <a:lnTo>
-                  <a:pt x="0" y="0"/>
-                </a:lnTo>
-                <a:close/>
-              </a:path>
-            </a:pathLst>
-          </a:custGeom>
-          <a:gradFill>
-            <a:gsLst>
-              <a:gs pos="0">
-                <a:schemeClr val="accent3">
-                  <a:shade val="50000"/>
-                  <a:alpha val="30000"/>
-                  <a:satMod val="130000"/>
-                </a:schemeClr>
-              </a:gs>
-              <a:gs pos="80000">
-                <a:schemeClr val="accent2">
-                  <a:shade val="75000"/>
-                  <a:alpha val="45000"/>
-                  <a:satMod val="140000"/>
-                </a:schemeClr>
-              </a:gs>
-            </a:gsLst>
-            <a:lin ang="5400000" scaled="1"/>
-          </a:gradFill>
-          <a:ln w="9525" cap="flat" cmpd="sng" algn="ctr">
-            <a:noFill/>
-            <a:prstDash val="solid"/>
-            <a:round/>
-            <a:headEnd type="none" w="med" len="med"/>
-            <a:tailEnd type="none" w="med" len="med"/>
-          </a:ln>
-          <a:effectLst/>
-        </p:spPr>
-        <p:txBody>
-          <a:bodyPr vert="horz" wrap="square" lIns="91440" tIns="45720" rIns="91440" bIns="45720" anchor="t" compatLnSpc="1"/>
-          <a:lstStyle/>
-          <a:p>
-            <a:pPr marL="0" algn="l" rtl="0" eaLnBrk="1" latinLnBrk="0" hangingPunct="1"/>
-            <a:endParaRPr kumimoji="0" lang="en-US">
-              <a:solidFill>
-                <a:schemeClr val="tx1"/>
-              </a:solidFill>
-              <a:latin typeface="+mn-lt"/>
-              <a:ea typeface="+mn-ea"/>
-              <a:cs typeface="+mn-cs"/>
-            </a:endParaRPr>
+          <p:cNvPr id="8" name="Date Placeholder 7"/>
+          <p:cNvSpPr>
+            <a:spLocks noGrp="1"/>
+          </p:cNvSpPr>
+          <p:nvPr>
+            <p:ph type="dt" sz="half" idx="10"/>
+          </p:nvPr>
+        </p:nvSpPr>
+        <p:spPr>
+          <a:xfrm>
+            <a:off x="5562600" y="6509004"/>
+            <a:ext cx="3002280" cy="274320"/>
+          </a:xfrm>
+        </p:spPr>
+        <p:txBody>
+          <a:bodyPr vert="horz" rtlCol="0"/>
+          <a:lstStyle>
+            <a:extLst/>
+          </a:lstStyle>
+          <a:p>
+            <a:fld id="{542ED6D8-967B-4FDD-8539-23116DD8CE38}" type="datetimeFigureOut">
+              <a:rPr lang="en-US" smtClean="0"/>
+              <a:pPr/>
+              <a:t>10/14/2014</a:t>
+            </a:fld>
+            <a:endParaRPr lang="en-US"/>
+          </a:p>
+        </p:txBody>
+      </p:sp>
+      <p:sp>
+        <p:nvSpPr>
+          <p:cNvPr id="9" name="Slide Number Placeholder 8"/>
+          <p:cNvSpPr>
+            <a:spLocks noGrp="1"/>
+          </p:cNvSpPr>
+          <p:nvPr>
+            <p:ph type="sldNum" sz="quarter" idx="11"/>
+          </p:nvPr>
+        </p:nvSpPr>
+        <p:spPr>
+          <a:xfrm>
+            <a:off x="8638952" y="6509004"/>
+            <a:ext cx="464288" cy="274320"/>
+          </a:xfrm>
+        </p:spPr>
+        <p:txBody>
+          <a:bodyPr vert="horz" rtlCol="0"/>
+          <a:lstStyle>
+            <a:lvl1pPr>
+              <a:defRPr>
+                <a:solidFill>
+                  <a:schemeClr val="tx2">
+                    <a:shade val="90000"/>
+                  </a:schemeClr>
+                </a:solidFill>
+              </a:defRPr>
+            </a:lvl1pPr>
+            <a:extLst/>
+          </a:lstStyle>
+          <a:p>
+            <a:fld id="{9AF68AB6-DD62-4065-9EF9-D7CEDA1C3581}" type="slidenum">
+              <a:rPr lang="en-US" smtClean="0"/>
+              <a:pPr/>
+              <a:t>‹#›</a:t>
+            </a:fld>
+            <a:endParaRPr lang="en-US"/>
+          </a:p>
+        </p:txBody>
+      </p:sp>
+      <p:sp>
+        <p:nvSpPr>
+          <p:cNvPr id="10" name="Footer Placeholder 9"/>
+          <p:cNvSpPr>
+            <a:spLocks noGrp="1"/>
+          </p:cNvSpPr>
+          <p:nvPr>
+            <p:ph type="ftr" sz="quarter" idx="12"/>
+          </p:nvPr>
+        </p:nvSpPr>
+        <p:spPr>
+          <a:xfrm>
+            <a:off x="1600200" y="6509004"/>
+            <a:ext cx="3907464" cy="274320"/>
+          </a:xfrm>
+        </p:spPr>
+        <p:txBody>
+          <a:bodyPr vert="horz" rtlCol="0"/>
+          <a:lstStyle>
+            <a:extLst/>
+          </a:lstStyle>
+          <a:p>
+            <a:endParaRPr lang="en-US"/>
           </a:p>
         </p:txBody>
       </p:sp>
@@ -2853,7 +3058,7 @@
   <p:cSld>
     <p:bg>
       <p:bgRef idx="1003">
-        <a:schemeClr val="bg1"/>
+        <a:schemeClr val="bg2"/>
       </p:bgRef>
     </p:bg>
     <p:spTree>
@@ -2872,465 +3077,188 @@
       </p:grpSpPr>
       <p:sp>
         <p:nvSpPr>
-          <p:cNvPr id="7" name="Freeform 6"/>
-          <p:cNvSpPr>
-            <a:spLocks/>
-          </p:cNvSpPr>
+          <p:cNvPr id="7" name="Round Diagonal Corner Rectangle 6"/>
+          <p:cNvSpPr/>
           <p:nvPr/>
         </p:nvSpPr>
-        <p:spPr bwMode="auto">
-          <a:xfrm>
-            <a:off x="-9525" y="-7144"/>
-            <a:ext cx="9163050" cy="1041400"/>
-          </a:xfrm>
-          <a:custGeom>
+        <p:spPr>
+          <a:xfrm>
+            <a:off x="164592" y="147085"/>
+            <a:ext cx="8810846" cy="6565392"/>
+          </a:xfrm>
+          <a:prstGeom prst="round2DiagRect">
             <a:avLst>
-              <a:gd name="A1" fmla="val 0"/>
-              <a:gd name="A2" fmla="val 0"/>
-              <a:gd name="A3" fmla="val 0"/>
-              <a:gd name="A4" fmla="val 0"/>
-              <a:gd name="A5" fmla="val 0"/>
-              <a:gd name="A6" fmla="val 0"/>
-              <a:gd name="A7" fmla="val 0"/>
-              <a:gd name="A8" fmla="val 0"/>
+              <a:gd name="adj1" fmla="val 11807"/>
+              <a:gd name="adj2" fmla="val 0"/>
             </a:avLst>
-            <a:gdLst/>
-            <a:ahLst/>
-            <a:cxnLst>
-              <a:cxn ang="0">
-                <a:pos x="6" y="2"/>
-              </a:cxn>
-              <a:cxn ang="0">
-                <a:pos x="2542" y="0"/>
-              </a:cxn>
-              <a:cxn ang="0">
-                <a:pos x="4374" y="367"/>
-              </a:cxn>
-              <a:cxn ang="0">
-                <a:pos x="5766" y="55"/>
-              </a:cxn>
-              <a:cxn ang="0">
-                <a:pos x="5772" y="213"/>
-              </a:cxn>
-              <a:cxn ang="0">
-                <a:pos x="4302" y="439"/>
-              </a:cxn>
-              <a:cxn ang="0">
-                <a:pos x="1488" y="201"/>
-              </a:cxn>
-              <a:cxn ang="0">
-                <a:pos x="0" y="656"/>
-              </a:cxn>
-              <a:cxn ang="0">
-                <a:pos x="6" y="2"/>
-              </a:cxn>
-            </a:cxnLst>
-            <a:rect l="0" t="0" r="0" b="0"/>
-            <a:pathLst>
-              <a:path w="5772" h="656">
-                <a:moveTo>
-                  <a:pt x="6" y="2"/>
-                </a:moveTo>
-                <a:lnTo>
-                  <a:pt x="2542" y="0"/>
-                </a:lnTo>
-                <a:cubicBezTo>
-                  <a:pt x="2746" y="101"/>
-                  <a:pt x="3828" y="367"/>
-                  <a:pt x="4374" y="367"/>
-                </a:cubicBezTo>
-                <a:cubicBezTo>
-                  <a:pt x="4920" y="367"/>
-                  <a:pt x="5526" y="152"/>
-                  <a:pt x="5766" y="55"/>
-                </a:cubicBezTo>
-                <a:lnTo>
-                  <a:pt x="5772" y="213"/>
-                </a:lnTo>
-                <a:cubicBezTo>
-                  <a:pt x="5670" y="257"/>
-                  <a:pt x="5016" y="441"/>
-                  <a:pt x="4302" y="439"/>
-                </a:cubicBezTo>
-                <a:cubicBezTo>
-                  <a:pt x="3588" y="437"/>
-                  <a:pt x="2205" y="165"/>
-                  <a:pt x="1488" y="201"/>
-                </a:cubicBezTo>
-                <a:cubicBezTo>
-                  <a:pt x="750" y="209"/>
-                  <a:pt x="270" y="482"/>
-                  <a:pt x="0" y="656"/>
-                </a:cubicBezTo>
-                <a:lnTo>
-                  <a:pt x="6" y="2"/>
-                </a:lnTo>
-                <a:close/>
-              </a:path>
-            </a:pathLst>
-          </a:custGeom>
-          <a:gradFill>
-            <a:gsLst>
-              <a:gs pos="0">
-                <a:schemeClr val="accent2">
-                  <a:shade val="50000"/>
-                  <a:alpha val="45000"/>
-                  <a:satMod val="120000"/>
-                </a:schemeClr>
-              </a:gs>
-              <a:gs pos="100000">
-                <a:schemeClr val="accent3">
-                  <a:shade val="80000"/>
-                  <a:alpha val="55000"/>
-                  <a:satMod val="155000"/>
-                </a:schemeClr>
-              </a:gs>
-            </a:gsLst>
-            <a:lin ang="5400000" scaled="1"/>
-          </a:gradFill>
-          <a:ln w="9525" cap="flat" cmpd="sng" algn="ctr">
-            <a:noFill/>
+          </a:prstGeom>
+          <a:solidFill>
+            <a:schemeClr val="bg2">
+              <a:tint val="85000"/>
+              <a:shade val="90000"/>
+              <a:satMod val="150000"/>
+              <a:alpha val="65000"/>
+            </a:schemeClr>
+          </a:solidFill>
+          <a:ln w="11000" cap="rnd" cmpd="sng" algn="ctr">
+            <a:solidFill>
+              <a:schemeClr val="bg2">
+                <a:tint val="78000"/>
+                <a:satMod val="180000"/>
+                <a:alpha val="88000"/>
+              </a:schemeClr>
+            </a:solidFill>
             <a:prstDash val="solid"/>
-            <a:round/>
-            <a:headEnd type="none" w="med" len="med"/>
-            <a:tailEnd type="none" w="med" len="med"/>
           </a:ln>
-          <a:effectLst/>
-        </p:spPr>
-        <p:txBody>
-          <a:bodyPr vert="horz" wrap="square" lIns="91440" tIns="45720" rIns="91440" bIns="45720" anchor="t" compatLnSpc="1"/>
-          <a:lstStyle/>
-          <a:p>
-            <a:pPr marL="0" algn="l" rtl="0" eaLnBrk="1" latinLnBrk="0" hangingPunct="1"/>
-            <a:endParaRPr kumimoji="0" lang="en-US">
-              <a:solidFill>
-                <a:schemeClr val="tx1"/>
-              </a:solidFill>
-              <a:latin typeface="+mn-lt"/>
-              <a:ea typeface="+mn-ea"/>
-              <a:cs typeface="+mn-cs"/>
-            </a:endParaRPr>
-          </a:p>
-        </p:txBody>
-      </p:sp>
-      <p:sp>
-        <p:nvSpPr>
-          <p:cNvPr id="8" name="Freeform 7"/>
-          <p:cNvSpPr>
-            <a:spLocks/>
-          </p:cNvSpPr>
-          <p:nvPr/>
-        </p:nvSpPr>
-        <p:spPr bwMode="auto">
-          <a:xfrm>
-            <a:off x="4381500" y="-7144"/>
-            <a:ext cx="4762500" cy="638175"/>
-          </a:xfrm>
-          <a:custGeom>
-            <a:avLst>
-              <a:gd name="A1" fmla="val 0"/>
-              <a:gd name="A2" fmla="val 0"/>
-              <a:gd name="A3" fmla="val 0"/>
-              <a:gd name="A4" fmla="val 0"/>
-              <a:gd name="A5" fmla="val 0"/>
-              <a:gd name="A6" fmla="val 0"/>
-              <a:gd name="A7" fmla="val 0"/>
-              <a:gd name="A8" fmla="val 0"/>
-            </a:avLst>
-            <a:gdLst/>
-            <a:ahLst/>
-            <a:cxnLst>
-              <a:cxn ang="0">
-                <a:pos x="0" y="0"/>
-              </a:cxn>
-              <a:cxn ang="0">
-                <a:pos x="1668" y="564"/>
-              </a:cxn>
-              <a:cxn ang="0">
-                <a:pos x="3000" y="186"/>
-              </a:cxn>
-              <a:cxn ang="0">
-                <a:pos x="3000" y="6"/>
-              </a:cxn>
-              <a:cxn ang="0">
-                <a:pos x="0" y="0"/>
-              </a:cxn>
-            </a:cxnLst>
-            <a:rect l="0" t="0" r="0" b="0"/>
-            <a:pathLst>
-              <a:path w="3000" h="595">
-                <a:moveTo>
-                  <a:pt x="0" y="0"/>
-                </a:moveTo>
-                <a:cubicBezTo>
-                  <a:pt x="174" y="102"/>
-                  <a:pt x="1168" y="533"/>
-                  <a:pt x="1668" y="564"/>
-                </a:cubicBezTo>
-                <a:cubicBezTo>
-                  <a:pt x="2168" y="595"/>
-                  <a:pt x="2778" y="279"/>
-                  <a:pt x="3000" y="186"/>
-                </a:cubicBezTo>
-                <a:lnTo>
-                  <a:pt x="3000" y="6"/>
-                </a:lnTo>
-                <a:lnTo>
-                  <a:pt x="0" y="0"/>
-                </a:lnTo>
-                <a:close/>
-              </a:path>
-            </a:pathLst>
-          </a:custGeom>
-          <a:gradFill>
-            <a:gsLst>
-              <a:gs pos="0">
-                <a:schemeClr val="accent3">
-                  <a:shade val="50000"/>
-                  <a:alpha val="30000"/>
-                  <a:satMod val="130000"/>
-                </a:schemeClr>
-              </a:gs>
-              <a:gs pos="80000">
-                <a:schemeClr val="accent2">
-                  <a:shade val="75000"/>
-                  <a:alpha val="45000"/>
-                  <a:satMod val="140000"/>
-                </a:schemeClr>
-              </a:gs>
-            </a:gsLst>
-            <a:lin ang="5400000" scaled="1"/>
-          </a:gradFill>
-          <a:ln w="9525" cap="flat" cmpd="sng" algn="ctr">
-            <a:noFill/>
-            <a:prstDash val="solid"/>
-            <a:round/>
-            <a:headEnd type="none" w="med" len="med"/>
-            <a:tailEnd type="none" w="med" len="med"/>
-          </a:ln>
-          <a:effectLst/>
-        </p:spPr>
-        <p:txBody>
-          <a:bodyPr vert="horz" wrap="square" lIns="91440" tIns="45720" rIns="91440" bIns="45720" anchor="t" compatLnSpc="1"/>
-          <a:lstStyle/>
-          <a:p>
-            <a:pPr marL="0" algn="l" rtl="0" eaLnBrk="1" latinLnBrk="0" hangingPunct="1"/>
-            <a:endParaRPr kumimoji="0" lang="en-US">
-              <a:solidFill>
-                <a:schemeClr val="tx1"/>
-              </a:solidFill>
-              <a:latin typeface="+mn-lt"/>
-              <a:ea typeface="+mn-ea"/>
-              <a:cs typeface="+mn-cs"/>
-            </a:endParaRPr>
-          </a:p>
-        </p:txBody>
-      </p:sp>
-      <p:sp>
-        <p:nvSpPr>
-          <p:cNvPr id="9" name="Title Placeholder 8"/>
-          <p:cNvSpPr>
-            <a:spLocks noGrp="1"/>
-          </p:cNvSpPr>
-          <p:nvPr>
-            <p:ph type="title"/>
-          </p:nvPr>
-        </p:nvSpPr>
-        <p:spPr>
-          <a:xfrm>
-            <a:off x="457200" y="704088"/>
-            <a:ext cx="8229600" cy="1143000"/>
+          <a:effectLst>
+            <a:innerShdw blurRad="114300">
+              <a:srgbClr val="000000">
+                <a:alpha val="100000"/>
+              </a:srgbClr>
+            </a:innerShdw>
+          </a:effectLst>
+        </p:spPr>
+        <p:style>
+          <a:lnRef idx="3">
+            <a:schemeClr val="lt1"/>
+          </a:lnRef>
+          <a:fillRef idx="1">
+            <a:schemeClr val="accent1"/>
+          </a:fillRef>
+          <a:effectRef idx="1">
+            <a:schemeClr val="accent1"/>
+          </a:effectRef>
+          <a:fontRef idx="minor">
+            <a:schemeClr val="lt1"/>
+          </a:fontRef>
+        </p:style>
+        <p:txBody>
+          <a:bodyPr anchor="ctr"/>
+          <a:lstStyle>
+            <a:extLst/>
+          </a:lstStyle>
+          <a:p>
+            <a:pPr algn="ctr" eaLnBrk="1" latinLnBrk="0" hangingPunct="1"/>
+            <a:endParaRPr kumimoji="0" lang="en-US"/>
+          </a:p>
+        </p:txBody>
+      </p:sp>
+      <p:sp>
+        <p:nvSpPr>
+          <p:cNvPr id="3" name="Footer Placeholder 2"/>
+          <p:cNvSpPr>
+            <a:spLocks noGrp="1"/>
+          </p:cNvSpPr>
+          <p:nvPr>
+            <p:ph type="ftr" sz="quarter" idx="3"/>
+          </p:nvPr>
+        </p:nvSpPr>
+        <p:spPr>
+          <a:xfrm>
+            <a:off x="1295400" y="6400800"/>
+            <a:ext cx="4212264" cy="274320"/>
           </a:xfrm>
           <a:prstGeom prst="rect">
             <a:avLst/>
           </a:prstGeom>
         </p:spPr>
         <p:txBody>
-          <a:bodyPr vert="horz" lIns="0" rIns="0" bIns="0" anchor="b">
-            <a:normAutofit/>
-          </a:bodyPr>
-          <a:lstStyle/>
-          <a:p>
-            <a:r>
-              <a:rPr kumimoji="0" lang="en-US" smtClean="0"/>
-              <a:t>Click to edit Master title style</a:t>
-            </a:r>
-            <a:endParaRPr kumimoji="0" lang="en-US"/>
-          </a:p>
-        </p:txBody>
-      </p:sp>
-      <p:sp>
-        <p:nvSpPr>
-          <p:cNvPr id="30" name="Text Placeholder 29"/>
-          <p:cNvSpPr>
-            <a:spLocks noGrp="1"/>
-          </p:cNvSpPr>
-          <p:nvPr>
-            <p:ph type="body" idx="1"/>
-          </p:nvPr>
-        </p:nvSpPr>
-        <p:spPr>
-          <a:xfrm>
-            <a:off x="457200" y="1935480"/>
-            <a:ext cx="8229600" cy="4389120"/>
+          <a:bodyPr/>
+          <a:lstStyle>
+            <a:lvl1pPr algn="r" eaLnBrk="1" latinLnBrk="0" hangingPunct="1">
+              <a:defRPr kumimoji="0" sz="1300">
+                <a:solidFill>
+                  <a:schemeClr val="bg2">
+                    <a:tint val="60000"/>
+                    <a:satMod val="155000"/>
+                  </a:schemeClr>
+                </a:solidFill>
+              </a:defRPr>
+            </a:lvl1pPr>
+            <a:extLst/>
+          </a:lstStyle>
+          <a:p>
+            <a:endParaRPr lang="en-US"/>
+          </a:p>
+        </p:txBody>
+      </p:sp>
+      <p:sp>
+        <p:nvSpPr>
+          <p:cNvPr id="14" name="Date Placeholder 13"/>
+          <p:cNvSpPr>
+            <a:spLocks noGrp="1"/>
+          </p:cNvSpPr>
+          <p:nvPr>
+            <p:ph type="dt" sz="half" idx="2"/>
+          </p:nvPr>
+        </p:nvSpPr>
+        <p:spPr>
+          <a:xfrm>
+            <a:off x="5562600" y="6400800"/>
+            <a:ext cx="3002280" cy="274320"/>
           </a:xfrm>
           <a:prstGeom prst="rect">
             <a:avLst/>
           </a:prstGeom>
         </p:spPr>
         <p:txBody>
-          <a:bodyPr vert="horz">
-            <a:normAutofit/>
-          </a:bodyPr>
-          <a:lstStyle/>
-          <a:p>
-            <a:pPr lvl="0" eaLnBrk="1" latinLnBrk="0" hangingPunct="1"/>
-            <a:r>
-              <a:rPr kumimoji="0" lang="en-US" smtClean="0"/>
-              <a:t>Click to edit Master text styles</a:t>
-            </a:r>
-          </a:p>
-          <a:p>
-            <a:pPr lvl="1" eaLnBrk="1" latinLnBrk="0" hangingPunct="1"/>
-            <a:r>
-              <a:rPr kumimoji="0" lang="en-US" smtClean="0"/>
-              <a:t>Second level</a:t>
-            </a:r>
-          </a:p>
-          <a:p>
-            <a:pPr lvl="2" eaLnBrk="1" latinLnBrk="0" hangingPunct="1"/>
-            <a:r>
-              <a:rPr kumimoji="0" lang="en-US" smtClean="0"/>
-              <a:t>Third level</a:t>
-            </a:r>
-          </a:p>
-          <a:p>
-            <a:pPr lvl="3" eaLnBrk="1" latinLnBrk="0" hangingPunct="1"/>
-            <a:r>
-              <a:rPr kumimoji="0" lang="en-US" smtClean="0"/>
-              <a:t>Fourth level</a:t>
-            </a:r>
-          </a:p>
-          <a:p>
-            <a:pPr lvl="4" eaLnBrk="1" latinLnBrk="0" hangingPunct="1"/>
-            <a:r>
-              <a:rPr kumimoji="0" lang="en-US" smtClean="0"/>
-              <a:t>Fifth level</a:t>
-            </a:r>
-            <a:endParaRPr kumimoji="0" lang="en-US"/>
-          </a:p>
-        </p:txBody>
-      </p:sp>
-      <p:sp>
-        <p:nvSpPr>
-          <p:cNvPr id="10" name="Date Placeholder 9"/>
-          <p:cNvSpPr>
-            <a:spLocks noGrp="1"/>
-          </p:cNvSpPr>
-          <p:nvPr>
-            <p:ph type="dt" sz="half" idx="2"/>
-          </p:nvPr>
-        </p:nvSpPr>
-        <p:spPr>
-          <a:xfrm>
-            <a:off x="457200" y="6356350"/>
-            <a:ext cx="2133600" cy="365125"/>
+          <a:bodyPr/>
+          <a:lstStyle>
+            <a:lvl1pPr algn="l" eaLnBrk="1" latinLnBrk="0" hangingPunct="1">
+              <a:defRPr kumimoji="0" sz="1300">
+                <a:solidFill>
+                  <a:schemeClr val="bg2">
+                    <a:tint val="60000"/>
+                    <a:satMod val="155000"/>
+                  </a:schemeClr>
+                </a:solidFill>
+              </a:defRPr>
+            </a:lvl1pPr>
+            <a:extLst/>
+          </a:lstStyle>
+          <a:p>
+            <a:fld id="{542ED6D8-967B-4FDD-8539-23116DD8CE38}" type="datetimeFigureOut">
+              <a:rPr lang="en-US" smtClean="0"/>
+              <a:pPr/>
+              <a:t>10/14/2014</a:t>
+            </a:fld>
+            <a:endParaRPr lang="en-US"/>
+          </a:p>
+        </p:txBody>
+      </p:sp>
+      <p:sp>
+        <p:nvSpPr>
+          <p:cNvPr id="23" name="Slide Number Placeholder 22"/>
+          <p:cNvSpPr>
+            <a:spLocks noGrp="1"/>
+          </p:cNvSpPr>
+          <p:nvPr>
+            <p:ph type="sldNum" sz="quarter" idx="4"/>
+          </p:nvPr>
+        </p:nvSpPr>
+        <p:spPr>
+          <a:xfrm>
+            <a:off x="8638952" y="6514568"/>
+            <a:ext cx="464288" cy="274320"/>
           </a:xfrm>
           <a:prstGeom prst="rect">
             <a:avLst/>
           </a:prstGeom>
         </p:spPr>
         <p:txBody>
-          <a:bodyPr vert="horz" lIns="0" tIns="0" rIns="0" bIns="0" anchor="b"/>
-          <a:lstStyle>
-            <a:lvl1pPr algn="l" eaLnBrk="1" latinLnBrk="0" hangingPunct="1">
-              <a:defRPr kumimoji="0" sz="1200">
+          <a:bodyPr anchor="ctr"/>
+          <a:lstStyle>
+            <a:lvl1pPr algn="r" eaLnBrk="1" latinLnBrk="0" hangingPunct="1">
+              <a:defRPr kumimoji="0" sz="1600">
                 <a:solidFill>
                   <a:schemeClr val="tx2">
                     <a:shade val="90000"/>
                   </a:schemeClr>
                 </a:solidFill>
+                <a:effectLst/>
               </a:defRPr>
             </a:lvl1pPr>
-          </a:lstStyle>
-          <a:p>
-            <a:fld id="{542ED6D8-967B-4FDD-8539-23116DD8CE38}" type="datetimeFigureOut">
-              <a:rPr lang="en-US" smtClean="0"/>
-              <a:pPr/>
-              <a:t>10/13/2014</a:t>
-            </a:fld>
-            <a:endParaRPr lang="en-US"/>
-          </a:p>
-        </p:txBody>
-      </p:sp>
-      <p:sp>
-        <p:nvSpPr>
-          <p:cNvPr id="22" name="Footer Placeholder 21"/>
-          <p:cNvSpPr>
-            <a:spLocks noGrp="1"/>
-          </p:cNvSpPr>
-          <p:nvPr>
-            <p:ph type="ftr" sz="quarter" idx="3"/>
-          </p:nvPr>
-        </p:nvSpPr>
-        <p:spPr>
-          <a:xfrm>
-            <a:off x="2667000" y="6356350"/>
-            <a:ext cx="3352800" cy="365125"/>
-          </a:xfrm>
-          <a:prstGeom prst="rect">
-            <a:avLst/>
-          </a:prstGeom>
-        </p:spPr>
-        <p:txBody>
-          <a:bodyPr vert="horz" lIns="0" tIns="0" rIns="0" bIns="0" anchor="b"/>
-          <a:lstStyle>
-            <a:lvl1pPr algn="l" eaLnBrk="1" latinLnBrk="0" hangingPunct="1">
-              <a:defRPr kumimoji="0" sz="1200">
-                <a:solidFill>
-                  <a:schemeClr val="tx2">
-                    <a:shade val="90000"/>
-                  </a:schemeClr>
-                </a:solidFill>
-              </a:defRPr>
-            </a:lvl1pPr>
-          </a:lstStyle>
-          <a:p>
-            <a:endParaRPr lang="en-US"/>
-          </a:p>
-        </p:txBody>
-      </p:sp>
-      <p:sp>
-        <p:nvSpPr>
-          <p:cNvPr id="18" name="Slide Number Placeholder 17"/>
-          <p:cNvSpPr>
-            <a:spLocks noGrp="1"/>
-          </p:cNvSpPr>
-          <p:nvPr>
-            <p:ph type="sldNum" sz="quarter" idx="4"/>
-          </p:nvPr>
-        </p:nvSpPr>
-        <p:spPr>
-          <a:xfrm>
-            <a:off x="7924800" y="6356350"/>
-            <a:ext cx="762000" cy="365125"/>
-          </a:xfrm>
-          <a:prstGeom prst="rect">
-            <a:avLst/>
-          </a:prstGeom>
-        </p:spPr>
-        <p:txBody>
-          <a:bodyPr vert="horz" lIns="0" tIns="0" rIns="0" bIns="0" anchor="b"/>
-          <a:lstStyle>
-            <a:lvl1pPr algn="r" eaLnBrk="1" latinLnBrk="0" hangingPunct="1">
-              <a:defRPr kumimoji="0" sz="1200">
-                <a:solidFill>
-                  <a:schemeClr val="tx2">
-                    <a:shade val="90000"/>
-                  </a:schemeClr>
-                </a:solidFill>
-              </a:defRPr>
-            </a:lvl1pPr>
+            <a:extLst/>
           </a:lstStyle>
           <a:p>
             <a:fld id="{9AF68AB6-DD62-4065-9EF9-D7CEDA1C3581}" type="slidenum">
@@ -3342,268 +3270,191 @@
           </a:p>
         </p:txBody>
       </p:sp>
-      <p:grpSp>
-        <p:nvGrpSpPr>
-          <p:cNvPr id="2" name="Group 1"/>
-          <p:cNvGrpSpPr/>
-          <p:nvPr/>
-        </p:nvGrpSpPr>
-        <p:grpSpPr>
-          <a:xfrm>
-            <a:off x="-19017" y="202408"/>
-            <a:ext cx="9180548" cy="649224"/>
-            <a:chOff x="-19045" y="216550"/>
-            <a:chExt cx="9180548" cy="649224"/>
-          </a:xfrm>
-        </p:grpSpPr>
-        <p:sp>
-          <p:nvSpPr>
-            <p:cNvPr id="12" name="Freeform 11"/>
-            <p:cNvSpPr>
-              <a:spLocks/>
-            </p:cNvSpPr>
-            <p:nvPr/>
-          </p:nvSpPr>
-          <p:spPr bwMode="auto">
-            <a:xfrm rot="21435692">
-              <a:off x="-19045" y="216550"/>
-              <a:ext cx="9163050" cy="649224"/>
-            </a:xfrm>
-            <a:custGeom>
-              <a:avLst>
-                <a:gd name="A1" fmla="val 0"/>
-                <a:gd name="A2" fmla="val 0"/>
-                <a:gd name="A3" fmla="val 0"/>
-                <a:gd name="A4" fmla="val 0"/>
-                <a:gd name="A5" fmla="val 0"/>
-                <a:gd name="A6" fmla="val 0"/>
-                <a:gd name="A7" fmla="val 0"/>
-                <a:gd name="A8" fmla="val 0"/>
-              </a:avLst>
-              <a:gdLst/>
-              <a:ahLst/>
-              <a:cxnLst>
-                <a:cxn ang="0">
-                  <a:pos x="0" y="966"/>
-                </a:cxn>
-                <a:cxn ang="0">
-                  <a:pos x="1608" y="282"/>
-                </a:cxn>
-                <a:cxn ang="0">
-                  <a:pos x="4110" y="1008"/>
-                </a:cxn>
-                <a:cxn ang="0">
-                  <a:pos x="5772" y="0"/>
-                </a:cxn>
-              </a:cxnLst>
-              <a:rect l="0" t="0" r="0" b="0"/>
-              <a:pathLst>
-                <a:path w="5772" h="1055">
-                  <a:moveTo>
-                    <a:pt x="0" y="966"/>
-                  </a:moveTo>
-                  <a:cubicBezTo>
-                    <a:pt x="282" y="738"/>
-                    <a:pt x="923" y="275"/>
-                    <a:pt x="1608" y="282"/>
-                  </a:cubicBezTo>
-                  <a:cubicBezTo>
-                    <a:pt x="2293" y="289"/>
-                    <a:pt x="3416" y="1055"/>
-                    <a:pt x="4110" y="1008"/>
-                  </a:cubicBezTo>
-                  <a:cubicBezTo>
-                    <a:pt x="4804" y="961"/>
-                    <a:pt x="5426" y="210"/>
-                    <a:pt x="5772" y="0"/>
-                  </a:cubicBezTo>
-                </a:path>
-              </a:pathLst>
-            </a:custGeom>
-            <a:noFill/>
-            <a:ln w="10795" cap="flat" cmpd="sng" algn="ctr">
-              <a:gradFill>
-                <a:gsLst>
-                  <a:gs pos="74000">
-                    <a:schemeClr val="accent3">
-                      <a:shade val="75000"/>
-                    </a:schemeClr>
-                  </a:gs>
-                  <a:gs pos="86000">
-                    <a:schemeClr val="tx1">
-                      <a:alpha val="29000"/>
-                    </a:schemeClr>
-                  </a:gs>
-                  <a:gs pos="16000">
-                    <a:schemeClr val="accent2">
-                      <a:shade val="75000"/>
-                      <a:alpha val="56000"/>
-                    </a:schemeClr>
-                  </a:gs>
-                </a:gsLst>
-                <a:lin ang="5400000" scaled="1"/>
-              </a:gradFill>
-              <a:prstDash val="solid"/>
-              <a:round/>
-              <a:headEnd type="none" w="med" len="med"/>
-              <a:tailEnd type="none" w="med" len="med"/>
-            </a:ln>
-            <a:effectLst/>
-          </p:spPr>
-          <p:txBody>
-            <a:bodyPr vert="horz" wrap="square" lIns="91440" tIns="45720" rIns="91440" bIns="45720" anchor="t" compatLnSpc="1"/>
-            <a:lstStyle/>
-            <a:p>
-              <a:endParaRPr kumimoji="0" lang="en-US"/>
-            </a:p>
-          </p:txBody>
-        </p:sp>
-        <p:sp>
-          <p:nvSpPr>
-            <p:cNvPr id="13" name="Freeform 12"/>
-            <p:cNvSpPr>
-              <a:spLocks/>
-            </p:cNvSpPr>
-            <p:nvPr/>
-          </p:nvSpPr>
-          <p:spPr bwMode="auto">
-            <a:xfrm rot="21435692">
-              <a:off x="-14309" y="290003"/>
-              <a:ext cx="9175812" cy="530352"/>
-            </a:xfrm>
-            <a:custGeom>
-              <a:avLst>
-                <a:gd name="A1" fmla="val 0"/>
-                <a:gd name="A2" fmla="val 0"/>
-                <a:gd name="A3" fmla="val 0"/>
-                <a:gd name="A4" fmla="val 0"/>
-                <a:gd name="A5" fmla="val 0"/>
-                <a:gd name="A6" fmla="val 0"/>
-                <a:gd name="A7" fmla="val 0"/>
-                <a:gd name="A8" fmla="val 0"/>
-              </a:avLst>
-              <a:gdLst/>
-              <a:ahLst/>
-              <a:cxnLst>
-                <a:cxn ang="0">
-                  <a:pos x="0" y="732"/>
-                </a:cxn>
-                <a:cxn ang="0">
-                  <a:pos x="1638" y="228"/>
-                </a:cxn>
-                <a:cxn ang="0">
-                  <a:pos x="4122" y="816"/>
-                </a:cxn>
-                <a:cxn ang="0">
-                  <a:pos x="5766" y="0"/>
-                </a:cxn>
-              </a:cxnLst>
-              <a:rect l="0" t="0" r="0" b="0"/>
-              <a:pathLst>
-                <a:path w="5766" h="854">
-                  <a:moveTo>
-                    <a:pt x="0" y="732"/>
-                  </a:moveTo>
-                  <a:cubicBezTo>
-                    <a:pt x="273" y="647"/>
-                    <a:pt x="951" y="214"/>
-                    <a:pt x="1638" y="228"/>
-                  </a:cubicBezTo>
-                  <a:cubicBezTo>
-                    <a:pt x="2325" y="242"/>
-                    <a:pt x="3434" y="854"/>
-                    <a:pt x="4122" y="816"/>
-                  </a:cubicBezTo>
-                  <a:cubicBezTo>
-                    <a:pt x="4810" y="778"/>
-                    <a:pt x="5424" y="170"/>
-                    <a:pt x="5766" y="0"/>
-                  </a:cubicBezTo>
-                </a:path>
-              </a:pathLst>
-            </a:custGeom>
-            <a:noFill/>
-            <a:ln w="9525" cap="flat" cmpd="sng" algn="ctr">
-              <a:gradFill>
-                <a:gsLst>
-                  <a:gs pos="74000">
-                    <a:schemeClr val="accent4"/>
-                  </a:gs>
-                  <a:gs pos="44000">
-                    <a:schemeClr val="accent1"/>
-                  </a:gs>
-                  <a:gs pos="33000">
-                    <a:schemeClr val="accent2">
-                      <a:alpha val="56000"/>
-                    </a:schemeClr>
-                  </a:gs>
-                </a:gsLst>
-                <a:lin ang="5400000" scaled="1"/>
-              </a:gradFill>
-              <a:prstDash val="solid"/>
-              <a:round/>
-              <a:headEnd type="none" w="med" len="med"/>
-              <a:tailEnd type="none" w="med" len="med"/>
-            </a:ln>
-            <a:effectLst/>
-          </p:spPr>
-          <p:txBody>
-            <a:bodyPr vert="horz" wrap="square" lIns="91440" tIns="45720" rIns="91440" bIns="45720" anchor="t" compatLnSpc="1"/>
-            <a:lstStyle/>
-            <a:p>
-              <a:endParaRPr kumimoji="0" lang="en-US"/>
-            </a:p>
-          </p:txBody>
-        </p:sp>
-      </p:grpSp>
+      <p:sp>
+        <p:nvSpPr>
+          <p:cNvPr id="22" name="Title Placeholder 21"/>
+          <p:cNvSpPr>
+            <a:spLocks noGrp="1"/>
+          </p:cNvSpPr>
+          <p:nvPr>
+            <p:ph type="title"/>
+          </p:nvPr>
+        </p:nvSpPr>
+        <p:spPr>
+          <a:xfrm>
+            <a:off x="457200" y="253536"/>
+            <a:ext cx="8229600" cy="1143000"/>
+          </a:xfrm>
+          <a:prstGeom prst="rect">
+            <a:avLst/>
+          </a:prstGeom>
+        </p:spPr>
+        <p:txBody>
+          <a:bodyPr rIns="91440" anchor="b">
+            <a:normAutofit/>
+            <a:scene3d>
+              <a:camera prst="orthographicFront"/>
+              <a:lightRig rig="soft" dir="t">
+                <a:rot lat="0" lon="0" rev="2400000"/>
+              </a:lightRig>
+            </a:scene3d>
+            <a:sp3d>
+              <a:bevelT w="19050" h="12700"/>
+            </a:sp3d>
+          </a:bodyPr>
+          <a:lstStyle>
+            <a:extLst/>
+          </a:lstStyle>
+          <a:p>
+            <a:r>
+              <a:rPr kumimoji="0" lang="en-US" smtClean="0"/>
+              <a:t>Click to edit Master title style</a:t>
+            </a:r>
+            <a:endParaRPr kumimoji="0" lang="en-US"/>
+          </a:p>
+        </p:txBody>
+      </p:sp>
+      <p:sp>
+        <p:nvSpPr>
+          <p:cNvPr id="13" name="Text Placeholder 12"/>
+          <p:cNvSpPr>
+            <a:spLocks noGrp="1"/>
+          </p:cNvSpPr>
+          <p:nvPr>
+            <p:ph type="body" idx="1"/>
+          </p:nvPr>
+        </p:nvSpPr>
+        <p:spPr>
+          <a:xfrm>
+            <a:off x="457200" y="1646237"/>
+            <a:ext cx="8229600" cy="4526280"/>
+          </a:xfrm>
+          <a:prstGeom prst="rect">
+            <a:avLst/>
+          </a:prstGeom>
+        </p:spPr>
+        <p:txBody>
+          <a:bodyPr>
+            <a:normAutofit/>
+          </a:bodyPr>
+          <a:lstStyle>
+            <a:extLst/>
+          </a:lstStyle>
+          <a:p>
+            <a:pPr lvl="0" eaLnBrk="1" latinLnBrk="0" hangingPunct="1"/>
+            <a:r>
+              <a:rPr kumimoji="0" lang="en-US" smtClean="0"/>
+              <a:t>Click to edit Master text styles</a:t>
+            </a:r>
+          </a:p>
+          <a:p>
+            <a:pPr lvl="1" eaLnBrk="1" latinLnBrk="0" hangingPunct="1"/>
+            <a:r>
+              <a:rPr kumimoji="0" lang="en-US" smtClean="0"/>
+              <a:t>Second level</a:t>
+            </a:r>
+          </a:p>
+          <a:p>
+            <a:pPr lvl="2" eaLnBrk="1" latinLnBrk="0" hangingPunct="1"/>
+            <a:r>
+              <a:rPr kumimoji="0" lang="en-US" smtClean="0"/>
+              <a:t>Third level</a:t>
+            </a:r>
+          </a:p>
+          <a:p>
+            <a:pPr lvl="3" eaLnBrk="1" latinLnBrk="0" hangingPunct="1"/>
+            <a:r>
+              <a:rPr kumimoji="0" lang="en-US" smtClean="0"/>
+              <a:t>Fourth level</a:t>
+            </a:r>
+          </a:p>
+          <a:p>
+            <a:pPr lvl="4" eaLnBrk="1" latinLnBrk="0" hangingPunct="1"/>
+            <a:r>
+              <a:rPr kumimoji="0" lang="en-US" smtClean="0"/>
+              <a:t>Fifth level</a:t>
+            </a:r>
+            <a:endParaRPr kumimoji="0" lang="en-US"/>
+          </a:p>
+        </p:txBody>
+      </p:sp>
     </p:spTree>
   </p:cSld>
-  <p:clrMap bg1="lt1" tx1="dk1" bg2="lt2" tx2="dk2" accent1="accent1" accent2="accent2" accent3="accent3" accent4="accent4" accent5="accent5" accent6="accent6" hlink="hlink" folHlink="folHlink"/>
+  <p:clrMap bg1="dk1" tx1="lt1" bg2="dk2" tx2="lt2" accent1="accent1" accent2="accent2" accent3="accent3" accent4="accent4" accent5="accent5" accent6="accent6" hlink="hlink" folHlink="folHlink"/>
   <p:sldLayoutIdLst>
-    <p:sldLayoutId id="2147483661" r:id="rId1"/>
-    <p:sldLayoutId id="2147483662" r:id="rId2"/>
-    <p:sldLayoutId id="2147483663" r:id="rId3"/>
-    <p:sldLayoutId id="2147483664" r:id="rId4"/>
-    <p:sldLayoutId id="2147483665" r:id="rId5"/>
-    <p:sldLayoutId id="2147483666" r:id="rId6"/>
-    <p:sldLayoutId id="2147483667" r:id="rId7"/>
-    <p:sldLayoutId id="2147483668" r:id="rId8"/>
-    <p:sldLayoutId id="2147483669" r:id="rId9"/>
-    <p:sldLayoutId id="2147483670" r:id="rId10"/>
-    <p:sldLayoutId id="2147483671" r:id="rId11"/>
+    <p:sldLayoutId id="2147483673" r:id="rId1"/>
+    <p:sldLayoutId id="2147483674" r:id="rId2"/>
+    <p:sldLayoutId id="2147483675" r:id="rId3"/>
+    <p:sldLayoutId id="2147483676" r:id="rId4"/>
+    <p:sldLayoutId id="2147483677" r:id="rId5"/>
+    <p:sldLayoutId id="2147483678" r:id="rId6"/>
+    <p:sldLayoutId id="2147483679" r:id="rId7"/>
+    <p:sldLayoutId id="2147483680" r:id="rId8"/>
+    <p:sldLayoutId id="2147483681" r:id="rId9"/>
+    <p:sldLayoutId id="2147483682" r:id="rId10"/>
+    <p:sldLayoutId id="2147483683" r:id="rId11"/>
   </p:sldLayoutIdLst>
   <p:txStyles>
     <p:titleStyle>
-      <a:lvl1pPr algn="l" rtl="0" eaLnBrk="1" latinLnBrk="0" hangingPunct="1">
+      <a:lvl1pPr marL="54864" algn="r" rtl="0" eaLnBrk="1" latinLnBrk="0" hangingPunct="1">
         <a:spcBef>
           <a:spcPct val="0"/>
         </a:spcBef>
         <a:buNone/>
-        <a:defRPr kumimoji="0" sz="5000" b="0" kern="1200">
-          <a:ln>
-            <a:noFill/>
-          </a:ln>
+        <a:defRPr kumimoji="0" sz="4600" kern="1200">
           <a:solidFill>
-            <a:schemeClr val="tx2"/>
+            <a:schemeClr val="tx2">
+              <a:tint val="100000"/>
+              <a:shade val="90000"/>
+              <a:satMod val="250000"/>
+              <a:alpha val="100000"/>
+            </a:schemeClr>
           </a:solidFill>
-          <a:effectLst/>
+          <a:effectLst>
+            <a:outerShdw blurRad="38100" dist="25500" dir="5400000" algn="tl" rotWithShape="0">
+              <a:srgbClr val="000000">
+                <a:satMod val="180000"/>
+                <a:alpha val="75000"/>
+              </a:srgbClr>
+            </a:outerShdw>
+          </a:effectLst>
           <a:latin typeface="+mj-lt"/>
           <a:ea typeface="+mj-ea"/>
           <a:cs typeface="+mj-cs"/>
         </a:defRPr>
       </a:lvl1pPr>
+      <a:extLst/>
     </p:titleStyle>
     <p:bodyStyle>
-      <a:lvl1pPr marL="274320" indent="-274320" algn="l" rtl="0" eaLnBrk="1" latinLnBrk="0" hangingPunct="1">
+      <a:lvl1pPr marL="292100" indent="-292100" algn="l" rtl="0" eaLnBrk="1" latinLnBrk="0" hangingPunct="1">
         <a:spcBef>
-          <a:spcPct val="20000"/>
+          <a:spcPts val="0"/>
         </a:spcBef>
         <a:buClr>
-          <a:schemeClr val="accent3"/>
+          <a:schemeClr val="accent1"/>
         </a:buClr>
-        <a:buSzPct val="95000"/>
+        <a:buSzPct val="70000"/>
         <a:buFont typeface="Wingdings 2"/>
-        <a:buChar char=""/>
+        <a:buChar char=""/>
+        <a:defRPr kumimoji="0" sz="3200" kern="1200">
+          <a:solidFill>
+            <a:schemeClr val="tx1"/>
+          </a:solidFill>
+          <a:latin typeface="+mn-lt"/>
+          <a:ea typeface="+mn-ea"/>
+          <a:cs typeface="+mn-cs"/>
+        </a:defRPr>
+      </a:lvl1pPr>
+      <a:lvl2pPr marL="640080" indent="-228600" algn="l" rtl="0" eaLnBrk="1" latinLnBrk="0" hangingPunct="1">
+        <a:spcBef>
+          <a:spcPts val="400"/>
+        </a:spcBef>
+        <a:buClr>
+          <a:schemeClr val="accent2"/>
+        </a:buClr>
+        <a:buSzPct val="90000"/>
+        <a:buFontTx/>
+        <a:buChar char="•"/>
         <a:defRPr kumimoji="0" sz="2600" kern="1200">
           <a:solidFill>
             <a:schemeClr val="tx1"/>
@@ -3612,37 +3463,18 @@
           <a:ea typeface="+mn-ea"/>
           <a:cs typeface="+mn-cs"/>
         </a:defRPr>
-      </a:lvl1pPr>
-      <a:lvl2pPr marL="640080" indent="-246888" algn="l" rtl="0" eaLnBrk="1" latinLnBrk="0" hangingPunct="1">
+      </a:lvl2pPr>
+      <a:lvl3pPr marL="822960" indent="-192024" algn="l" rtl="0" eaLnBrk="1" latinLnBrk="0" hangingPunct="1">
         <a:spcBef>
-          <a:spcPct val="20000"/>
+          <a:spcPts val="400"/>
         </a:spcBef>
         <a:buClr>
-          <a:schemeClr val="accent1"/>
+          <a:schemeClr val="accent3"/>
         </a:buClr>
-        <a:buSzPct val="85000"/>
+        <a:buSzPct val="100000"/>
         <a:buFont typeface="Wingdings 2"/>
-        <a:buChar char=""/>
-        <a:defRPr kumimoji="0" sz="2400" kern="1200">
-          <a:solidFill>
-            <a:schemeClr val="tx1"/>
-          </a:solidFill>
-          <a:latin typeface="+mn-lt"/>
-          <a:ea typeface="+mn-ea"/>
-          <a:cs typeface="+mn-cs"/>
-        </a:defRPr>
-      </a:lvl2pPr>
-      <a:lvl3pPr marL="914400" indent="-246888" algn="l" rtl="0" eaLnBrk="1" latinLnBrk="0" hangingPunct="1">
-        <a:spcBef>
-          <a:spcPct val="20000"/>
-        </a:spcBef>
-        <a:buClr>
-          <a:schemeClr val="accent2"/>
-        </a:buClr>
-        <a:buSzPct val="70000"/>
-        <a:buFont typeface="Wingdings 2"/>
-        <a:buChar char=""/>
-        <a:defRPr kumimoji="0" sz="2100" kern="1200">
+        <a:buChar char=""/>
+        <a:defRPr kumimoji="0" sz="2300" kern="1200">
           <a:solidFill>
             <a:schemeClr val="tx1"/>
           </a:solidFill>
@@ -3651,16 +3483,16 @@
           <a:cs typeface="+mn-cs"/>
         </a:defRPr>
       </a:lvl3pPr>
-      <a:lvl4pPr marL="1188720" indent="-210312" algn="l" rtl="0" eaLnBrk="1" latinLnBrk="0" hangingPunct="1">
+      <a:lvl4pPr marL="1005840" indent="-182880" algn="l" rtl="0" eaLnBrk="1" latinLnBrk="0" hangingPunct="1">
         <a:spcBef>
-          <a:spcPct val="20000"/>
+          <a:spcPts val="400"/>
         </a:spcBef>
         <a:buClr>
           <a:schemeClr val="accent3"/>
         </a:buClr>
-        <a:buSzPct val="65000"/>
+        <a:buSzPct val="100000"/>
         <a:buFont typeface="Wingdings 2"/>
-        <a:buChar char=""/>
+        <a:buChar char=""/>
         <a:defRPr kumimoji="0" sz="2000" kern="1200">
           <a:solidFill>
             <a:schemeClr val="tx1"/>
@@ -3670,17 +3502,17 @@
           <a:cs typeface="+mn-cs"/>
         </a:defRPr>
       </a:lvl4pPr>
-      <a:lvl5pPr marL="1463040" indent="-210312" algn="l" rtl="0" eaLnBrk="1" latinLnBrk="0" hangingPunct="1">
+      <a:lvl5pPr marL="1188720" indent="-182880" algn="l" rtl="0" eaLnBrk="1" latinLnBrk="0" hangingPunct="1">
         <a:spcBef>
-          <a:spcPct val="20000"/>
+          <a:spcPts val="400"/>
         </a:spcBef>
         <a:buClr>
-          <a:schemeClr val="accent4"/>
+          <a:schemeClr val="accent3"/>
         </a:buClr>
-        <a:buSzPct val="65000"/>
+        <a:buSzPct val="100000"/>
         <a:buFont typeface="Wingdings 2"/>
-        <a:buChar char=""/>
-        <a:defRPr kumimoji="0" sz="2000" kern="1200">
+        <a:buChar char=""/>
+        <a:defRPr kumimoji="0" sz="1900" kern="1200">
           <a:solidFill>
             <a:schemeClr val="tx1"/>
           </a:solidFill>
@@ -3689,17 +3521,16 @@
           <a:cs typeface="+mn-cs"/>
         </a:defRPr>
       </a:lvl5pPr>
-      <a:lvl6pPr marL="1737360" indent="-210312" algn="l" rtl="0" eaLnBrk="1" latinLnBrk="0" hangingPunct="1">
+      <a:lvl6pPr marL="1371600" indent="-173736" algn="l" rtl="0" eaLnBrk="1" latinLnBrk="0" hangingPunct="1">
         <a:spcBef>
-          <a:spcPct val="20000"/>
+          <a:spcPts val="400"/>
         </a:spcBef>
         <a:buClr>
-          <a:schemeClr val="accent5"/>
+          <a:schemeClr val="accent4"/>
         </a:buClr>
-        <a:buSzPct val="80000"/>
         <a:buFont typeface="Wingdings 2"/>
-        <a:buChar char=""/>
-        <a:defRPr kumimoji="0" sz="1800" kern="1200">
+        <a:buChar char=""/>
+        <a:defRPr kumimoji="0" sz="1800" kern="1200" baseline="0">
           <a:solidFill>
             <a:schemeClr val="tx1"/>
           </a:solidFill>
@@ -3708,16 +3539,15 @@
           <a:cs typeface="+mn-cs"/>
         </a:defRPr>
       </a:lvl6pPr>
-      <a:lvl7pPr marL="1920240" indent="-182880" algn="l" rtl="0" eaLnBrk="1" latinLnBrk="0" hangingPunct="1">
+      <a:lvl7pPr marL="1554480" indent="-173736" algn="l" rtl="0" eaLnBrk="1" latinLnBrk="0" hangingPunct="1">
         <a:spcBef>
-          <a:spcPct val="20000"/>
+          <a:spcPts val="400"/>
         </a:spcBef>
         <a:buClr>
-          <a:schemeClr val="accent6"/>
+          <a:schemeClr val="accent4"/>
         </a:buClr>
-        <a:buSzPct val="80000"/>
         <a:buFont typeface="Wingdings 2"/>
-        <a:buChar char=""/>
+        <a:buChar char=""/>
         <a:defRPr kumimoji="0" sz="1600" kern="1200" baseline="0">
           <a:solidFill>
             <a:schemeClr val="tx1"/>
@@ -3727,15 +3557,16 @@
           <a:cs typeface="+mn-cs"/>
         </a:defRPr>
       </a:lvl7pPr>
-      <a:lvl8pPr marL="2194560" indent="-182880" algn="l" rtl="0" eaLnBrk="1" latinLnBrk="0" hangingPunct="1">
+      <a:lvl8pPr marL="1737360" indent="-173736" algn="l" rtl="0" eaLnBrk="1" latinLnBrk="0" hangingPunct="1">
         <a:spcBef>
-          <a:spcPct val="20000"/>
+          <a:spcPts val="400"/>
         </a:spcBef>
         <a:buClr>
-          <a:schemeClr val="tx2"/>
+          <a:schemeClr val="accent4"/>
         </a:buClr>
-        <a:buChar char="•"/>
-        <a:defRPr kumimoji="0" sz="1600" kern="1200">
+        <a:buFont typeface="Wingdings 2"/>
+        <a:buChar char=""/>
+        <a:defRPr kumimoji="0" sz="1600" kern="1200" baseline="0">
           <a:solidFill>
             <a:schemeClr val="tx1"/>
           </a:solidFill>
@@ -3744,16 +3575,16 @@
           <a:cs typeface="+mn-cs"/>
         </a:defRPr>
       </a:lvl8pPr>
-      <a:lvl9pPr marL="2468880" indent="-182880" algn="l" rtl="0" eaLnBrk="1" latinLnBrk="0" hangingPunct="1">
+      <a:lvl9pPr marL="1920240" indent="-173736" algn="l" rtl="0" eaLnBrk="1" latinLnBrk="0" hangingPunct="1">
         <a:spcBef>
-          <a:spcPct val="20000"/>
+          <a:spcPts val="400"/>
         </a:spcBef>
         <a:buClr>
-          <a:schemeClr val="tx2"/>
+          <a:schemeClr val="accent4"/>
         </a:buClr>
-        <a:buFontTx/>
-        <a:buChar char="•"/>
-        <a:defRPr kumimoji="0" sz="1400" kern="1200" baseline="0">
+        <a:buFont typeface="Wingdings 2"/>
+        <a:buChar char=""/>
+        <a:defRPr kumimoji="0" sz="1600" kern="1200" baseline="0">
           <a:solidFill>
             <a:schemeClr val="tx1"/>
           </a:solidFill>
@@ -3762,6 +3593,7 @@
           <a:cs typeface="+mn-cs"/>
         </a:defRPr>
       </a:lvl9pPr>
+      <a:extLst/>
     </p:bodyStyle>
     <p:otherStyle>
       <a:lvl1pPr marL="0" algn="l" rtl="0" eaLnBrk="1" latinLnBrk="0" hangingPunct="1">
@@ -3854,6 +3686,7 @@
           <a:cs typeface="+mn-cs"/>
         </a:defRPr>
       </a:lvl9pPr>
+      <a:extLst/>
     </p:otherStyle>
   </p:txStyles>
 </p:sldMaster>
@@ -3894,10 +3727,10 @@
           <a:lstStyle/>
           <a:p>
             <a:r>
-              <a:rPr lang="en-US" sz="5200" b="0" dirty="0" smtClean="0"/>
+              <a:rPr lang="en-US" sz="4200" b="0" dirty="0" smtClean="0"/>
               <a:t>Electronic Field Input System</a:t>
             </a:r>
-            <a:endParaRPr lang="en-US" sz="5200" dirty="0"/>
+            <a:endParaRPr lang="en-US" sz="4200" dirty="0"/>
           </a:p>
         </p:txBody>
       </p:sp>
@@ -3911,22 +3744,29 @@
             <p:ph type="subTitle" idx="1"/>
           </p:nvPr>
         </p:nvSpPr>
-        <p:spPr/>
-        <p:txBody>
-          <a:bodyPr/>
+        <p:spPr>
+          <a:xfrm>
+            <a:off x="-838200" y="2819400"/>
+            <a:ext cx="9532034" cy="1752600"/>
+          </a:xfrm>
+        </p:spPr>
+        <p:txBody>
+          <a:bodyPr>
+            <a:normAutofit/>
+          </a:bodyPr>
           <a:lstStyle/>
           <a:p>
             <a:r>
-              <a:rPr lang="en-US" dirty="0" smtClean="0"/>
+              <a:rPr lang="en-US" sz="2400" dirty="0" smtClean="0"/>
               <a:t>Team 5</a:t>
             </a:r>
           </a:p>
           <a:p>
             <a:r>
-              <a:rPr lang="en-US" dirty="0" smtClean="0"/>
+              <a:rPr lang="en-US" sz="2400" dirty="0" smtClean="0"/>
               <a:t>Stacy Carlson, Thomas Flores, and Ralph Parkison</a:t>
             </a:r>
-            <a:endParaRPr lang="en-US" dirty="0"/>
+            <a:endParaRPr lang="en-US" sz="2400" dirty="0"/>
           </a:p>
         </p:txBody>
       </p:sp>
@@ -3996,28 +3836,34 @@
           <a:bodyPr/>
           <a:lstStyle/>
           <a:p>
-            <a:r>
-              <a:rPr lang="en-US" sz="2700" dirty="0" smtClean="0"/>
+            <a:pPr algn="ctr"/>
+            <a:r>
+              <a:rPr lang="en-US" dirty="0" smtClean="0"/>
               <a:t>Rough Draft Design</a:t>
             </a:r>
-            <a:endParaRPr lang="en-US" sz="2700" dirty="0"/>
-          </a:p>
-        </p:txBody>
-      </p:sp>
-      <p:sp>
-        <p:nvSpPr>
-          <p:cNvPr id="5" name="Text Placeholder 4"/>
-          <p:cNvSpPr>
-            <a:spLocks noGrp="1"/>
-          </p:cNvSpPr>
-          <p:nvPr>
-            <p:ph type="body" idx="2"/>
-          </p:nvPr>
-        </p:nvSpPr>
-        <p:spPr/>
+            <a:endParaRPr lang="en-US" dirty="0"/>
+          </a:p>
+        </p:txBody>
+      </p:sp>
+      <p:sp>
+        <p:nvSpPr>
+          <p:cNvPr id="4" name="Content Placeholder 3"/>
+          <p:cNvSpPr>
+            <a:spLocks noGrp="1"/>
+          </p:cNvSpPr>
+          <p:nvPr>
+            <p:ph sz="half" idx="2"/>
+          </p:nvPr>
+        </p:nvSpPr>
+        <p:spPr>
+          <a:xfrm>
+            <a:off x="4648200" y="1645920"/>
+            <a:ext cx="4038600" cy="4831080"/>
+          </a:xfrm>
+        </p:spPr>
         <p:txBody>
           <a:bodyPr>
-            <a:normAutofit/>
+            <a:normAutofit lnSpcReduction="10000"/>
           </a:bodyPr>
           <a:lstStyle/>
           <a:p>
@@ -4026,7 +3872,7 @@
               <a:buChar char="•"/>
             </a:pPr>
             <a:r>
-              <a:rPr lang="en-US" sz="1800" dirty="0" smtClean="0"/>
+              <a:rPr lang="en-US" sz="3200" dirty="0" smtClean="0"/>
               <a:t>Update fields on start up to allow for easy upgrades</a:t>
             </a:r>
           </a:p>
@@ -4036,7 +3882,7 @@
               <a:buChar char="•"/>
             </a:pPr>
             <a:r>
-              <a:rPr lang="en-US" sz="1800" dirty="0" smtClean="0"/>
+              <a:rPr lang="en-US" sz="3200" dirty="0" smtClean="0"/>
               <a:t>Store creel data internally</a:t>
             </a:r>
           </a:p>
@@ -4046,15 +3892,18 @@
               <a:buChar char="•"/>
             </a:pPr>
             <a:r>
-              <a:rPr lang="en-US" sz="1800" dirty="0" smtClean="0"/>
+              <a:rPr lang="en-US" sz="3200" dirty="0" smtClean="0"/>
               <a:t>Communicate with Team 4’s database via JSON objects sent over the internet</a:t>
             </a:r>
+          </a:p>
+          <a:p>
+            <a:endParaRPr lang="en-US" dirty="0"/>
           </a:p>
         </p:txBody>
       </p:sp>
       <p:pic>
         <p:nvPicPr>
-          <p:cNvPr id="4" name="Content Placeholder 3"/>
+          <p:cNvPr id="5" name="Content Placeholder 3"/>
           <p:cNvPicPr>
             <a:picLocks noGrp="1" noChangeAspect="1"/>
           </p:cNvPicPr>
@@ -4066,7 +3915,7 @@
           <a:blip r:embed="rId2" cstate="print">
             <a:extLst>
               <a:ext uri="{28A0092B-C50C-407E-A947-70E740481C1C}">
-                <a14:useLocalDpi xmlns:a14="http://schemas.microsoft.com/office/drawing/2010/main" xmlns="" val="0"/>
+                <a14:useLocalDpi xmlns="" xmlns:a14="http://schemas.microsoft.com/office/drawing/2010/main" val="0"/>
               </a:ext>
             </a:extLst>
           </a:blip>
@@ -4076,17 +3925,12 @@
         </p:blipFill>
         <p:spPr>
           <a:xfrm>
-            <a:off x="4416425" y="1676400"/>
-            <a:ext cx="3429000" cy="4572000"/>
+            <a:off x="779264" y="1646238"/>
+            <a:ext cx="3394472" cy="4525962"/>
           </a:xfrm>
         </p:spPr>
       </p:pic>
     </p:spTree>
-    <p:extLst>
-      <p:ext uri="{BB962C8B-B14F-4D97-AF65-F5344CB8AC3E}">
-        <p14:creationId xmlns:p14="http://schemas.microsoft.com/office/powerpoint/2010/main" xmlns="" val="3013361963"/>
-      </p:ext>
-    </p:extLst>
   </p:cSld>
   <p:clrMapOvr>
     <a:masterClrMapping/>
@@ -4124,16 +3968,16 @@
         <p:spPr/>
         <p:txBody>
           <a:bodyPr>
-            <a:normAutofit fontScale="90000"/>
+            <a:normAutofit/>
           </a:bodyPr>
           <a:lstStyle/>
           <a:p>
             <a:pPr algn="ctr"/>
             <a:r>
-              <a:rPr lang="en-US" dirty="0" smtClean="0"/>
+              <a:rPr lang="en-US" sz="3800" dirty="0" smtClean="0"/>
               <a:t>Diagram Including User Interface</a:t>
             </a:r>
-            <a:endParaRPr lang="en-US" dirty="0"/>
+            <a:endParaRPr lang="en-US" sz="3800" dirty="0"/>
           </a:p>
         </p:txBody>
       </p:sp>
@@ -4151,7 +3995,7 @@
           <a:blip r:embed="rId2" cstate="print">
             <a:extLst>
               <a:ext uri="{28A0092B-C50C-407E-A947-70E740481C1C}">
-                <a14:useLocalDpi xmlns:a14="http://schemas.microsoft.com/office/drawing/2010/main" xmlns="" val="0"/>
+                <a14:useLocalDpi xmlns="" xmlns:a14="http://schemas.microsoft.com/office/drawing/2010/main" val="0"/>
               </a:ext>
             </a:extLst>
           </a:blip>
@@ -4161,15 +4005,15 @@
         </p:blipFill>
         <p:spPr>
           <a:xfrm>
-            <a:off x="1645709" y="1935163"/>
-            <a:ext cx="5852582" cy="4389437"/>
+            <a:off x="1645920" y="1714659"/>
+            <a:ext cx="5852160" cy="4389120"/>
           </a:xfrm>
         </p:spPr>
       </p:pic>
     </p:spTree>
     <p:extLst>
       <p:ext uri="{BB962C8B-B14F-4D97-AF65-F5344CB8AC3E}">
-        <p14:creationId xmlns:p14="http://schemas.microsoft.com/office/powerpoint/2010/main" xmlns="" val="3793897647"/>
+        <p14:creationId xmlns="" xmlns:p14="http://schemas.microsoft.com/office/powerpoint/2010/main" val="3793897647"/>
       </p:ext>
     </p:extLst>
   </p:cSld>
@@ -4415,11 +4259,7 @@
             <a:pPr algn="ctr"/>
             <a:r>
               <a:rPr lang="en-US" dirty="0" smtClean="0"/>
-              <a:t>SRS </a:t>
-            </a:r>
-            <a:r>
-              <a:rPr lang="en-US" dirty="0" smtClean="0"/>
-              <a:t>Progress</a:t>
+              <a:t>SRS Progress</a:t>
             </a:r>
             <a:endParaRPr lang="en-US" dirty="0"/>
           </a:p>
@@ -4450,25 +4290,19 @@
               <a:rPr lang="en-US" dirty="0" smtClean="0"/>
               <a:t>Contacted client to request a meeting to discuss the SRS</a:t>
             </a:r>
-            <a:endParaRPr lang="en-US" dirty="0" smtClean="0"/>
           </a:p>
           <a:p>
             <a:r>
               <a:rPr lang="en-US" dirty="0" smtClean="0"/>
-              <a:t>We will send them a copy via email as </a:t>
-            </a:r>
-            <a:r>
-              <a:rPr lang="en-US" dirty="0" smtClean="0"/>
-              <a:t>well</a:t>
-            </a:r>
-            <a:endParaRPr lang="en-US" dirty="0" smtClean="0"/>
+              <a:t>We will send them a copy via email as well</a:t>
+            </a:r>
           </a:p>
         </p:txBody>
       </p:sp>
     </p:spTree>
     <p:extLst>
       <p:ext uri="{BB962C8B-B14F-4D97-AF65-F5344CB8AC3E}">
-        <p14:creationId xmlns:p14="http://schemas.microsoft.com/office/powerpoint/2010/main" xmlns="" val="2397406114"/>
+        <p14:creationId xmlns="" xmlns:p14="http://schemas.microsoft.com/office/powerpoint/2010/main" val="2397406114"/>
       </p:ext>
     </p:extLst>
   </p:cSld>
@@ -4479,9 +4313,9 @@
 </file>
 
 <file path=ppt/theme/theme1.xml><?xml version="1.0" encoding="utf-8"?>
-<a:theme xmlns:a="http://schemas.openxmlformats.org/drawingml/2006/main" name="Flow">
+<a:theme xmlns:a="http://schemas.openxmlformats.org/drawingml/2006/main" name="Foundry">
   <a:themeElements>
-    <a:clrScheme name="Flow">
+    <a:clrScheme name="Office">
       <a:dk1>
         <a:sysClr val="windowText" lastClr="000000"/>
       </a:dk1>
@@ -4489,52 +4323,54 @@
         <a:sysClr val="window" lastClr="FFFFFF"/>
       </a:lt1>
       <a:dk2>
-        <a:srgbClr val="04617B"/>
+        <a:srgbClr val="1F497D"/>
       </a:dk2>
       <a:lt2>
-        <a:srgbClr val="DBF5F9"/>
+        <a:srgbClr val="EEECE1"/>
       </a:lt2>
       <a:accent1>
-        <a:srgbClr val="0F6FC6"/>
+        <a:srgbClr val="4F81BD"/>
       </a:accent1>
       <a:accent2>
-        <a:srgbClr val="009DD9"/>
+        <a:srgbClr val="C0504D"/>
       </a:accent2>
       <a:accent3>
-        <a:srgbClr val="0BD0D9"/>
+        <a:srgbClr val="9BBB59"/>
       </a:accent3>
       <a:accent4>
-        <a:srgbClr val="10CF9B"/>
+        <a:srgbClr val="8064A2"/>
       </a:accent4>
       <a:accent5>
-        <a:srgbClr val="7CCA62"/>
+        <a:srgbClr val="4BACC6"/>
       </a:accent5>
       <a:accent6>
-        <a:srgbClr val="A5C249"/>
+        <a:srgbClr val="F79646"/>
       </a:accent6>
       <a:hlink>
-        <a:srgbClr val="E2D700"/>
+        <a:srgbClr val="0000FF"/>
       </a:hlink>
       <a:folHlink>
-        <a:srgbClr val="85DFD0"/>
+        <a:srgbClr val="800080"/>
       </a:folHlink>
     </a:clrScheme>
-    <a:fontScheme name="Flow">
+    <a:fontScheme name="Foundry">
       <a:majorFont>
-        <a:latin typeface="Calibri"/>
+        <a:latin typeface="Rockwell"/>
         <a:ea typeface=""/>
         <a:cs typeface=""/>
-        <a:font script="Jpan" typeface="ＭＳ Ｐゴシック"/>
-        <a:font script="Hang" typeface="HY중고딕"/>
-        <a:font script="Hans" typeface="隶书"/>
+        <a:font script="Grek" typeface="Cambria"/>
+        <a:font script="Cyrl" typeface="Cambria"/>
+        <a:font script="Jpan" typeface="HG明朝B"/>
+        <a:font script="Hang" typeface="바탕"/>
+        <a:font script="Hans" typeface="方正姚体"/>
         <a:font script="Hant" typeface="微軟正黑體"/>
-        <a:font script="Arab" typeface="Traditional Arabic"/>
-        <a:font script="Hebr" typeface="Arial"/>
-        <a:font script="Thai" typeface="Cordia New"/>
+        <a:font script="Arab" typeface="Times New Roman"/>
+        <a:font script="Hebr" typeface="David"/>
+        <a:font script="Thai" typeface="JasmineUPC"/>
         <a:font script="Ethi" typeface="Nyala"/>
         <a:font script="Beng" typeface="Vrinda"/>
         <a:font script="Gujr" typeface="Shruti"/>
-        <a:font script="Khmr" typeface="DaunPenh"/>
+        <a:font script="Khmr" typeface="MoolBoran"/>
         <a:font script="Knda" typeface="Tunga"/>
         <a:font script="Guru" typeface="Raavi"/>
         <a:font script="Cans" typeface="Euphemia"/>
@@ -4555,16 +4391,18 @@
         <a:font script="Uigh" typeface="Microsoft Uighur"/>
       </a:majorFont>
       <a:minorFont>
-        <a:latin typeface="Constantia"/>
+        <a:latin typeface="Rockwell"/>
         <a:ea typeface=""/>
         <a:cs typeface=""/>
-        <a:font script="Jpan" typeface="HGP明朝E"/>
-        <a:font script="Hang" typeface="HY신명조"/>
-        <a:font script="Hans" typeface="宋体"/>
-        <a:font script="Hant" typeface="新細明體"/>
-        <a:font script="Arab" typeface="Majalla UI"/>
+        <a:font script="Grek" typeface="Cambria"/>
+        <a:font script="Cyrl" typeface="Cambria"/>
+        <a:font script="Jpan" typeface="HG明朝B"/>
+        <a:font script="Hang" typeface="바탕"/>
+        <a:font script="Hans" typeface="方正姚体"/>
+        <a:font script="Hant" typeface="標楷體"/>
+        <a:font script="Arab" typeface="Times New Roman"/>
         <a:font script="Hebr" typeface="David"/>
-        <a:font script="Thai" typeface="Browallia New"/>
+        <a:font script="Thai" typeface="JasmineUPC"/>
         <a:font script="Ethi" typeface="Nyala"/>
         <a:font script="Beng" typeface="Vrinda"/>
         <a:font script="Gujr" typeface="Shruti"/>
@@ -4589,7 +4427,7 @@
         <a:font script="Uigh" typeface="Microsoft Uighur"/>
       </a:minorFont>
     </a:fontScheme>
-    <a:fmtScheme name="Flow">
+    <a:fmtScheme name="Foundry">
       <a:fillStyleLst>
         <a:solidFill>
           <a:schemeClr val="phClr"/>
@@ -4599,70 +4437,58 @@
             <a:gs pos="0">
               <a:schemeClr val="phClr">
                 <a:tint val="70000"/>
-                <a:satMod val="130000"/>
+                <a:satMod val="180000"/>
               </a:schemeClr>
             </a:gs>
-            <a:gs pos="43000">
+            <a:gs pos="62000">
               <a:schemeClr val="phClr">
-                <a:tint val="44000"/>
-                <a:satMod val="165000"/>
-              </a:schemeClr>
-            </a:gs>
-            <a:gs pos="93000">
-              <a:schemeClr val="phClr">
-                <a:tint val="15000"/>
-                <a:satMod val="165000"/>
+                <a:tint val="30000"/>
+                <a:satMod val="180000"/>
               </a:schemeClr>
             </a:gs>
             <a:gs pos="100000">
               <a:schemeClr val="phClr">
-                <a:tint val="5000"/>
-                <a:satMod val="250000"/>
+                <a:tint val="22000"/>
+                <a:satMod val="180000"/>
               </a:schemeClr>
             </a:gs>
           </a:gsLst>
-          <a:path path="circle">
-            <a:fillToRect l="50000" t="130000" r="50000" b="-30000"/>
-          </a:path>
+          <a:lin ang="16200000" scaled="0"/>
         </a:gradFill>
         <a:gradFill rotWithShape="1">
           <a:gsLst>
             <a:gs pos="0">
               <a:schemeClr val="phClr">
-                <a:tint val="98000"/>
-                <a:shade val="25000"/>
-                <a:satMod val="250000"/>
+                <a:shade val="58000"/>
+                <a:satMod val="150000"/>
               </a:schemeClr>
             </a:gs>
-            <a:gs pos="68000">
+            <a:gs pos="72000">
               <a:schemeClr val="phClr">
-                <a:tint val="86000"/>
-                <a:satMod val="115000"/>
+                <a:tint val="90000"/>
+                <a:satMod val="135000"/>
               </a:schemeClr>
             </a:gs>
             <a:gs pos="100000">
               <a:schemeClr val="phClr">
-                <a:tint val="50000"/>
-                <a:satMod val="150000"/>
+                <a:tint val="80000"/>
+                <a:satMod val="155000"/>
               </a:schemeClr>
             </a:gs>
           </a:gsLst>
-          <a:path path="circle">
-            <a:fillToRect l="50000" t="130000" r="50000" b="-30000"/>
-          </a:path>
+          <a:lin ang="16200000" scaled="0"/>
         </a:gradFill>
       </a:fillStyleLst>
       <a:lnStyleLst>
         <a:ln w="9525" cap="flat" cmpd="sng" algn="ctr">
           <a:solidFill>
             <a:schemeClr val="phClr">
-              <a:shade val="50000"/>
-              <a:satMod val="103000"/>
+              <a:shade val="80000"/>
             </a:schemeClr>
           </a:solidFill>
           <a:prstDash val="solid"/>
         </a:ln>
-        <a:ln w="25400" cap="flat" cmpd="sng" algn="ctr">
+        <a:ln w="38100" cap="flat" cmpd="sng" algn="ctr">
           <a:solidFill>
             <a:schemeClr val="phClr"/>
           </a:solidFill>
@@ -4678,46 +4504,40 @@
       <a:effectStyleLst>
         <a:effectStyle>
           <a:effectLst>
-            <a:outerShdw blurRad="57150" dist="38100" dir="5400000" algn="ctr" rotWithShape="0">
-              <a:schemeClr val="phClr">
-                <a:shade val="9000"/>
-                <a:satMod val="105000"/>
-                <a:alpha val="48000"/>
-              </a:schemeClr>
+            <a:outerShdw blurRad="50800" dist="38100" dir="5400000" rotWithShape="0">
+              <a:srgbClr val="000000">
+                <a:alpha val="43137"/>
+              </a:srgbClr>
             </a:outerShdw>
           </a:effectLst>
         </a:effectStyle>
         <a:effectStyle>
           <a:effectLst>
-            <a:outerShdw blurRad="57150" dist="38100" dir="5400000" algn="ctr" rotWithShape="0">
-              <a:schemeClr val="phClr">
-                <a:shade val="9000"/>
-                <a:satMod val="105000"/>
-                <a:alpha val="48000"/>
-              </a:schemeClr>
+            <a:outerShdw blurRad="50800" dist="38100" dir="5400000" rotWithShape="0">
+              <a:srgbClr val="000000">
+                <a:alpha val="43137"/>
+              </a:srgbClr>
             </a:outerShdw>
           </a:effectLst>
         </a:effectStyle>
         <a:effectStyle>
           <a:effectLst>
-            <a:outerShdw blurRad="57150" dist="38100" dir="5400000" algn="ctr" rotWithShape="0">
-              <a:schemeClr val="phClr">
-                <a:shade val="9000"/>
-                <a:satMod val="105000"/>
-                <a:alpha val="48000"/>
-              </a:schemeClr>
+            <a:outerShdw blurRad="50800" dist="38100" dir="5400000" rotWithShape="0">
+              <a:srgbClr val="000000">
+                <a:alpha val="43137"/>
+              </a:srgbClr>
             </a:outerShdw>
           </a:effectLst>
           <a:scene3d>
             <a:camera prst="orthographicFront" fov="0">
               <a:rot lat="0" lon="0" rev="0"/>
             </a:camera>
-            <a:lightRig rig="glow" dir="tl">
-              <a:rot lat="0" lon="0" rev="900000"/>
+            <a:lightRig rig="soft" dir="tl">
+              <a:rot lat="0" lon="0" rev="20000000"/>
             </a:lightRig>
           </a:scene3d>
-          <a:sp3d prstMaterial="powder">
-            <a:bevelT w="25400" h="38100"/>
+          <a:sp3d prstMaterial="matte">
+            <a:bevelT w="63500" h="63500" prst="coolSlant"/>
           </a:sp3d>
         </a:effectStyle>
       </a:effectStyleLst>
@@ -4729,41 +4549,42 @@
           <a:gsLst>
             <a:gs pos="0">
               <a:schemeClr val="phClr">
-                <a:tint val="80000"/>
+                <a:tint val="75000"/>
                 <a:satMod val="400000"/>
               </a:schemeClr>
             </a:gs>
-            <a:gs pos="25000">
+            <a:gs pos="20000">
               <a:schemeClr val="phClr">
-                <a:tint val="83000"/>
-                <a:satMod val="320000"/>
+                <a:tint val="80000"/>
+                <a:satMod val="355000"/>
               </a:schemeClr>
             </a:gs>
             <a:gs pos="100000">
               <a:schemeClr val="phClr">
-                <a:shade val="15000"/>
-                <a:satMod val="320000"/>
+                <a:tint val="95000"/>
+                <a:shade val="55000"/>
+                <a:satMod val="355000"/>
               </a:schemeClr>
             </a:gs>
           </a:gsLst>
           <a:path path="circle">
-            <a:fillToRect l="10000" t="110000" r="10000" b="100000"/>
+            <a:fillToRect l="67500" t="35000" r="32500" b="65000"/>
           </a:path>
         </a:gradFill>
         <a:blipFill>
           <a:blip xmlns:r="http://schemas.openxmlformats.org/officeDocument/2006/relationships" r:embed="rId1">
             <a:duotone>
               <a:schemeClr val="phClr">
-                <a:shade val="90000"/>
-                <a:satMod val="150000"/>
+                <a:shade val="30000"/>
+                <a:satMod val="120000"/>
               </a:schemeClr>
               <a:schemeClr val="phClr">
-                <a:tint val="88000"/>
-                <a:satMod val="150000"/>
+                <a:tint val="70000"/>
+                <a:satMod val="250000"/>
               </a:schemeClr>
             </a:duotone>
           </a:blip>
-          <a:tile tx="0" ty="0" sx="65000" sy="65000" flip="none" algn="tl"/>
+          <a:tile tx="0" ty="0" sx="50000" sy="50000" flip="none" algn="t"/>
         </a:blipFill>
       </a:bgFillStyleLst>
     </a:fmtScheme>

</xml_diff>